<commit_message>
continuação da apresentação final
</commit_message>
<xml_diff>
--- a/doc/Apresentação Oral/AFinal.pptx
+++ b/doc/Apresentação Oral/AFinal.pptx
@@ -5,7 +5,7 @@
     <p:sldMasterId id="2147483648" r:id="rId1"/>
   </p:sldMasterIdLst>
   <p:notesMasterIdLst>
-    <p:notesMasterId r:id="rId28"/>
+    <p:notesMasterId r:id="rId30"/>
   </p:notesMasterIdLst>
   <p:sldIdLst>
     <p:sldId id="256" r:id="rId2"/>
@@ -28,12 +28,14 @@
     <p:sldId id="282" r:id="rId19"/>
     <p:sldId id="280" r:id="rId20"/>
     <p:sldId id="281" r:id="rId21"/>
-    <p:sldId id="283" r:id="rId22"/>
-    <p:sldId id="284" r:id="rId23"/>
-    <p:sldId id="287" r:id="rId24"/>
-    <p:sldId id="289" r:id="rId25"/>
-    <p:sldId id="288" r:id="rId26"/>
-    <p:sldId id="285" r:id="rId27"/>
+    <p:sldId id="290" r:id="rId22"/>
+    <p:sldId id="291" r:id="rId23"/>
+    <p:sldId id="283" r:id="rId24"/>
+    <p:sldId id="284" r:id="rId25"/>
+    <p:sldId id="287" r:id="rId26"/>
+    <p:sldId id="289" r:id="rId27"/>
+    <p:sldId id="288" r:id="rId28"/>
+    <p:sldId id="285" r:id="rId29"/>
   </p:sldIdLst>
   <p:sldSz cx="12192000" cy="6858000"/>
   <p:notesSz cx="6858000" cy="9144000"/>
@@ -174,27 +176,6 @@
       <p:ext uri="{C676402C-5697-4E1C-873F-D02D1690AC5C}">
         <p15:threadingInfo xmlns:p15="http://schemas.microsoft.com/office/powerpoint/2012/main" timeZoneBias="-60">
           <p15:parentCm authorId="2" idx="3"/>
-        </p15:threadingInfo>
-      </p:ext>
-    </p:extLst>
-  </p:cm>
-</p:cmLst>
-</file>
-
-<file path=ppt/comments/comment2.xml><?xml version="1.0" encoding="utf-8"?>
-<p:cmLst xmlns:a="http://schemas.openxmlformats.org/drawingml/2006/main" xmlns:r="http://schemas.openxmlformats.org/officeDocument/2006/relationships" xmlns:p="http://schemas.openxmlformats.org/presentationml/2006/main">
-  <p:cm authorId="0" dt="2015-07-15T11:02:44.921" idx="33">
-    <p:pos x="4600" y="2224"/>
-    <p:text>usar talvez duas figuras: uma para ilustrar o funcionamento do SA ao longo da pesquisa e outra para o andamento (para diferentes R) da função g(t, Tmax, R)
-Para o SA figura 2.25 pag. 127 livro Talbi</p:text>
-  </p:cm>
-  <p:cm authorId="1" dt="2015-07-17T20:44:39.743" idx="6">
-    <p:pos x="4600" y="2320"/>
-    <p:text>SA para diferentes R's não será necessário tendo em conta o slide seguinte (para a apresentação final e relatório final, estes vão ser substituidos por R's em vez de -log10)</p:text>
-    <p:extLst>
-      <p:ext uri="{C676402C-5697-4E1C-873F-D02D1690AC5C}">
-        <p15:threadingInfo xmlns:p15="http://schemas.microsoft.com/office/powerpoint/2012/main" timeZoneBias="-60">
-          <p15:parentCm authorId="0" idx="33"/>
         </p15:threadingInfo>
       </p:ext>
     </p:extLst>
@@ -1953,6 +1934,13 @@
         </dgm:presLayoutVars>
       </dgm:prSet>
       <dgm:spPr/>
+      <dgm:t>
+        <a:bodyPr/>
+        <a:lstStyle/>
+        <a:p>
+          <a:endParaRPr lang="en-US"/>
+        </a:p>
+      </dgm:t>
     </dgm:pt>
     <dgm:pt modelId="{0F705934-E6D1-499E-BDAA-C0A62992660D}" type="pres">
       <dgm:prSet presAssocID="{17A8A248-E1DA-469F-A154-CBAC5D9778AB}" presName="node" presStyleLbl="node1" presStyleIdx="0" presStyleCnt="6">
@@ -2009,10 +1997,24 @@
     <dgm:pt modelId="{E608B5D3-1969-4012-8ADD-73D2E450020A}" type="pres">
       <dgm:prSet presAssocID="{0827E205-FFF6-4C97-99DA-E7CCB976213E}" presName="sibTrans" presStyleLbl="sibTrans2D1" presStyleIdx="1" presStyleCnt="5"/>
       <dgm:spPr/>
+      <dgm:t>
+        <a:bodyPr/>
+        <a:lstStyle/>
+        <a:p>
+          <a:endParaRPr lang="en-US"/>
+        </a:p>
+      </dgm:t>
     </dgm:pt>
     <dgm:pt modelId="{861FB1F0-A09E-4914-B7FC-FCEA1CD04480}" type="pres">
       <dgm:prSet presAssocID="{0827E205-FFF6-4C97-99DA-E7CCB976213E}" presName="connectorText" presStyleLbl="sibTrans2D1" presStyleIdx="1" presStyleCnt="5"/>
       <dgm:spPr/>
+      <dgm:t>
+        <a:bodyPr/>
+        <a:lstStyle/>
+        <a:p>
+          <a:endParaRPr lang="en-US"/>
+        </a:p>
+      </dgm:t>
     </dgm:pt>
     <dgm:pt modelId="{1042CD11-4028-40C7-A3E4-3853786713BD}" type="pres">
       <dgm:prSet presAssocID="{D4EC1965-5E66-4F6A-B14C-48B89CF88F34}" presName="node" presStyleLbl="node1" presStyleIdx="2" presStyleCnt="6">
@@ -2142,29 +2144,29 @@
     </dgm:pt>
   </dgm:ptLst>
   <dgm:cxnLst>
+    <dgm:cxn modelId="{296F466E-FD74-4122-B044-D57410516D1D}" type="presOf" srcId="{98B9D415-3575-41DA-8A1E-7D3F389EAAB4}" destId="{B6D3413A-C5B6-47F8-B1A9-65F1039F4D3B}" srcOrd="0" destOrd="0" presId="urn:microsoft.com/office/officeart/2005/8/layout/process1"/>
+    <dgm:cxn modelId="{7EF4DE59-EE4D-429F-961F-C9CCE67F98A0}" type="presOf" srcId="{903E13AB-7FF9-4EF1-9CC8-42D43D9E5AF2}" destId="{F0252C6C-08EF-48C6-89C0-0C3E67BADC55}" srcOrd="0" destOrd="0" presId="urn:microsoft.com/office/officeart/2005/8/layout/process1"/>
+    <dgm:cxn modelId="{B8F3B7DF-0C43-42CF-9639-3F6ED87A8879}" type="presOf" srcId="{2F6FD728-9EA6-4228-BAD0-00E42898BAEE}" destId="{42370FF3-AFA1-404E-A02D-36439289E42F}" srcOrd="0" destOrd="0" presId="urn:microsoft.com/office/officeart/2005/8/layout/process1"/>
+    <dgm:cxn modelId="{976DF86D-1A8D-448E-8334-DA38467787F6}" type="presOf" srcId="{502ADAB4-0FBC-4569-99CE-21E1D5F6BC66}" destId="{45E28F72-793C-4B73-B565-78D783AB4F0D}" srcOrd="1" destOrd="0" presId="urn:microsoft.com/office/officeart/2005/8/layout/process1"/>
+    <dgm:cxn modelId="{10A6AFFB-136F-4B46-B488-3FCEC86DF52E}" srcId="{BA80B3D6-D686-4335-B8FE-A5B174A91D1F}" destId="{98B9D415-3575-41DA-8A1E-7D3F389EAAB4}" srcOrd="4" destOrd="0" parTransId="{4BB043C2-7E2E-4EC1-9BF5-3822561939B1}" sibTransId="{903E13AB-7FF9-4EF1-9CC8-42D43D9E5AF2}"/>
+    <dgm:cxn modelId="{E7CFC45B-DF7A-4A53-8AD2-1EDC1D064D7D}" type="presOf" srcId="{D4EC1965-5E66-4F6A-B14C-48B89CF88F34}" destId="{1042CD11-4028-40C7-A3E4-3853786713BD}" srcOrd="0" destOrd="0" presId="urn:microsoft.com/office/officeart/2005/8/layout/process1"/>
+    <dgm:cxn modelId="{72341014-660C-4F4B-99DB-6D5B90535813}" type="presOf" srcId="{BA80B3D6-D686-4335-B8FE-A5B174A91D1F}" destId="{52A5986A-80EF-452F-B163-4F651F6E920E}" srcOrd="0" destOrd="0" presId="urn:microsoft.com/office/officeart/2005/8/layout/process1"/>
+    <dgm:cxn modelId="{63979777-6806-43D9-999F-7A795E3AE3BF}" srcId="{BA80B3D6-D686-4335-B8FE-A5B174A91D1F}" destId="{424BD534-A5CD-4DA1-970B-96BC2B36FFFA}" srcOrd="3" destOrd="0" parTransId="{A6527A33-AD89-4577-8B3C-398FC08D70E9}" sibTransId="{2F6FD728-9EA6-4228-BAD0-00E42898BAEE}"/>
+    <dgm:cxn modelId="{F6EB67DB-F866-45F1-902C-F2D6BDC23779}" type="presOf" srcId="{6E46E610-6AA3-4C4E-8A85-6DC6A62E248B}" destId="{81668A18-A5C4-481F-924E-91CBE598CF90}" srcOrd="0" destOrd="0" presId="urn:microsoft.com/office/officeart/2005/8/layout/process1"/>
     <dgm:cxn modelId="{F7E4C5EA-DFF3-4CA5-B13C-89A73E0450D9}" type="presOf" srcId="{903E13AB-7FF9-4EF1-9CC8-42D43D9E5AF2}" destId="{005977C5-7746-4332-AB63-5565C2615FED}" srcOrd="1" destOrd="0" presId="urn:microsoft.com/office/officeart/2005/8/layout/process1"/>
     <dgm:cxn modelId="{F2DA0746-0CB3-4E86-A4F9-198901C93E9E}" type="presOf" srcId="{4422F951-8E6C-4158-98BC-9114CDD18487}" destId="{C70AAC22-CD4D-442E-9F76-A785E86CF564}" srcOrd="1" destOrd="0" presId="urn:microsoft.com/office/officeart/2005/8/layout/process1"/>
-    <dgm:cxn modelId="{296F466E-FD74-4122-B044-D57410516D1D}" type="presOf" srcId="{98B9D415-3575-41DA-8A1E-7D3F389EAAB4}" destId="{B6D3413A-C5B6-47F8-B1A9-65F1039F4D3B}" srcOrd="0" destOrd="0" presId="urn:microsoft.com/office/officeart/2005/8/layout/process1"/>
+    <dgm:cxn modelId="{342964B1-6106-4F57-988A-6EA084A830C3}" type="presOf" srcId="{0827E205-FFF6-4C97-99DA-E7CCB976213E}" destId="{861FB1F0-A09E-4914-B7FC-FCEA1CD04480}" srcOrd="1" destOrd="0" presId="urn:microsoft.com/office/officeart/2005/8/layout/process1"/>
+    <dgm:cxn modelId="{DE637EEF-7D91-4557-9E24-CE46690DD8EC}" type="presOf" srcId="{0827E205-FFF6-4C97-99DA-E7CCB976213E}" destId="{E608B5D3-1969-4012-8ADD-73D2E450020A}" srcOrd="0" destOrd="0" presId="urn:microsoft.com/office/officeart/2005/8/layout/process1"/>
+    <dgm:cxn modelId="{10FE49BB-B917-47BD-8A7A-41F8A583102C}" type="presOf" srcId="{424BD534-A5CD-4DA1-970B-96BC2B36FFFA}" destId="{A9B93654-13EA-4C3C-8C58-01B6F39C7E93}" srcOrd="0" destOrd="0" presId="urn:microsoft.com/office/officeart/2005/8/layout/process1"/>
+    <dgm:cxn modelId="{174D0F16-8657-483C-B58D-FDDCDD6C622B}" srcId="{BA80B3D6-D686-4335-B8FE-A5B174A91D1F}" destId="{17A8A248-E1DA-469F-A154-CBAC5D9778AB}" srcOrd="0" destOrd="0" parTransId="{E3C8D432-9B80-4370-B9AA-3C64CD61764F}" sibTransId="{4422F951-8E6C-4158-98BC-9114CDD18487}"/>
+    <dgm:cxn modelId="{F106EA50-CE0A-49EA-9830-F23364F8072D}" srcId="{BA80B3D6-D686-4335-B8FE-A5B174A91D1F}" destId="{CCE039CF-CC13-4D3D-851B-AB1839045A98}" srcOrd="1" destOrd="0" parTransId="{F7538E36-531A-4ABF-83F2-4D674DEF8E32}" sibTransId="{0827E205-FFF6-4C97-99DA-E7CCB976213E}"/>
     <dgm:cxn modelId="{B45AA2E6-D816-418A-8CB3-0FAC27502E63}" type="presOf" srcId="{502ADAB4-0FBC-4569-99CE-21E1D5F6BC66}" destId="{84B384BA-4992-4177-9E54-19EAA20BCC7A}" srcOrd="0" destOrd="0" presId="urn:microsoft.com/office/officeart/2005/8/layout/process1"/>
-    <dgm:cxn modelId="{DE637EEF-7D91-4557-9E24-CE46690DD8EC}" type="presOf" srcId="{0827E205-FFF6-4C97-99DA-E7CCB976213E}" destId="{E608B5D3-1969-4012-8ADD-73D2E450020A}" srcOrd="0" destOrd="0" presId="urn:microsoft.com/office/officeart/2005/8/layout/process1"/>
     <dgm:cxn modelId="{539D2639-9F77-4D02-BDA0-E03AA5E161DC}" type="presOf" srcId="{17A8A248-E1DA-469F-A154-CBAC5D9778AB}" destId="{0F705934-E6D1-499E-BDAA-C0A62992660D}" srcOrd="0" destOrd="0" presId="urn:microsoft.com/office/officeart/2005/8/layout/process1"/>
-    <dgm:cxn modelId="{342964B1-6106-4F57-988A-6EA084A830C3}" type="presOf" srcId="{0827E205-FFF6-4C97-99DA-E7CCB976213E}" destId="{861FB1F0-A09E-4914-B7FC-FCEA1CD04480}" srcOrd="1" destOrd="0" presId="urn:microsoft.com/office/officeart/2005/8/layout/process1"/>
-    <dgm:cxn modelId="{72341014-660C-4F4B-99DB-6D5B90535813}" type="presOf" srcId="{BA80B3D6-D686-4335-B8FE-A5B174A91D1F}" destId="{52A5986A-80EF-452F-B163-4F651F6E920E}" srcOrd="0" destOrd="0" presId="urn:microsoft.com/office/officeart/2005/8/layout/process1"/>
-    <dgm:cxn modelId="{F6EB67DB-F866-45F1-902C-F2D6BDC23779}" type="presOf" srcId="{6E46E610-6AA3-4C4E-8A85-6DC6A62E248B}" destId="{81668A18-A5C4-481F-924E-91CBE598CF90}" srcOrd="0" destOrd="0" presId="urn:microsoft.com/office/officeart/2005/8/layout/process1"/>
-    <dgm:cxn modelId="{63979777-6806-43D9-999F-7A795E3AE3BF}" srcId="{BA80B3D6-D686-4335-B8FE-A5B174A91D1F}" destId="{424BD534-A5CD-4DA1-970B-96BC2B36FFFA}" srcOrd="3" destOrd="0" parTransId="{A6527A33-AD89-4577-8B3C-398FC08D70E9}" sibTransId="{2F6FD728-9EA6-4228-BAD0-00E42898BAEE}"/>
-    <dgm:cxn modelId="{174D0F16-8657-483C-B58D-FDDCDD6C622B}" srcId="{BA80B3D6-D686-4335-B8FE-A5B174A91D1F}" destId="{17A8A248-E1DA-469F-A154-CBAC5D9778AB}" srcOrd="0" destOrd="0" parTransId="{E3C8D432-9B80-4370-B9AA-3C64CD61764F}" sibTransId="{4422F951-8E6C-4158-98BC-9114CDD18487}"/>
-    <dgm:cxn modelId="{E7CFC45B-DF7A-4A53-8AD2-1EDC1D064D7D}" type="presOf" srcId="{D4EC1965-5E66-4F6A-B14C-48B89CF88F34}" destId="{1042CD11-4028-40C7-A3E4-3853786713BD}" srcOrd="0" destOrd="0" presId="urn:microsoft.com/office/officeart/2005/8/layout/process1"/>
+    <dgm:cxn modelId="{F1DC2A5A-DC5A-417A-B6A0-A85C2DF10750}" srcId="{BA80B3D6-D686-4335-B8FE-A5B174A91D1F}" destId="{D4EC1965-5E66-4F6A-B14C-48B89CF88F34}" srcOrd="2" destOrd="0" parTransId="{FCD1FA7D-D905-468E-99B9-C7BD076FAC31}" sibTransId="{502ADAB4-0FBC-4569-99CE-21E1D5F6BC66}"/>
+    <dgm:cxn modelId="{3DC493F8-5B48-4FC5-BABD-95DC0BAAB2A7}" type="presOf" srcId="{4422F951-8E6C-4158-98BC-9114CDD18487}" destId="{FDB0FADC-49BB-4433-94F6-73BAE60CC01B}" srcOrd="0" destOrd="0" presId="urn:microsoft.com/office/officeart/2005/8/layout/process1"/>
+    <dgm:cxn modelId="{E8D939EE-BE19-4749-A012-A8BD5CBA70A3}" srcId="{BA80B3D6-D686-4335-B8FE-A5B174A91D1F}" destId="{6E46E610-6AA3-4C4E-8A85-6DC6A62E248B}" srcOrd="5" destOrd="0" parTransId="{823508B4-53E0-436F-8C0C-01AAB20F1F8B}" sibTransId="{58A25139-4C19-4DEF-BB4A-2C7D0C560D1E}"/>
     <dgm:cxn modelId="{3C2D7F7A-0ECD-4B6F-B22B-38A66E112503}" type="presOf" srcId="{CCE039CF-CC13-4D3D-851B-AB1839045A98}" destId="{C2B5D9D2-D82E-407D-882B-8A8EEF511AFF}" srcOrd="0" destOrd="0" presId="urn:microsoft.com/office/officeart/2005/8/layout/process1"/>
-    <dgm:cxn modelId="{B8F3B7DF-0C43-42CF-9639-3F6ED87A8879}" type="presOf" srcId="{2F6FD728-9EA6-4228-BAD0-00E42898BAEE}" destId="{42370FF3-AFA1-404E-A02D-36439289E42F}" srcOrd="0" destOrd="0" presId="urn:microsoft.com/office/officeart/2005/8/layout/process1"/>
-    <dgm:cxn modelId="{E8D939EE-BE19-4749-A012-A8BD5CBA70A3}" srcId="{BA80B3D6-D686-4335-B8FE-A5B174A91D1F}" destId="{6E46E610-6AA3-4C4E-8A85-6DC6A62E248B}" srcOrd="5" destOrd="0" parTransId="{823508B4-53E0-436F-8C0C-01AAB20F1F8B}" sibTransId="{58A25139-4C19-4DEF-BB4A-2C7D0C560D1E}"/>
-    <dgm:cxn modelId="{10A6AFFB-136F-4B46-B488-3FCEC86DF52E}" srcId="{BA80B3D6-D686-4335-B8FE-A5B174A91D1F}" destId="{98B9D415-3575-41DA-8A1E-7D3F389EAAB4}" srcOrd="4" destOrd="0" parTransId="{4BB043C2-7E2E-4EC1-9BF5-3822561939B1}" sibTransId="{903E13AB-7FF9-4EF1-9CC8-42D43D9E5AF2}"/>
-    <dgm:cxn modelId="{3DC493F8-5B48-4FC5-BABD-95DC0BAAB2A7}" type="presOf" srcId="{4422F951-8E6C-4158-98BC-9114CDD18487}" destId="{FDB0FADC-49BB-4433-94F6-73BAE60CC01B}" srcOrd="0" destOrd="0" presId="urn:microsoft.com/office/officeart/2005/8/layout/process1"/>
-    <dgm:cxn modelId="{10FE49BB-B917-47BD-8A7A-41F8A583102C}" type="presOf" srcId="{424BD534-A5CD-4DA1-970B-96BC2B36FFFA}" destId="{A9B93654-13EA-4C3C-8C58-01B6F39C7E93}" srcOrd="0" destOrd="0" presId="urn:microsoft.com/office/officeart/2005/8/layout/process1"/>
-    <dgm:cxn modelId="{976DF86D-1A8D-448E-8334-DA38467787F6}" type="presOf" srcId="{502ADAB4-0FBC-4569-99CE-21E1D5F6BC66}" destId="{45E28F72-793C-4B73-B565-78D783AB4F0D}" srcOrd="1" destOrd="0" presId="urn:microsoft.com/office/officeart/2005/8/layout/process1"/>
     <dgm:cxn modelId="{65373FC5-E836-409F-BAFC-05BC7F6E6B33}" type="presOf" srcId="{2F6FD728-9EA6-4228-BAD0-00E42898BAEE}" destId="{09FB49E3-3A32-426F-90D7-C2DEEECBAE8A}" srcOrd="1" destOrd="0" presId="urn:microsoft.com/office/officeart/2005/8/layout/process1"/>
-    <dgm:cxn modelId="{F1DC2A5A-DC5A-417A-B6A0-A85C2DF10750}" srcId="{BA80B3D6-D686-4335-B8FE-A5B174A91D1F}" destId="{D4EC1965-5E66-4F6A-B14C-48B89CF88F34}" srcOrd="2" destOrd="0" parTransId="{FCD1FA7D-D905-468E-99B9-C7BD076FAC31}" sibTransId="{502ADAB4-0FBC-4569-99CE-21E1D5F6BC66}"/>
-    <dgm:cxn modelId="{7EF4DE59-EE4D-429F-961F-C9CCE67F98A0}" type="presOf" srcId="{903E13AB-7FF9-4EF1-9CC8-42D43D9E5AF2}" destId="{F0252C6C-08EF-48C6-89C0-0C3E67BADC55}" srcOrd="0" destOrd="0" presId="urn:microsoft.com/office/officeart/2005/8/layout/process1"/>
-    <dgm:cxn modelId="{F106EA50-CE0A-49EA-9830-F23364F8072D}" srcId="{BA80B3D6-D686-4335-B8FE-A5B174A91D1F}" destId="{CCE039CF-CC13-4D3D-851B-AB1839045A98}" srcOrd="1" destOrd="0" parTransId="{F7538E36-531A-4ABF-83F2-4D674DEF8E32}" sibTransId="{0827E205-FFF6-4C97-99DA-E7CCB976213E}"/>
     <dgm:cxn modelId="{154F3A88-0D71-4474-80F1-3DDE67E1ECF5}" type="presParOf" srcId="{52A5986A-80EF-452F-B163-4F651F6E920E}" destId="{0F705934-E6D1-499E-BDAA-C0A62992660D}" srcOrd="0" destOrd="0" presId="urn:microsoft.com/office/officeart/2005/8/layout/process1"/>
     <dgm:cxn modelId="{49A56BD7-86C7-4645-8591-9DFD38178B6A}" type="presParOf" srcId="{52A5986A-80EF-452F-B163-4F651F6E920E}" destId="{FDB0FADC-49BB-4433-94F6-73BAE60CC01B}" srcOrd="1" destOrd="0" presId="urn:microsoft.com/office/officeart/2005/8/layout/process1"/>
     <dgm:cxn modelId="{74459F2E-3A2E-4AE9-B678-DD30F1D9840D}" type="presParOf" srcId="{FDB0FADC-49BB-4433-94F6-73BAE60CC01B}" destId="{C70AAC22-CD4D-442E-9F76-A785E86CF564}" srcOrd="0" destOrd="0" presId="urn:microsoft.com/office/officeart/2005/8/layout/process1"/>
@@ -6748,7 +6750,7 @@
           <a:p>
             <a:fld id="{D6647FDC-F259-4A4D-B5F5-E5558F96794B}" type="datetimeFigureOut">
               <a:rPr lang="en-US" smtClean="0"/>
-              <a:t>02-Nov-15</a:t>
+              <a:t>03-Nov-15</a:t>
             </a:fld>
             <a:endParaRPr lang="en-US"/>
           </a:p>
@@ -8721,6 +8723,85 @@
               <a:rPr lang="en-US" baseline="0" dirty="0" err="1" smtClean="0"/>
               <a:t>resultados</a:t>
             </a:r>
+            <a:endParaRPr lang="en-US" baseline="0" dirty="0" smtClean="0"/>
+          </a:p>
+          <a:p>
+            <a:pPr marL="171450" indent="-171450">
+              <a:buFontTx/>
+              <a:buChar char="-"/>
+            </a:pPr>
+            <a:r>
+              <a:rPr lang="en-US" baseline="0" dirty="0" smtClean="0"/>
+              <a:t>O ultimo </a:t>
+            </a:r>
+            <a:r>
+              <a:rPr lang="en-US" baseline="0" dirty="0" err="1" smtClean="0"/>
+              <a:t>operador</a:t>
+            </a:r>
+            <a:r>
+              <a:rPr lang="en-US" baseline="0" dirty="0" smtClean="0"/>
+              <a:t> </a:t>
+            </a:r>
+            <a:r>
+              <a:rPr lang="en-US" baseline="0" dirty="0" err="1" smtClean="0"/>
+              <a:t>foi</a:t>
+            </a:r>
+            <a:r>
+              <a:rPr lang="en-US" baseline="0" dirty="0" smtClean="0"/>
+              <a:t> </a:t>
+            </a:r>
+            <a:r>
+              <a:rPr lang="en-US" baseline="0" dirty="0" err="1" smtClean="0"/>
+              <a:t>implementado</a:t>
+            </a:r>
+            <a:r>
+              <a:rPr lang="en-US" baseline="0" dirty="0" smtClean="0"/>
+              <a:t> mas </a:t>
+            </a:r>
+            <a:r>
+              <a:rPr lang="en-US" baseline="0" dirty="0" err="1" smtClean="0"/>
+              <a:t>não</a:t>
+            </a:r>
+            <a:r>
+              <a:rPr lang="en-US" baseline="0" dirty="0" smtClean="0"/>
+              <a:t> </a:t>
+            </a:r>
+            <a:r>
+              <a:rPr lang="en-US" baseline="0" dirty="0" err="1" smtClean="0"/>
+              <a:t>foi</a:t>
+            </a:r>
+            <a:r>
+              <a:rPr lang="en-US" baseline="0" dirty="0" smtClean="0"/>
+              <a:t> </a:t>
+            </a:r>
+            <a:r>
+              <a:rPr lang="en-US" baseline="0" dirty="0" err="1" smtClean="0"/>
+              <a:t>usado</a:t>
+            </a:r>
+            <a:r>
+              <a:rPr lang="en-US" baseline="0" dirty="0" smtClean="0"/>
+              <a:t> – </a:t>
+            </a:r>
+            <a:r>
+              <a:rPr lang="en-US" baseline="0" dirty="0" err="1" smtClean="0"/>
+              <a:t>Explicar</a:t>
+            </a:r>
+            <a:r>
+              <a:rPr lang="en-US" baseline="0" dirty="0" smtClean="0"/>
+              <a:t> </a:t>
+            </a:r>
+            <a:r>
+              <a:rPr lang="en-US" baseline="0" dirty="0" err="1" smtClean="0"/>
+              <a:t>os</a:t>
+            </a:r>
+            <a:r>
+              <a:rPr lang="en-US" baseline="0" dirty="0" smtClean="0"/>
+              <a:t> testes </a:t>
+            </a:r>
+            <a:r>
+              <a:rPr lang="en-US" baseline="0" dirty="0" err="1" smtClean="0"/>
+              <a:t>feitos</a:t>
+            </a:r>
             <a:endParaRPr lang="en-US" dirty="0"/>
           </a:p>
         </p:txBody>
@@ -8910,7 +8991,7 @@
           <a:p>
             <a:fld id="{CA0BDD92-BDD1-41DE-BD7E-1F5A3B95E66B}" type="slidenum">
               <a:rPr lang="en-US" smtClean="0"/>
-              <a:t>21</a:t>
+              <a:t>23</a:t>
             </a:fld>
             <a:endParaRPr lang="en-US"/>
           </a:p>
@@ -9114,7 +9195,7 @@
           <a:p>
             <a:fld id="{CA0BDD92-BDD1-41DE-BD7E-1F5A3B95E66B}" type="slidenum">
               <a:rPr lang="en-US" smtClean="0"/>
-              <a:t>22</a:t>
+              <a:t>24</a:t>
             </a:fld>
             <a:endParaRPr lang="en-US"/>
           </a:p>
@@ -9515,7 +9596,7 @@
           <a:p>
             <a:fld id="{CA0BDD92-BDD1-41DE-BD7E-1F5A3B95E66B}" type="slidenum">
               <a:rPr lang="en-US" smtClean="0"/>
-              <a:t>25</a:t>
+              <a:t>27</a:t>
             </a:fld>
             <a:endParaRPr lang="en-US"/>
           </a:p>
@@ -10842,7 +10923,7 @@
           <a:p>
             <a:fld id="{DEC0C222-1897-4DCE-AD4E-1C2D23F222B2}" type="datetime1">
               <a:rPr lang="en-US" smtClean="0"/>
-              <a:t>02-Nov-15</a:t>
+              <a:t>03-Nov-15</a:t>
             </a:fld>
             <a:endParaRPr lang="en-US" dirty="0"/>
           </a:p>
@@ -11045,7 +11126,7 @@
           <a:p>
             <a:fld id="{83B33049-48DA-48C7-905F-AFA84CCF358A}" type="datetime1">
               <a:rPr lang="en-US" smtClean="0"/>
-              <a:t>02-Nov-15</a:t>
+              <a:t>03-Nov-15</a:t>
             </a:fld>
             <a:endParaRPr lang="en-US" dirty="0"/>
           </a:p>
@@ -11296,7 +11377,7 @@
           <a:p>
             <a:fld id="{DFA83854-2080-4526-8728-B16635428175}" type="datetime1">
               <a:rPr lang="en-US" smtClean="0"/>
-              <a:t>02-Nov-15</a:t>
+              <a:t>03-Nov-15</a:t>
             </a:fld>
             <a:endParaRPr lang="en-US" dirty="0"/>
           </a:p>
@@ -11461,7 +11542,7 @@
           <a:p>
             <a:fld id="{A4A5A1A0-1AF9-4436-9543-0DB5EAF61DDB}" type="datetime1">
               <a:rPr lang="en-US" smtClean="0"/>
-              <a:t>02-Nov-15</a:t>
+              <a:t>03-Nov-15</a:t>
             </a:fld>
             <a:endParaRPr lang="en-US" dirty="0"/>
           </a:p>
@@ -11799,7 +11880,7 @@
           <a:p>
             <a:fld id="{F1E36FFC-B415-40E6-BC3F-20E5229F7B68}" type="datetime1">
               <a:rPr lang="en-US" smtClean="0"/>
-              <a:t>02-Nov-15</a:t>
+              <a:t>03-Nov-15</a:t>
             </a:fld>
             <a:endParaRPr lang="en-US" dirty="0"/>
           </a:p>
@@ -12069,7 +12150,7 @@
           <a:p>
             <a:fld id="{03C74DB2-5A2F-472B-9AC3-3BF4FCAC99CF}" type="datetime1">
               <a:rPr lang="en-US" smtClean="0"/>
-              <a:t>02-Nov-15</a:t>
+              <a:t>03-Nov-15</a:t>
             </a:fld>
             <a:endParaRPr lang="en-US" dirty="0"/>
           </a:p>
@@ -12443,7 +12524,7 @@
           <a:p>
             <a:fld id="{F8C5D5B0-65F2-499A-935A-357B7BD717E0}" type="datetime1">
               <a:rPr lang="en-US" smtClean="0"/>
-              <a:t>02-Nov-15</a:t>
+              <a:t>03-Nov-15</a:t>
             </a:fld>
             <a:endParaRPr lang="en-US" dirty="0"/>
           </a:p>
@@ -12556,7 +12637,7 @@
           <a:p>
             <a:fld id="{3AE2A76F-927E-4759-A393-009A14A08F3A}" type="datetime1">
               <a:rPr lang="en-US" smtClean="0"/>
-              <a:t>02-Nov-15</a:t>
+              <a:t>03-Nov-15</a:t>
             </a:fld>
             <a:endParaRPr lang="en-US" dirty="0"/>
           </a:p>
@@ -12722,7 +12803,7 @@
           <a:p>
             <a:fld id="{A18B15E5-7704-471B-81DC-E3AF275B315A}" type="datetime1">
               <a:rPr lang="en-US" smtClean="0"/>
-              <a:t>02-Nov-15</a:t>
+              <a:t>03-Nov-15</a:t>
             </a:fld>
             <a:endParaRPr lang="en-US" dirty="0"/>
           </a:p>
@@ -13072,7 +13153,7 @@
           <a:p>
             <a:fld id="{C2293B35-5E03-4B1C-9DCC-43CD3213BB26}" type="datetime1">
               <a:rPr lang="en-US" smtClean="0"/>
-              <a:t>02-Nov-15</a:t>
+              <a:t>03-Nov-15</a:t>
             </a:fld>
             <a:endParaRPr lang="en-US" dirty="0"/>
           </a:p>
@@ -13445,7 +13526,7 @@
           <a:p>
             <a:fld id="{57920374-59D4-478E-A1F1-6B0E4A240505}" type="datetime1">
               <a:rPr lang="en-US" smtClean="0"/>
-              <a:t>02-Nov-15</a:t>
+              <a:t>03-Nov-15</a:t>
             </a:fld>
             <a:endParaRPr lang="en-US" dirty="0"/>
           </a:p>
@@ -13727,7 +13808,7 @@
           <a:p>
             <a:fld id="{E8C0E2E8-83F9-43B1-8D6E-C17C1061DBD1}" type="datetime1">
               <a:rPr lang="en-US" smtClean="0"/>
-              <a:t>02-Nov-15</a:t>
+              <a:t>03-Nov-15</a:t>
             </a:fld>
             <a:endParaRPr lang="en-US" dirty="0"/>
           </a:p>
@@ -14273,23 +14354,58 @@
             <a:pPr algn="ctr"/>
             <a:r>
               <a:rPr lang="en-US" sz="5400" dirty="0" smtClean="0"/>
-              <a:t>Examination Timetabling Automation using Hybrid Meta-heuristics</a:t>
+              <a:t>Examination Timetabling Automation using Hybrid </a:t>
+            </a:r>
+            <a:r>
+              <a:rPr lang="en-US" sz="5400" dirty="0" smtClean="0"/>
+              <a:t>Meta-heuristics</a:t>
             </a:r>
             <a:br>
               <a:rPr lang="en-US" sz="5400" dirty="0" smtClean="0"/>
             </a:br>
             <a:r>
-              <a:rPr lang="en-US" sz="5400" dirty="0"/>
+              <a:rPr lang="en-US" sz="5400" dirty="0" smtClean="0"/>
               <a:t/>
             </a:r>
             <a:br>
-              <a:rPr lang="en-US" sz="5400" dirty="0"/>
+              <a:rPr lang="en-US" sz="5400" dirty="0" smtClean="0"/>
             </a:br>
             <a:r>
-              <a:rPr lang="en-US" sz="4800" dirty="0" smtClean="0"/>
-              <a:t>2014/2015</a:t>
-            </a:r>
-            <a:endParaRPr lang="en-US" sz="5400" dirty="0"/>
+              <a:rPr lang="en-US" sz="3200" dirty="0" err="1" smtClean="0"/>
+              <a:t>Trabalho</a:t>
+            </a:r>
+            <a:r>
+              <a:rPr lang="en-US" sz="3200" dirty="0" smtClean="0"/>
+              <a:t> de </a:t>
+            </a:r>
+            <a:r>
+              <a:rPr lang="en-US" sz="3200" dirty="0" err="1" smtClean="0"/>
+              <a:t>projeto</a:t>
+            </a:r>
+            <a:r>
+              <a:rPr lang="en-US" sz="3200" dirty="0"/>
+              <a:t/>
+            </a:r>
+            <a:br>
+              <a:rPr lang="en-US" sz="3200" dirty="0"/>
+            </a:br>
+            <a:r>
+              <a:rPr lang="en-US" sz="3200" dirty="0" err="1" smtClean="0"/>
+              <a:t>Ano</a:t>
+            </a:r>
+            <a:r>
+              <a:rPr lang="en-US" sz="3200" dirty="0" smtClean="0"/>
+              <a:t> </a:t>
+            </a:r>
+            <a:r>
+              <a:rPr lang="en-US" sz="3200" dirty="0" err="1" smtClean="0"/>
+              <a:t>letivo</a:t>
+            </a:r>
+            <a:r>
+              <a:rPr lang="en-US" sz="3200" dirty="0" smtClean="0"/>
+              <a:t> 2014/2015</a:t>
+            </a:r>
+            <a:endParaRPr lang="en-US" sz="3200" dirty="0"/>
           </a:p>
         </p:txBody>
       </p:sp>
@@ -14367,21 +14483,8 @@
                   <a:schemeClr val="tx1"/>
                 </a:solidFill>
               </a:rPr>
-              <a:t> Ferreira						</a:t>
-            </a:r>
-            <a:r>
-              <a:rPr lang="en-US" dirty="0" smtClean="0">
-                <a:solidFill>
-                  <a:schemeClr val="tx1"/>
-                </a:solidFill>
-              </a:rPr>
-              <a:t>02/11</a:t>
-            </a:r>
-            <a:endParaRPr lang="en-US" dirty="0" smtClean="0">
-              <a:solidFill>
-                <a:schemeClr val="tx1"/>
-              </a:solidFill>
-            </a:endParaRPr>
+              <a:t> Ferreira						02/11</a:t>
+            </a:r>
           </a:p>
           <a:p>
             <a:r>
@@ -14922,11 +15025,11 @@
   <p:clrMapOvr>
     <a:masterClrMapping/>
   </p:clrMapOvr>
-  <mc:AlternateContent xmlns:mc="http://schemas.openxmlformats.org/markup-compatibility/2006">
-    <mc:Choice xmlns:p14="http://schemas.microsoft.com/office/powerpoint/2010/main" Requires="p14">
+  <mc:AlternateContent xmlns:mc="http://schemas.openxmlformats.org/markup-compatibility/2006" xmlns:p14="http://schemas.microsoft.com/office/powerpoint/2010/main">
+    <mc:Choice Requires="p14">
       <p:transition spd="slow" p14:dur="2000"/>
     </mc:Choice>
-    <mc:Fallback>
+    <mc:Fallback xmlns="">
       <p:transition spd="slow"/>
     </mc:Fallback>
   </mc:AlternateContent>
@@ -16734,7 +16837,7 @@
             <a:r>
               <a:rPr lang="en-US" dirty="0" smtClean="0">
                 <a:solidFill>
-                  <a:srgbClr val="FF0000"/>
+                  <a:schemeClr val="tx1"/>
                 </a:solidFill>
               </a:rPr>
               <a:t>acceptance criterion</a:t>
@@ -16841,8 +16944,8 @@
         </p:blipFill>
         <p:spPr>
           <a:xfrm>
-            <a:off x="5620910" y="2225821"/>
-            <a:ext cx="2853671" cy="443798"/>
+            <a:off x="5791639" y="2225821"/>
+            <a:ext cx="2512213" cy="443798"/>
           </a:xfrm>
           <a:prstGeom prst="rect">
             <a:avLst/>
@@ -16969,130 +17072,9 @@
           <a:chExt cx="0" cy="0"/>
         </a:xfrm>
       </p:grpSpPr>
-      <p:sp>
-        <p:nvSpPr>
-          <p:cNvPr id="2" name="Title 1"/>
-          <p:cNvSpPr>
-            <a:spLocks noGrp="1"/>
-          </p:cNvSpPr>
-          <p:nvPr>
-            <p:ph type="title"/>
-          </p:nvPr>
-        </p:nvSpPr>
-        <p:spPr/>
-        <p:txBody>
-          <a:bodyPr/>
-          <a:lstStyle/>
-          <a:p>
-            <a:r>
-              <a:rPr lang="en-US" dirty="0"/>
-              <a:t>Simulated Annealing </a:t>
-            </a:r>
-            <a:r>
-              <a:rPr lang="en-US" dirty="0" smtClean="0"/>
-              <a:t>(2/2)</a:t>
-            </a:r>
-            <a:endParaRPr lang="en-US" dirty="0"/>
-          </a:p>
-        </p:txBody>
-      </p:sp>
-      <p:sp>
-        <p:nvSpPr>
-          <p:cNvPr id="3" name="Content Placeholder 2"/>
-          <p:cNvSpPr>
-            <a:spLocks noGrp="1"/>
-          </p:cNvSpPr>
-          <p:nvPr>
-            <p:ph idx="1"/>
-          </p:nvPr>
-        </p:nvSpPr>
-        <p:spPr/>
-        <p:txBody>
-          <a:bodyPr/>
-          <a:lstStyle/>
-          <a:p>
-            <a:r>
-              <a:rPr lang="en-US" sz="2800" dirty="0" smtClean="0"/>
-              <a:t>Parameters : </a:t>
-            </a:r>
-            <a:r>
-              <a:rPr lang="en-US" sz="2800" dirty="0" err="1" smtClean="0"/>
-              <a:t>TMax</a:t>
-            </a:r>
-            <a:r>
-              <a:rPr lang="en-US" sz="2800" dirty="0" smtClean="0"/>
-              <a:t> </a:t>
-            </a:r>
-            <a:r>
-              <a:rPr lang="en-US" sz="2800" dirty="0"/>
-              <a:t>= 45, </a:t>
-            </a:r>
-            <a:r>
-              <a:rPr lang="en-US" sz="2800" dirty="0" err="1"/>
-              <a:t>TMin</a:t>
-            </a:r>
-            <a:r>
-              <a:rPr lang="en-US" sz="2800" dirty="0"/>
-              <a:t> = </a:t>
-            </a:r>
-            <a:r>
-              <a:rPr lang="en-US" sz="2800" i="1" dirty="0" smtClean="0"/>
-              <a:t>e</a:t>
-            </a:r>
-            <a:r>
-              <a:rPr lang="en-US" sz="2800" baseline="30000" dirty="0" smtClean="0"/>
-              <a:t>−18</a:t>
-            </a:r>
-            <a:r>
-              <a:rPr lang="en-US" sz="2800" dirty="0" smtClean="0"/>
-              <a:t>, loops </a:t>
-            </a:r>
-            <a:r>
-              <a:rPr lang="en-US" sz="2800" dirty="0"/>
-              <a:t>= 5 and rate = </a:t>
-            </a:r>
-            <a:r>
-              <a:rPr lang="en-US" sz="2800" dirty="0" smtClean="0"/>
-              <a:t>0.01</a:t>
-            </a:r>
-          </a:p>
-          <a:p>
-            <a:r>
-              <a:rPr lang="en-US" sz="2800" dirty="0" smtClean="0"/>
-              <a:t>Results:</a:t>
-            </a:r>
-          </a:p>
-          <a:p>
-            <a:endParaRPr lang="en-US" dirty="0"/>
-          </a:p>
-        </p:txBody>
-      </p:sp>
-      <p:sp>
-        <p:nvSpPr>
-          <p:cNvPr id="5" name="Slide Number Placeholder 4"/>
-          <p:cNvSpPr>
-            <a:spLocks noGrp="1"/>
-          </p:cNvSpPr>
-          <p:nvPr>
-            <p:ph type="sldNum" sz="quarter" idx="12"/>
-          </p:nvPr>
-        </p:nvSpPr>
-        <p:spPr/>
-        <p:txBody>
-          <a:bodyPr/>
-          <a:lstStyle/>
-          <a:p>
-            <a:fld id="{4CE482DC-2269-4F26-9D2A-7E44B1A4CD85}" type="slidenum">
-              <a:rPr lang="en-US" smtClean="0"/>
-              <a:t>18</a:t>
-            </a:fld>
-            <a:endParaRPr lang="en-US" dirty="0"/>
-          </a:p>
-        </p:txBody>
-      </p:sp>
       <p:pic>
         <p:nvPicPr>
-          <p:cNvPr id="6" name="Picture 5"/>
+          <p:cNvPr id="4" name="Picture 3"/>
           <p:cNvPicPr>
             <a:picLocks noChangeAspect="1"/>
           </p:cNvPicPr>
@@ -17112,14 +17094,151 @@
         </p:blipFill>
         <p:spPr>
           <a:xfrm>
-            <a:off x="3605904" y="2379605"/>
-            <a:ext cx="4958976" cy="3861858"/>
+            <a:off x="3707433" y="2207282"/>
+            <a:ext cx="4643469" cy="4129723"/>
           </a:xfrm>
           <a:prstGeom prst="rect">
             <a:avLst/>
           </a:prstGeom>
         </p:spPr>
       </p:pic>
+      <p:sp>
+        <p:nvSpPr>
+          <p:cNvPr id="2" name="Title 1"/>
+          <p:cNvSpPr>
+            <a:spLocks noGrp="1"/>
+          </p:cNvSpPr>
+          <p:nvPr>
+            <p:ph type="title"/>
+          </p:nvPr>
+        </p:nvSpPr>
+        <p:spPr/>
+        <p:txBody>
+          <a:bodyPr/>
+          <a:lstStyle/>
+          <a:p>
+            <a:r>
+              <a:rPr lang="en-US" dirty="0"/>
+              <a:t>Simulated Annealing </a:t>
+            </a:r>
+            <a:r>
+              <a:rPr lang="en-US" dirty="0" smtClean="0"/>
+              <a:t>(2/2)</a:t>
+            </a:r>
+            <a:endParaRPr lang="en-US" dirty="0"/>
+          </a:p>
+        </p:txBody>
+      </p:sp>
+      <p:sp>
+        <p:nvSpPr>
+          <p:cNvPr id="3" name="Content Placeholder 2"/>
+          <p:cNvSpPr>
+            <a:spLocks noGrp="1"/>
+          </p:cNvSpPr>
+          <p:nvPr>
+            <p:ph idx="1"/>
+          </p:nvPr>
+        </p:nvSpPr>
+        <p:spPr/>
+        <p:txBody>
+          <a:bodyPr/>
+          <a:lstStyle/>
+          <a:p>
+            <a:r>
+              <a:rPr lang="en-US" sz="2800" dirty="0" smtClean="0"/>
+              <a:t>Parameters : </a:t>
+            </a:r>
+            <a:r>
+              <a:rPr lang="en-US" sz="2800" dirty="0" err="1" smtClean="0"/>
+              <a:t>TMax</a:t>
+            </a:r>
+            <a:r>
+              <a:rPr lang="en-US" sz="2800" dirty="0" smtClean="0"/>
+              <a:t> </a:t>
+            </a:r>
+            <a:r>
+              <a:rPr lang="en-US" sz="2800" dirty="0"/>
+              <a:t>= </a:t>
+            </a:r>
+            <a:r>
+              <a:rPr lang="en-US" sz="2800" dirty="0" smtClean="0"/>
+              <a:t>0.1, </a:t>
+            </a:r>
+            <a:r>
+              <a:rPr lang="en-US" sz="2800" dirty="0" err="1"/>
+              <a:t>TMin</a:t>
+            </a:r>
+            <a:r>
+              <a:rPr lang="en-US" sz="2800" dirty="0"/>
+              <a:t> = </a:t>
+            </a:r>
+            <a:r>
+              <a:rPr lang="en-US" sz="2800" dirty="0" smtClean="0"/>
+              <a:t>1</a:t>
+            </a:r>
+            <a:r>
+              <a:rPr lang="en-US" sz="2800" i="1" dirty="0" smtClean="0"/>
+              <a:t>e</a:t>
+            </a:r>
+            <a:r>
+              <a:rPr lang="en-US" sz="2800" dirty="0" smtClean="0"/>
+              <a:t>-06, </a:t>
+            </a:r>
+            <a:r>
+              <a:rPr lang="en-US" sz="2800" dirty="0" smtClean="0"/>
+              <a:t>loops </a:t>
+            </a:r>
+            <a:r>
+              <a:rPr lang="en-US" sz="2800" dirty="0"/>
+              <a:t>= 5 and rate = </a:t>
+            </a:r>
+            <a:r>
+              <a:rPr lang="en-US" sz="2800" dirty="0" smtClean="0"/>
+              <a:t>16</a:t>
+            </a:r>
+            <a:r>
+              <a:rPr lang="en-US" sz="2800" i="1" dirty="0" smtClean="0"/>
+              <a:t>e</a:t>
+            </a:r>
+            <a:r>
+              <a:rPr lang="en-US" sz="2800" dirty="0" smtClean="0"/>
+              <a:t>-5</a:t>
+            </a:r>
+          </a:p>
+          <a:p>
+            <a:r>
+              <a:rPr lang="en-US" sz="2800" dirty="0" smtClean="0"/>
+              <a:t>Results:</a:t>
+            </a:r>
+          </a:p>
+          <a:p>
+            <a:endParaRPr lang="en-US" dirty="0"/>
+          </a:p>
+        </p:txBody>
+      </p:sp>
+      <p:sp>
+        <p:nvSpPr>
+          <p:cNvPr id="5" name="Slide Number Placeholder 4"/>
+          <p:cNvSpPr>
+            <a:spLocks noGrp="1"/>
+          </p:cNvSpPr>
+          <p:nvPr>
+            <p:ph type="sldNum" sz="quarter" idx="12"/>
+          </p:nvPr>
+        </p:nvSpPr>
+        <p:spPr/>
+        <p:txBody>
+          <a:bodyPr/>
+          <a:lstStyle/>
+          <a:p>
+            <a:fld id="{4CE482DC-2269-4F26-9D2A-7E44B1A4CD85}" type="slidenum">
+              <a:rPr lang="en-US" smtClean="0"/>
+              <a:t>18</a:t>
+            </a:fld>
+            <a:endParaRPr lang="en-US" dirty="0"/>
+          </a:p>
+        </p:txBody>
+      </p:sp>
     </p:spTree>
     <p:extLst>
       <p:ext uri="{BB962C8B-B14F-4D97-AF65-F5344CB8AC3E}">
@@ -17645,8 +17764,13 @@
             </a:pPr>
             <a:r>
               <a:rPr lang="en-US" sz="2800" dirty="0" smtClean="0"/>
-              <a:t> The neighborhood operators are randomly chosen to be used:</a:t>
-            </a:r>
+              <a:t> The </a:t>
+            </a:r>
+            <a:r>
+              <a:rPr lang="en-US" sz="2800" dirty="0" smtClean="0"/>
+              <a:t>implemented neighborhood operators:</a:t>
+            </a:r>
+            <a:endParaRPr lang="en-US" sz="2800" dirty="0" smtClean="0"/>
           </a:p>
           <a:p>
             <a:pPr lvl="1">
@@ -17788,7 +17912,7 @@
           <a:p>
             <a:r>
               <a:rPr lang="en-US" dirty="0" smtClean="0"/>
-              <a:t>Experimental Results (1/2)</a:t>
+              <a:t>Fitness computation</a:t>
             </a:r>
             <a:endParaRPr lang="en-US" dirty="0"/>
           </a:p>
@@ -17806,138 +17930,10 @@
         </p:nvSpPr>
         <p:spPr/>
         <p:txBody>
-          <a:bodyPr>
-            <a:normAutofit/>
-          </a:bodyPr>
+          <a:bodyPr/>
           <a:lstStyle/>
           <a:p>
-            <a:pPr>
-              <a:buFont typeface="Arial" panose="020B0604020202020204" pitchFamily="34" charset="0"/>
-              <a:buChar char="•"/>
-            </a:pPr>
-            <a:r>
-              <a:rPr lang="en-US" sz="2800" dirty="0" smtClean="0"/>
-              <a:t> The results were obtained by averaging </a:t>
-            </a:r>
-            <a:r>
-              <a:rPr lang="en-US" sz="2800" dirty="0" smtClean="0">
-                <a:solidFill>
-                  <a:srgbClr val="404040"/>
-                </a:solidFill>
-              </a:rPr>
-              <a:t>10 runs for each dataset</a:t>
-            </a:r>
-          </a:p>
-          <a:p>
-            <a:pPr>
-              <a:buFont typeface="Arial" panose="020B0604020202020204" pitchFamily="34" charset="0"/>
-              <a:buChar char="•"/>
-            </a:pPr>
-            <a:r>
-              <a:rPr lang="en-US" sz="2800" dirty="0">
-                <a:solidFill>
-                  <a:srgbClr val="404040"/>
-                </a:solidFill>
-              </a:rPr>
-              <a:t> The </a:t>
-            </a:r>
-            <a:r>
-              <a:rPr lang="en-US" sz="2800" dirty="0" smtClean="0">
-                <a:solidFill>
-                  <a:srgbClr val="404040"/>
-                </a:solidFill>
-              </a:rPr>
-              <a:t>SA parameters were:</a:t>
-            </a:r>
-          </a:p>
-          <a:p>
-            <a:pPr lvl="1">
-              <a:buFont typeface="Arial" panose="020B0604020202020204" pitchFamily="34" charset="0"/>
-              <a:buChar char="•"/>
-            </a:pPr>
-            <a:r>
-              <a:rPr lang="en-US" sz="2800" dirty="0" err="1" smtClean="0"/>
-              <a:t>TMax</a:t>
-            </a:r>
-            <a:r>
-              <a:rPr lang="en-US" sz="2800" dirty="0" smtClean="0"/>
-              <a:t> </a:t>
-            </a:r>
-            <a:r>
-              <a:rPr lang="en-US" sz="2800" dirty="0"/>
-              <a:t>= </a:t>
-            </a:r>
-            <a:r>
-              <a:rPr lang="en-US" sz="2800" dirty="0" smtClean="0"/>
-              <a:t>0.01</a:t>
-            </a:r>
-          </a:p>
-          <a:p>
-            <a:pPr lvl="1">
-              <a:buFont typeface="Arial" panose="020B0604020202020204" pitchFamily="34" charset="0"/>
-              <a:buChar char="•"/>
-            </a:pPr>
-            <a:r>
-              <a:rPr lang="en-US" sz="2800" dirty="0" err="1" smtClean="0"/>
-              <a:t>TMin</a:t>
-            </a:r>
-            <a:r>
-              <a:rPr lang="en-US" sz="2800" dirty="0" smtClean="0"/>
-              <a:t> </a:t>
-            </a:r>
-            <a:r>
-              <a:rPr lang="en-US" sz="2800" dirty="0"/>
-              <a:t>= </a:t>
-            </a:r>
-            <a:r>
-              <a:rPr lang="en-US" sz="2800" dirty="0" smtClean="0"/>
-              <a:t>1</a:t>
-            </a:r>
-            <a:r>
-              <a:rPr lang="en-US" sz="2800" i="1" dirty="0" smtClean="0"/>
-              <a:t>e</a:t>
-            </a:r>
-            <a:r>
-              <a:rPr lang="en-US" sz="2800" baseline="30000" dirty="0" smtClean="0"/>
-              <a:t>-18</a:t>
-            </a:r>
-          </a:p>
-          <a:p>
-            <a:pPr lvl="1">
-              <a:buFont typeface="Arial" panose="020B0604020202020204" pitchFamily="34" charset="0"/>
-              <a:buChar char="•"/>
-            </a:pPr>
-            <a:r>
-              <a:rPr lang="en-US" sz="2800" dirty="0" smtClean="0"/>
-              <a:t>reps </a:t>
-            </a:r>
-            <a:r>
-              <a:rPr lang="en-US" sz="2800" dirty="0"/>
-              <a:t>= </a:t>
-            </a:r>
-            <a:r>
-              <a:rPr lang="en-US" sz="2800" dirty="0" smtClean="0"/>
-              <a:t>5</a:t>
-            </a:r>
-          </a:p>
-          <a:p>
-            <a:pPr lvl="1">
-              <a:buFont typeface="Arial" panose="020B0604020202020204" pitchFamily="34" charset="0"/>
-              <a:buChar char="•"/>
-            </a:pPr>
-            <a:r>
-              <a:rPr lang="en-US" sz="2800" dirty="0" smtClean="0"/>
-              <a:t>rate </a:t>
-            </a:r>
-            <a:r>
-              <a:rPr lang="en-US" sz="2800" dirty="0"/>
-              <a:t>= </a:t>
-            </a:r>
-            <a:r>
-              <a:rPr lang="en-US" sz="2800" dirty="0" smtClean="0"/>
-              <a:t>0.001</a:t>
-            </a:r>
-            <a:endParaRPr lang="en-US" sz="2800" dirty="0"/>
+            <a:endParaRPr lang="en-US"/>
           </a:p>
         </p:txBody>
       </p:sp>
@@ -17967,20 +17963,13 @@
     </p:spTree>
     <p:extLst>
       <p:ext uri="{BB962C8B-B14F-4D97-AF65-F5344CB8AC3E}">
-        <p14:creationId xmlns:p14="http://schemas.microsoft.com/office/powerpoint/2010/main" val="638605249"/>
+        <p14:creationId xmlns:p14="http://schemas.microsoft.com/office/powerpoint/2010/main" val="2926821547"/>
       </p:ext>
     </p:extLst>
   </p:cSld>
   <p:clrMapOvr>
     <a:masterClrMapping/>
   </p:clrMapOvr>
-  <p:timing>
-    <p:tnLst>
-      <p:par>
-        <p:cTn id="1" dur="indefinite" restart="never" nodeType="tmRoot"/>
-      </p:par>
-    </p:tnLst>
-  </p:timing>
 </p:sld>
 </file>
 
@@ -18017,52 +18006,35 @@
           <a:lstStyle/>
           <a:p>
             <a:r>
-              <a:rPr lang="en-US" dirty="0"/>
-              <a:t>Experimental Results </a:t>
-            </a:r>
-            <a:r>
               <a:rPr lang="en-US" dirty="0" smtClean="0"/>
-              <a:t>(2/2</a:t>
-            </a:r>
-            <a:r>
-              <a:rPr lang="en-US" dirty="0"/>
-              <a:t>)</a:t>
-            </a:r>
+              <a:t>Rate computation</a:t>
+            </a:r>
+            <a:endParaRPr lang="en-US" dirty="0"/>
           </a:p>
         </p:txBody>
       </p:sp>
-      <p:pic>
-        <p:nvPicPr>
-          <p:cNvPr id="4" name="Content Placeholder 3"/>
-          <p:cNvPicPr>
-            <a:picLocks noGrp="1" noChangeAspect="1"/>
-          </p:cNvPicPr>
+      <p:sp>
+        <p:nvSpPr>
+          <p:cNvPr id="3" name="Content Placeholder 2"/>
+          <p:cNvSpPr>
+            <a:spLocks noGrp="1"/>
+          </p:cNvSpPr>
           <p:nvPr>
             <p:ph idx="1"/>
           </p:nvPr>
-        </p:nvPicPr>
-        <p:blipFill>
-          <a:blip r:embed="rId3">
-            <a:extLst>
-              <a:ext uri="{28A0092B-C50C-407E-A947-70E740481C1C}">
-                <a14:useLocalDpi xmlns:a14="http://schemas.microsoft.com/office/drawing/2010/main" val="0"/>
-              </a:ext>
-            </a:extLst>
-          </a:blip>
-          <a:stretch>
-            <a:fillRect/>
-          </a:stretch>
-        </p:blipFill>
-        <p:spPr>
-          <a:xfrm>
-            <a:off x="2283197" y="1846263"/>
-            <a:ext cx="7685931" cy="4022725"/>
-          </a:xfrm>
-        </p:spPr>
-      </p:pic>
-      <p:sp>
-        <p:nvSpPr>
-          <p:cNvPr id="3" name="Slide Number Placeholder 2"/>
+        </p:nvSpPr>
+        <p:spPr/>
+        <p:txBody>
+          <a:bodyPr/>
+          <a:lstStyle/>
+          <a:p>
+            <a:endParaRPr lang="en-US"/>
+          </a:p>
+        </p:txBody>
+      </p:sp>
+      <p:sp>
+        <p:nvSpPr>
+          <p:cNvPr id="4" name="Slide Number Placeholder 3"/>
           <p:cNvSpPr>
             <a:spLocks noGrp="1"/>
           </p:cNvSpPr>
@@ -18086,20 +18058,13 @@
     </p:spTree>
     <p:extLst>
       <p:ext uri="{BB962C8B-B14F-4D97-AF65-F5344CB8AC3E}">
-        <p14:creationId xmlns:p14="http://schemas.microsoft.com/office/powerpoint/2010/main" val="1011109935"/>
+        <p14:creationId xmlns:p14="http://schemas.microsoft.com/office/powerpoint/2010/main" val="2945096823"/>
       </p:ext>
     </p:extLst>
   </p:cSld>
   <p:clrMapOvr>
     <a:masterClrMapping/>
   </p:clrMapOvr>
-  <p:timing>
-    <p:tnLst>
-      <p:par>
-        <p:cTn id="1" dur="indefinite" restart="never" nodeType="tmRoot"/>
-      </p:par>
-    </p:tnLst>
-  </p:timing>
 </p:sld>
 </file>
 
@@ -18136,18 +18101,10 @@
           <a:lstStyle/>
           <a:p>
             <a:r>
-              <a:rPr lang="en-US" dirty="0" smtClean="0">
-                <a:solidFill>
-                  <a:srgbClr val="404040"/>
-                </a:solidFill>
-              </a:rPr>
-              <a:t>Conclusions</a:t>
-            </a:r>
-            <a:endParaRPr lang="en-US" dirty="0">
-              <a:solidFill>
-                <a:srgbClr val="404040"/>
-              </a:solidFill>
-            </a:endParaRPr>
+              <a:rPr lang="en-US" dirty="0" smtClean="0"/>
+              <a:t>Experimental Results (1/2)</a:t>
+            </a:r>
+            <a:endParaRPr lang="en-US" dirty="0"/>
           </a:p>
         </p:txBody>
       </p:sp>
@@ -18174,7 +18131,37 @@
             </a:pPr>
             <a:r>
               <a:rPr lang="en-US" sz="2800" dirty="0" smtClean="0"/>
-              <a:t> A program was developed to generate timetables following ITC2007 rules, using heuristics:</a:t>
+              <a:t> The results were obtained by averaging </a:t>
+            </a:r>
+            <a:r>
+              <a:rPr lang="en-US" sz="2800" dirty="0" smtClean="0">
+                <a:solidFill>
+                  <a:srgbClr val="404040"/>
+                </a:solidFill>
+              </a:rPr>
+              <a:t>10 runs for each dataset</a:t>
+            </a:r>
+          </a:p>
+          <a:p>
+            <a:pPr>
+              <a:buFont typeface="Arial" panose="020B0604020202020204" pitchFamily="34" charset="0"/>
+              <a:buChar char="•"/>
+            </a:pPr>
+            <a:r>
+              <a:rPr lang="en-US" sz="2800" dirty="0">
+                <a:solidFill>
+                  <a:srgbClr val="404040"/>
+                </a:solidFill>
+              </a:rPr>
+              <a:t> The </a:t>
+            </a:r>
+            <a:r>
+              <a:rPr lang="en-US" sz="2800" dirty="0" smtClean="0">
+                <a:solidFill>
+                  <a:srgbClr val="404040"/>
+                </a:solidFill>
+              </a:rPr>
+              <a:t>SA parameters were:</a:t>
             </a:r>
           </a:p>
           <a:p>
@@ -18182,7 +18169,23 @@
               <a:buFont typeface="Arial" panose="020B0604020202020204" pitchFamily="34" charset="0"/>
               <a:buChar char="•"/>
             </a:pPr>
-            <a:endParaRPr lang="en-US" sz="2600" dirty="0" smtClean="0"/>
+            <a:r>
+              <a:rPr lang="en-US" sz="2800" dirty="0" err="1" smtClean="0"/>
+              <a:t>TMax</a:t>
+            </a:r>
+            <a:r>
+              <a:rPr lang="en-US" sz="2800" dirty="0" smtClean="0"/>
+              <a:t> </a:t>
+            </a:r>
+            <a:r>
+              <a:rPr lang="en-US" sz="2800" dirty="0"/>
+              <a:t>= </a:t>
+            </a:r>
+            <a:r>
+              <a:rPr lang="en-US" sz="2800" dirty="0" smtClean="0"/>
+              <a:t>0.1</a:t>
+            </a:r>
+            <a:endParaRPr lang="en-US" sz="2800" dirty="0" smtClean="0"/>
           </a:p>
           <a:p>
             <a:pPr lvl="1">
@@ -18190,16 +18193,48 @@
               <a:buChar char="•"/>
             </a:pPr>
             <a:r>
-              <a:rPr lang="en-US" sz="2600" dirty="0" smtClean="0"/>
-              <a:t> Graph Coloring heuristic was developed to obtained a feasible solution</a:t>
-            </a:r>
+              <a:rPr lang="en-US" sz="2800" dirty="0" err="1" smtClean="0"/>
+              <a:t>TMin</a:t>
+            </a:r>
+            <a:r>
+              <a:rPr lang="en-US" sz="2800" dirty="0" smtClean="0"/>
+              <a:t> </a:t>
+            </a:r>
+            <a:r>
+              <a:rPr lang="en-US" sz="2800" dirty="0"/>
+              <a:t>= </a:t>
+            </a:r>
+            <a:r>
+              <a:rPr lang="en-US" sz="2800" dirty="0" smtClean="0"/>
+              <a:t>1</a:t>
+            </a:r>
+            <a:r>
+              <a:rPr lang="en-US" sz="2800" i="1" dirty="0" smtClean="0"/>
+              <a:t>e</a:t>
+            </a:r>
+            <a:r>
+              <a:rPr lang="en-US" sz="2800" dirty="0" smtClean="0"/>
+              <a:t>-06</a:t>
+            </a:r>
+            <a:endParaRPr lang="en-US" sz="2800" baseline="30000" dirty="0" smtClean="0"/>
           </a:p>
           <a:p>
             <a:pPr lvl="1">
               <a:buFont typeface="Arial" panose="020B0604020202020204" pitchFamily="34" charset="0"/>
               <a:buChar char="•"/>
             </a:pPr>
-            <a:endParaRPr lang="en-US" sz="2600" dirty="0" smtClean="0"/>
+            <a:r>
+              <a:rPr lang="en-US" sz="2800" dirty="0" smtClean="0"/>
+              <a:t>reps </a:t>
+            </a:r>
+            <a:r>
+              <a:rPr lang="en-US" sz="2800" dirty="0"/>
+              <a:t>= </a:t>
+            </a:r>
+            <a:r>
+              <a:rPr lang="en-US" sz="2800" dirty="0" smtClean="0"/>
+              <a:t>5</a:t>
+            </a:r>
           </a:p>
           <a:p>
             <a:pPr lvl="1">
@@ -18207,31 +18242,18 @@
               <a:buChar char="•"/>
             </a:pPr>
             <a:r>
-              <a:rPr lang="en-US" sz="2600" dirty="0" smtClean="0"/>
-              <a:t> Simulated Annealing and Hill Climbing meta-heuristics were </a:t>
-            </a:r>
-            <a:r>
-              <a:rPr lang="en-US" sz="2600" dirty="0"/>
-              <a:t>developed </a:t>
-            </a:r>
-            <a:r>
-              <a:rPr lang="en-US" sz="2600" dirty="0" smtClean="0"/>
-              <a:t>to improve the initial feasible solution</a:t>
-            </a:r>
-          </a:p>
-          <a:p>
-            <a:pPr lvl="1">
-              <a:buFont typeface="Arial" panose="020B0604020202020204" pitchFamily="34" charset="0"/>
-              <a:buChar char="•"/>
-            </a:pPr>
-            <a:endParaRPr lang="en-US" sz="2600" dirty="0"/>
-          </a:p>
-          <a:p>
-            <a:pPr>
-              <a:buFont typeface="Arial" panose="020B0604020202020204" pitchFamily="34" charset="0"/>
-              <a:buChar char="•"/>
-            </a:pPr>
-            <a:endParaRPr lang="en-US" sz="2800" dirty="0"/>
+              <a:rPr lang="en-US" sz="2800" dirty="0" smtClean="0"/>
+              <a:t>rate </a:t>
+            </a:r>
+            <a:r>
+              <a:rPr lang="en-US" sz="2800" dirty="0"/>
+              <a:t>= </a:t>
+            </a:r>
+            <a:r>
+              <a:rPr lang="en-US" sz="2800" i="1" dirty="0" smtClean="0"/>
+              <a:t>computed automatically</a:t>
+            </a:r>
+            <a:endParaRPr lang="en-US" sz="2800" i="1" dirty="0"/>
           </a:p>
         </p:txBody>
       </p:sp>
@@ -18261,7 +18283,7 @@
     </p:spTree>
     <p:extLst>
       <p:ext uri="{BB962C8B-B14F-4D97-AF65-F5344CB8AC3E}">
-        <p14:creationId xmlns:p14="http://schemas.microsoft.com/office/powerpoint/2010/main" val="2898168243"/>
+        <p14:creationId xmlns:p14="http://schemas.microsoft.com/office/powerpoint/2010/main" val="638605249"/>
       </p:ext>
     </p:extLst>
   </p:cSld>
@@ -18311,141 +18333,52 @@
           <a:lstStyle/>
           <a:p>
             <a:r>
-              <a:rPr lang="en-US" dirty="0" smtClean="0">
-                <a:solidFill>
-                  <a:srgbClr val="404040"/>
-                </a:solidFill>
-              </a:rPr>
-              <a:t>Tools and Techniques</a:t>
-            </a:r>
-            <a:endParaRPr lang="en-US" dirty="0">
-              <a:solidFill>
-                <a:srgbClr val="404040"/>
-              </a:solidFill>
-            </a:endParaRPr>
+              <a:rPr lang="en-US" dirty="0"/>
+              <a:t>Experimental Results </a:t>
+            </a:r>
+            <a:r>
+              <a:rPr lang="en-US" dirty="0" smtClean="0"/>
+              <a:t>(2/2</a:t>
+            </a:r>
+            <a:r>
+              <a:rPr lang="en-US" dirty="0"/>
+              <a:t>)</a:t>
+            </a:r>
           </a:p>
         </p:txBody>
       </p:sp>
-      <p:sp>
-        <p:nvSpPr>
-          <p:cNvPr id="3" name="Content Placeholder 2"/>
-          <p:cNvSpPr>
-            <a:spLocks noGrp="1"/>
-          </p:cNvSpPr>
+      <p:pic>
+        <p:nvPicPr>
+          <p:cNvPr id="4" name="Content Placeholder 3"/>
+          <p:cNvPicPr>
+            <a:picLocks noGrp="1" noChangeAspect="1"/>
+          </p:cNvPicPr>
           <p:nvPr>
             <p:ph idx="1"/>
           </p:nvPr>
-        </p:nvSpPr>
-        <p:spPr/>
-        <p:txBody>
-          <a:bodyPr/>
-          <a:lstStyle/>
-          <a:p>
-            <a:pPr>
-              <a:buFont typeface="Arial" panose="020B0604020202020204" pitchFamily="34" charset="0"/>
-              <a:buChar char="•"/>
-            </a:pPr>
-            <a:r>
-              <a:rPr lang="en-US" sz="2800" dirty="0" smtClean="0">
-                <a:solidFill>
-                  <a:srgbClr val="404040"/>
-                </a:solidFill>
-              </a:rPr>
-              <a:t> Developed </a:t>
-            </a:r>
-            <a:r>
-              <a:rPr lang="en-US" sz="2800" smtClean="0">
-                <a:solidFill>
-                  <a:srgbClr val="404040"/>
-                </a:solidFill>
-              </a:rPr>
-              <a:t>using .NET </a:t>
-            </a:r>
-            <a:endParaRPr lang="en-US" sz="2800" dirty="0" smtClean="0">
-              <a:solidFill>
-                <a:srgbClr val="404040"/>
-              </a:solidFill>
-            </a:endParaRPr>
-          </a:p>
-          <a:p>
-            <a:pPr>
-              <a:buFont typeface="Arial" panose="020B0604020202020204" pitchFamily="34" charset="0"/>
-              <a:buChar char="•"/>
-            </a:pPr>
-            <a:r>
-              <a:rPr lang="en-US" sz="2800" dirty="0">
-                <a:solidFill>
-                  <a:srgbClr val="404040"/>
-                </a:solidFill>
-              </a:rPr>
-              <a:t> </a:t>
-            </a:r>
-            <a:r>
-              <a:rPr lang="en-US" sz="2800" dirty="0" smtClean="0">
-                <a:solidFill>
-                  <a:srgbClr val="404040"/>
-                </a:solidFill>
-              </a:rPr>
-              <a:t>C# Programming Language</a:t>
-            </a:r>
-          </a:p>
-          <a:p>
-            <a:pPr>
-              <a:buFont typeface="Arial" panose="020B0604020202020204" pitchFamily="34" charset="0"/>
-              <a:buChar char="•"/>
-            </a:pPr>
-            <a:r>
-              <a:rPr lang="en-US" sz="2800" dirty="0" smtClean="0">
-                <a:solidFill>
-                  <a:srgbClr val="404040"/>
-                </a:solidFill>
-              </a:rPr>
-              <a:t> Visual Studio 2013 was used as the development tool </a:t>
-            </a:r>
-          </a:p>
-          <a:p>
-            <a:pPr>
-              <a:buFont typeface="Arial" panose="020B0604020202020204" pitchFamily="34" charset="0"/>
-              <a:buChar char="•"/>
-            </a:pPr>
-            <a:r>
-              <a:rPr lang="en-US" sz="2800" dirty="0">
-                <a:solidFill>
-                  <a:srgbClr val="404040"/>
-                </a:solidFill>
-              </a:rPr>
-              <a:t> </a:t>
-            </a:r>
-            <a:r>
-              <a:rPr lang="en-US" sz="2800" dirty="0" smtClean="0">
-                <a:solidFill>
-                  <a:srgbClr val="404040"/>
-                </a:solidFill>
-              </a:rPr>
-              <a:t>The </a:t>
-            </a:r>
-            <a:r>
-              <a:rPr lang="en-US" sz="2800" dirty="0" err="1" smtClean="0">
-                <a:solidFill>
-                  <a:srgbClr val="404040"/>
-                </a:solidFill>
-              </a:rPr>
-              <a:t>Resharper</a:t>
-            </a:r>
-            <a:r>
-              <a:rPr lang="en-US" sz="2800" dirty="0" smtClean="0">
-                <a:solidFill>
-                  <a:srgbClr val="404040"/>
-                </a:solidFill>
-              </a:rPr>
-              <a:t> extension was also used</a:t>
-            </a:r>
-          </a:p>
-        </p:txBody>
-      </p:sp>
-      <p:sp>
-        <p:nvSpPr>
-          <p:cNvPr id="4" name="Slide Number Placeholder 3"/>
+        </p:nvPicPr>
+        <p:blipFill>
+          <a:blip r:embed="rId3">
+            <a:extLst>
+              <a:ext uri="{28A0092B-C50C-407E-A947-70E740481C1C}">
+                <a14:useLocalDpi xmlns:a14="http://schemas.microsoft.com/office/drawing/2010/main" val="0"/>
+              </a:ext>
+            </a:extLst>
+          </a:blip>
+          <a:stretch>
+            <a:fillRect/>
+          </a:stretch>
+        </p:blipFill>
+        <p:spPr>
+          <a:xfrm>
+            <a:off x="2283197" y="1846263"/>
+            <a:ext cx="7685931" cy="4022725"/>
+          </a:xfrm>
+        </p:spPr>
+      </p:pic>
+      <p:sp>
+        <p:nvSpPr>
+          <p:cNvPr id="3" name="Slide Number Placeholder 2"/>
           <p:cNvSpPr>
             <a:spLocks noGrp="1"/>
           </p:cNvSpPr>
@@ -18466,10 +18399,40 @@
           </a:p>
         </p:txBody>
       </p:sp>
+      <p:pic>
+        <p:nvPicPr>
+          <p:cNvPr id="5" name="Picture 4"/>
+          <p:cNvPicPr>
+            <a:picLocks noChangeAspect="1"/>
+          </p:cNvPicPr>
+          <p:nvPr/>
+        </p:nvPicPr>
+        <p:blipFill>
+          <a:blip r:embed="rId4">
+            <a:extLst>
+              <a:ext uri="{28A0092B-C50C-407E-A947-70E740481C1C}">
+                <a14:useLocalDpi xmlns:a14="http://schemas.microsoft.com/office/drawing/2010/main" val="0"/>
+              </a:ext>
+            </a:extLst>
+          </a:blip>
+          <a:stretch>
+            <a:fillRect/>
+          </a:stretch>
+        </p:blipFill>
+        <p:spPr>
+          <a:xfrm>
+            <a:off x="2103587" y="1846263"/>
+            <a:ext cx="8452883" cy="4015483"/>
+          </a:xfrm>
+          <a:prstGeom prst="rect">
+            <a:avLst/>
+          </a:prstGeom>
+        </p:spPr>
+      </p:pic>
     </p:spTree>
     <p:extLst>
       <p:ext uri="{BB962C8B-B14F-4D97-AF65-F5344CB8AC3E}">
-        <p14:creationId xmlns:p14="http://schemas.microsoft.com/office/powerpoint/2010/main" val="3624811191"/>
+        <p14:creationId xmlns:p14="http://schemas.microsoft.com/office/powerpoint/2010/main" val="1011109935"/>
       </p:ext>
     </p:extLst>
   </p:cSld>
@@ -18487,7 +18450,7 @@
 </file>
 
 <file path=ppt/slides/slide25.xml><?xml version="1.0" encoding="utf-8"?>
-<p:sld xmlns:a="http://schemas.openxmlformats.org/drawingml/2006/main" xmlns:r="http://schemas.openxmlformats.org/officeDocument/2006/relationships" xmlns:p="http://schemas.openxmlformats.org/presentationml/2006/main" show="0">
+<p:sld xmlns:a="http://schemas.openxmlformats.org/drawingml/2006/main" xmlns:r="http://schemas.openxmlformats.org/officeDocument/2006/relationships" xmlns:p="http://schemas.openxmlformats.org/presentationml/2006/main">
   <p:cSld>
     <p:spTree>
       <p:nvGrpSpPr>
@@ -18524,23 +18487,7 @@
                   <a:srgbClr val="404040"/>
                 </a:solidFill>
               </a:rPr>
-              <a:t>Ongoing </a:t>
-            </a:r>
-            <a:r>
-              <a:rPr lang="en-US" dirty="0">
-                <a:solidFill>
-                  <a:srgbClr val="404040"/>
-                </a:solidFill>
-              </a:rPr>
-              <a:t>W</a:t>
-            </a:r>
-            <a:r>
-              <a:rPr lang="en-US" dirty="0" smtClean="0">
-                <a:solidFill>
-                  <a:srgbClr val="404040"/>
-                </a:solidFill>
-              </a:rPr>
-              <a:t>ork</a:t>
+              <a:t>Conclusions</a:t>
             </a:r>
             <a:endParaRPr lang="en-US" dirty="0">
               <a:solidFill>
@@ -18572,96 +18519,65 @@
               <a:buChar char="•"/>
             </a:pPr>
             <a:r>
-              <a:rPr lang="en-US" sz="2800" dirty="0" smtClean="0">
-                <a:solidFill>
-                  <a:srgbClr val="404040"/>
-                </a:solidFill>
-              </a:rPr>
-              <a:t> Project’s progress is about 70%</a:t>
-            </a:r>
+              <a:rPr lang="en-US" sz="2800" dirty="0" smtClean="0"/>
+              <a:t> A program was developed to generate timetables following ITC2007 rules, using heuristics:</a:t>
+            </a:r>
+          </a:p>
+          <a:p>
+            <a:pPr lvl="1">
+              <a:buFont typeface="Arial" panose="020B0604020202020204" pitchFamily="34" charset="0"/>
+              <a:buChar char="•"/>
+            </a:pPr>
+            <a:endParaRPr lang="en-US" sz="2600" dirty="0" smtClean="0"/>
+          </a:p>
+          <a:p>
+            <a:pPr lvl="1">
+              <a:buFont typeface="Arial" panose="020B0604020202020204" pitchFamily="34" charset="0"/>
+              <a:buChar char="•"/>
+            </a:pPr>
+            <a:r>
+              <a:rPr lang="en-US" sz="2600" dirty="0" smtClean="0"/>
+              <a:t> Graph Coloring heuristic was developed to obtained a feasible solution</a:t>
+            </a:r>
+          </a:p>
+          <a:p>
+            <a:pPr lvl="1">
+              <a:buFont typeface="Arial" panose="020B0604020202020204" pitchFamily="34" charset="0"/>
+              <a:buChar char="•"/>
+            </a:pPr>
+            <a:endParaRPr lang="en-US" sz="2600" dirty="0" smtClean="0"/>
+          </a:p>
+          <a:p>
+            <a:pPr lvl="1">
+              <a:buFont typeface="Arial" panose="020B0604020202020204" pitchFamily="34" charset="0"/>
+              <a:buChar char="•"/>
+            </a:pPr>
+            <a:r>
+              <a:rPr lang="en-US" sz="2600" dirty="0" smtClean="0"/>
+              <a:t> Simulated Annealing and Hill Climbing meta-heuristics were </a:t>
+            </a:r>
+            <a:r>
+              <a:rPr lang="en-US" sz="2600" dirty="0"/>
+              <a:t>developed </a:t>
+            </a:r>
+            <a:r>
+              <a:rPr lang="en-US" sz="2600" dirty="0" smtClean="0"/>
+              <a:t>to improve the initial feasible solution</a:t>
+            </a:r>
+          </a:p>
+          <a:p>
+            <a:pPr lvl="1">
+              <a:buFont typeface="Arial" panose="020B0604020202020204" pitchFamily="34" charset="0"/>
+              <a:buChar char="•"/>
+            </a:pPr>
+            <a:endParaRPr lang="en-US" sz="2600" dirty="0"/>
           </a:p>
           <a:p>
             <a:pPr>
               <a:buFont typeface="Arial" panose="020B0604020202020204" pitchFamily="34" charset="0"/>
               <a:buChar char="•"/>
             </a:pPr>
-            <a:r>
-              <a:rPr lang="en-US" sz="2800" dirty="0">
-                <a:solidFill>
-                  <a:srgbClr val="404040"/>
-                </a:solidFill>
-              </a:rPr>
-              <a:t> </a:t>
-            </a:r>
-            <a:r>
-              <a:rPr lang="en-US" sz="2800" dirty="0" smtClean="0">
-                <a:solidFill>
-                  <a:srgbClr val="404040"/>
-                </a:solidFill>
-              </a:rPr>
-              <a:t>The remainder will be carried out for the final phase:</a:t>
-            </a:r>
-          </a:p>
-          <a:p>
-            <a:pPr lvl="1">
-              <a:buFont typeface="Arial" panose="020B0604020202020204" pitchFamily="34" charset="0"/>
-              <a:buChar char="•"/>
-            </a:pPr>
-            <a:r>
-              <a:rPr lang="en-US" sz="2600" dirty="0" smtClean="0">
-                <a:solidFill>
-                  <a:srgbClr val="404040"/>
-                </a:solidFill>
-              </a:rPr>
-              <a:t>Performance improvement of the existing features</a:t>
-            </a:r>
-          </a:p>
-          <a:p>
-            <a:pPr lvl="1">
-              <a:buFont typeface="Arial" panose="020B0604020202020204" pitchFamily="34" charset="0"/>
-              <a:buChar char="•"/>
-            </a:pPr>
-            <a:r>
-              <a:rPr lang="en-US" sz="2600" dirty="0" smtClean="0">
-                <a:solidFill>
-                  <a:srgbClr val="404040"/>
-                </a:solidFill>
-              </a:rPr>
-              <a:t>Implementation of a new approach using a Genetic Algorithm</a:t>
-            </a:r>
-          </a:p>
-          <a:p>
-            <a:pPr lvl="1">
-              <a:buFont typeface="Arial" panose="020B0604020202020204" pitchFamily="34" charset="0"/>
-              <a:buChar char="•"/>
-            </a:pPr>
-            <a:r>
-              <a:rPr lang="en-US" sz="2600" dirty="0" smtClean="0">
-                <a:solidFill>
-                  <a:srgbClr val="404040"/>
-                </a:solidFill>
-              </a:rPr>
-              <a:t>Comparison against the five ITC2007 winners and with the previous approach</a:t>
-            </a:r>
-          </a:p>
-          <a:p>
-            <a:pPr lvl="1">
-              <a:buFont typeface="Arial" panose="020B0604020202020204" pitchFamily="34" charset="0"/>
-              <a:buChar char="•"/>
-            </a:pPr>
-            <a:r>
-              <a:rPr lang="en-US" sz="2600" dirty="0" smtClean="0">
-                <a:solidFill>
-                  <a:srgbClr val="404040"/>
-                </a:solidFill>
-              </a:rPr>
-              <a:t>Implementation of a GUI to demonstrate the final solution (optional)</a:t>
-            </a:r>
-            <a:endParaRPr lang="en-US" sz="2600" dirty="0">
-              <a:solidFill>
-                <a:srgbClr val="404040"/>
-              </a:solidFill>
-            </a:endParaRPr>
+            <a:endParaRPr lang="en-US" sz="2800" dirty="0"/>
           </a:p>
         </p:txBody>
       </p:sp>
@@ -18691,21 +18607,13 @@
     </p:spTree>
     <p:extLst>
       <p:ext uri="{BB962C8B-B14F-4D97-AF65-F5344CB8AC3E}">
-        <p14:creationId xmlns:p14="http://schemas.microsoft.com/office/powerpoint/2010/main" val="1386184146"/>
+        <p14:creationId xmlns:p14="http://schemas.microsoft.com/office/powerpoint/2010/main" val="2898168243"/>
       </p:ext>
     </p:extLst>
   </p:cSld>
   <p:clrMapOvr>
     <a:masterClrMapping/>
   </p:clrMapOvr>
-  <mc:AlternateContent xmlns:mc="http://schemas.openxmlformats.org/markup-compatibility/2006">
-    <mc:Choice xmlns:p14="http://schemas.microsoft.com/office/powerpoint/2010/main" Requires="p14">
-      <p:transition spd="slow" p14:dur="2000"/>
-    </mc:Choice>
-    <mc:Fallback>
-      <p:transition spd="slow"/>
-    </mc:Fallback>
-  </mc:AlternateContent>
   <p:timing>
     <p:tnLst>
       <p:par>
@@ -18748,12 +18656,243 @@
           <a:bodyPr/>
           <a:lstStyle/>
           <a:p>
-            <a:pPr algn="ctr"/>
-            <a:r>
-              <a:rPr lang="en-US" dirty="0" smtClean="0"/>
-              <a:t>The End</a:t>
-            </a:r>
+            <a:r>
+              <a:rPr lang="en-US" dirty="0" smtClean="0">
+                <a:solidFill>
+                  <a:srgbClr val="404040"/>
+                </a:solidFill>
+              </a:rPr>
+              <a:t>Tools and Techniques</a:t>
+            </a:r>
+            <a:endParaRPr lang="en-US" dirty="0">
+              <a:solidFill>
+                <a:srgbClr val="404040"/>
+              </a:solidFill>
+            </a:endParaRPr>
+          </a:p>
+        </p:txBody>
+      </p:sp>
+      <p:sp>
+        <p:nvSpPr>
+          <p:cNvPr id="3" name="Content Placeholder 2"/>
+          <p:cNvSpPr>
+            <a:spLocks noGrp="1"/>
+          </p:cNvSpPr>
+          <p:nvPr>
+            <p:ph idx="1"/>
+          </p:nvPr>
+        </p:nvSpPr>
+        <p:spPr/>
+        <p:txBody>
+          <a:bodyPr/>
+          <a:lstStyle/>
+          <a:p>
+            <a:pPr>
+              <a:buFont typeface="Arial" panose="020B0604020202020204" pitchFamily="34" charset="0"/>
+              <a:buChar char="•"/>
+            </a:pPr>
+            <a:r>
+              <a:rPr lang="en-US" sz="2800" dirty="0" smtClean="0">
+                <a:solidFill>
+                  <a:srgbClr val="404040"/>
+                </a:solidFill>
+              </a:rPr>
+              <a:t> Developed </a:t>
+            </a:r>
+            <a:r>
+              <a:rPr lang="en-US" sz="2800" smtClean="0">
+                <a:solidFill>
+                  <a:srgbClr val="404040"/>
+                </a:solidFill>
+              </a:rPr>
+              <a:t>using .NET </a:t>
+            </a:r>
+            <a:endParaRPr lang="en-US" sz="2800" dirty="0" smtClean="0">
+              <a:solidFill>
+                <a:srgbClr val="404040"/>
+              </a:solidFill>
+            </a:endParaRPr>
+          </a:p>
+          <a:p>
+            <a:pPr>
+              <a:buFont typeface="Arial" panose="020B0604020202020204" pitchFamily="34" charset="0"/>
+              <a:buChar char="•"/>
+            </a:pPr>
+            <a:r>
+              <a:rPr lang="en-US" sz="2800" dirty="0">
+                <a:solidFill>
+                  <a:srgbClr val="404040"/>
+                </a:solidFill>
+              </a:rPr>
+              <a:t> </a:t>
+            </a:r>
+            <a:r>
+              <a:rPr lang="en-US" sz="2800" dirty="0" smtClean="0">
+                <a:solidFill>
+                  <a:srgbClr val="404040"/>
+                </a:solidFill>
+              </a:rPr>
+              <a:t>C# Programming Language</a:t>
+            </a:r>
+          </a:p>
+          <a:p>
+            <a:pPr>
+              <a:buFont typeface="Arial" panose="020B0604020202020204" pitchFamily="34" charset="0"/>
+              <a:buChar char="•"/>
+            </a:pPr>
+            <a:r>
+              <a:rPr lang="en-US" sz="2800" dirty="0" smtClean="0">
+                <a:solidFill>
+                  <a:srgbClr val="404040"/>
+                </a:solidFill>
+              </a:rPr>
+              <a:t> Visual Studio 2013 was used as the development tool </a:t>
+            </a:r>
+          </a:p>
+          <a:p>
+            <a:pPr>
+              <a:buFont typeface="Arial" panose="020B0604020202020204" pitchFamily="34" charset="0"/>
+              <a:buChar char="•"/>
+            </a:pPr>
+            <a:r>
+              <a:rPr lang="en-US" sz="2800" dirty="0">
+                <a:solidFill>
+                  <a:srgbClr val="404040"/>
+                </a:solidFill>
+              </a:rPr>
+              <a:t> </a:t>
+            </a:r>
+            <a:r>
+              <a:rPr lang="en-US" sz="2800" dirty="0" smtClean="0">
+                <a:solidFill>
+                  <a:srgbClr val="404040"/>
+                </a:solidFill>
+              </a:rPr>
+              <a:t>The </a:t>
+            </a:r>
+            <a:r>
+              <a:rPr lang="en-US" sz="2800" dirty="0" err="1" smtClean="0">
+                <a:solidFill>
+                  <a:srgbClr val="404040"/>
+                </a:solidFill>
+              </a:rPr>
+              <a:t>Resharper</a:t>
+            </a:r>
+            <a:r>
+              <a:rPr lang="en-US" sz="2800" dirty="0" smtClean="0">
+                <a:solidFill>
+                  <a:srgbClr val="404040"/>
+                </a:solidFill>
+              </a:rPr>
+              <a:t> extension was also used</a:t>
+            </a:r>
+          </a:p>
+        </p:txBody>
+      </p:sp>
+      <p:sp>
+        <p:nvSpPr>
+          <p:cNvPr id="4" name="Slide Number Placeholder 3"/>
+          <p:cNvSpPr>
+            <a:spLocks noGrp="1"/>
+          </p:cNvSpPr>
+          <p:nvPr>
+            <p:ph type="sldNum" sz="quarter" idx="12"/>
+          </p:nvPr>
+        </p:nvSpPr>
+        <p:spPr/>
+        <p:txBody>
+          <a:bodyPr/>
+          <a:lstStyle/>
+          <a:p>
+            <a:fld id="{4CE482DC-2269-4F26-9D2A-7E44B1A4CD85}" type="slidenum">
+              <a:rPr lang="en-US" smtClean="0"/>
+              <a:t>26</a:t>
+            </a:fld>
             <a:endParaRPr lang="en-US" dirty="0"/>
+          </a:p>
+        </p:txBody>
+      </p:sp>
+    </p:spTree>
+    <p:extLst>
+      <p:ext uri="{BB962C8B-B14F-4D97-AF65-F5344CB8AC3E}">
+        <p14:creationId xmlns:p14="http://schemas.microsoft.com/office/powerpoint/2010/main" val="3624811191"/>
+      </p:ext>
+    </p:extLst>
+  </p:cSld>
+  <p:clrMapOvr>
+    <a:masterClrMapping/>
+  </p:clrMapOvr>
+  <p:timing>
+    <p:tnLst>
+      <p:par>
+        <p:cTn id="1" dur="indefinite" restart="never" nodeType="tmRoot"/>
+      </p:par>
+    </p:tnLst>
+  </p:timing>
+</p:sld>
+</file>
+
+<file path=ppt/slides/slide27.xml><?xml version="1.0" encoding="utf-8"?>
+<p:sld xmlns:a="http://schemas.openxmlformats.org/drawingml/2006/main" xmlns:r="http://schemas.openxmlformats.org/officeDocument/2006/relationships" xmlns:p="http://schemas.openxmlformats.org/presentationml/2006/main" show="0">
+  <p:cSld>
+    <p:spTree>
+      <p:nvGrpSpPr>
+        <p:cNvPr id="1" name=""/>
+        <p:cNvGrpSpPr/>
+        <p:nvPr/>
+      </p:nvGrpSpPr>
+      <p:grpSpPr>
+        <a:xfrm>
+          <a:off x="0" y="0"/>
+          <a:ext cx="0" cy="0"/>
+          <a:chOff x="0" y="0"/>
+          <a:chExt cx="0" cy="0"/>
+        </a:xfrm>
+      </p:grpSpPr>
+      <p:sp>
+        <p:nvSpPr>
+          <p:cNvPr id="2" name="Title 1"/>
+          <p:cNvSpPr>
+            <a:spLocks noGrp="1"/>
+          </p:cNvSpPr>
+          <p:nvPr>
+            <p:ph type="title"/>
+          </p:nvPr>
+        </p:nvSpPr>
+        <p:spPr/>
+        <p:txBody>
+          <a:bodyPr/>
+          <a:lstStyle/>
+          <a:p>
+            <a:r>
+              <a:rPr lang="en-US" dirty="0" smtClean="0">
+                <a:solidFill>
+                  <a:srgbClr val="404040"/>
+                </a:solidFill>
+              </a:rPr>
+              <a:t>Ongoing </a:t>
+            </a:r>
+            <a:r>
+              <a:rPr lang="en-US" dirty="0">
+                <a:solidFill>
+                  <a:srgbClr val="404040"/>
+                </a:solidFill>
+              </a:rPr>
+              <a:t>W</a:t>
+            </a:r>
+            <a:r>
+              <a:rPr lang="en-US" dirty="0" smtClean="0">
+                <a:solidFill>
+                  <a:srgbClr val="404040"/>
+                </a:solidFill>
+              </a:rPr>
+              <a:t>ork</a:t>
+            </a:r>
+            <a:endParaRPr lang="en-US" dirty="0">
+              <a:solidFill>
+                <a:srgbClr val="404040"/>
+              </a:solidFill>
+            </a:endParaRPr>
           </a:p>
         </p:txBody>
       </p:sp>
@@ -18774,6 +18913,213 @@
           </a:bodyPr>
           <a:lstStyle/>
           <a:p>
+            <a:pPr>
+              <a:buFont typeface="Arial" panose="020B0604020202020204" pitchFamily="34" charset="0"/>
+              <a:buChar char="•"/>
+            </a:pPr>
+            <a:r>
+              <a:rPr lang="en-US" sz="2800" dirty="0" smtClean="0">
+                <a:solidFill>
+                  <a:srgbClr val="404040"/>
+                </a:solidFill>
+              </a:rPr>
+              <a:t> Project’s progress is about 70%</a:t>
+            </a:r>
+          </a:p>
+          <a:p>
+            <a:pPr>
+              <a:buFont typeface="Arial" panose="020B0604020202020204" pitchFamily="34" charset="0"/>
+              <a:buChar char="•"/>
+            </a:pPr>
+            <a:r>
+              <a:rPr lang="en-US" sz="2800" dirty="0">
+                <a:solidFill>
+                  <a:srgbClr val="404040"/>
+                </a:solidFill>
+              </a:rPr>
+              <a:t> </a:t>
+            </a:r>
+            <a:r>
+              <a:rPr lang="en-US" sz="2800" dirty="0" smtClean="0">
+                <a:solidFill>
+                  <a:srgbClr val="404040"/>
+                </a:solidFill>
+              </a:rPr>
+              <a:t>The remainder will be carried out for the final phase:</a:t>
+            </a:r>
+          </a:p>
+          <a:p>
+            <a:pPr lvl="1">
+              <a:buFont typeface="Arial" panose="020B0604020202020204" pitchFamily="34" charset="0"/>
+              <a:buChar char="•"/>
+            </a:pPr>
+            <a:r>
+              <a:rPr lang="en-US" sz="2600" dirty="0" smtClean="0">
+                <a:solidFill>
+                  <a:srgbClr val="404040"/>
+                </a:solidFill>
+              </a:rPr>
+              <a:t>Performance improvement of the existing features</a:t>
+            </a:r>
+          </a:p>
+          <a:p>
+            <a:pPr lvl="1">
+              <a:buFont typeface="Arial" panose="020B0604020202020204" pitchFamily="34" charset="0"/>
+              <a:buChar char="•"/>
+            </a:pPr>
+            <a:r>
+              <a:rPr lang="en-US" sz="2600" dirty="0" smtClean="0">
+                <a:solidFill>
+                  <a:srgbClr val="404040"/>
+                </a:solidFill>
+              </a:rPr>
+              <a:t>Implementation of a new approach using a Genetic Algorithm</a:t>
+            </a:r>
+          </a:p>
+          <a:p>
+            <a:pPr lvl="1">
+              <a:buFont typeface="Arial" panose="020B0604020202020204" pitchFamily="34" charset="0"/>
+              <a:buChar char="•"/>
+            </a:pPr>
+            <a:r>
+              <a:rPr lang="en-US" sz="2600" dirty="0" smtClean="0">
+                <a:solidFill>
+                  <a:srgbClr val="404040"/>
+                </a:solidFill>
+              </a:rPr>
+              <a:t>Comparison against the five ITC2007 winners and with the previous approach</a:t>
+            </a:r>
+          </a:p>
+          <a:p>
+            <a:pPr lvl="1">
+              <a:buFont typeface="Arial" panose="020B0604020202020204" pitchFamily="34" charset="0"/>
+              <a:buChar char="•"/>
+            </a:pPr>
+            <a:r>
+              <a:rPr lang="en-US" sz="2600" dirty="0" smtClean="0">
+                <a:solidFill>
+                  <a:srgbClr val="404040"/>
+                </a:solidFill>
+              </a:rPr>
+              <a:t>Implementation of a GUI to demonstrate the final solution (optional)</a:t>
+            </a:r>
+            <a:endParaRPr lang="en-US" sz="2600" dirty="0">
+              <a:solidFill>
+                <a:srgbClr val="404040"/>
+              </a:solidFill>
+            </a:endParaRPr>
+          </a:p>
+        </p:txBody>
+      </p:sp>
+      <p:sp>
+        <p:nvSpPr>
+          <p:cNvPr id="4" name="Slide Number Placeholder 3"/>
+          <p:cNvSpPr>
+            <a:spLocks noGrp="1"/>
+          </p:cNvSpPr>
+          <p:nvPr>
+            <p:ph type="sldNum" sz="quarter" idx="12"/>
+          </p:nvPr>
+        </p:nvSpPr>
+        <p:spPr/>
+        <p:txBody>
+          <a:bodyPr/>
+          <a:lstStyle/>
+          <a:p>
+            <a:fld id="{4CE482DC-2269-4F26-9D2A-7E44B1A4CD85}" type="slidenum">
+              <a:rPr lang="en-US" smtClean="0"/>
+              <a:t>27</a:t>
+            </a:fld>
+            <a:endParaRPr lang="en-US" dirty="0"/>
+          </a:p>
+        </p:txBody>
+      </p:sp>
+    </p:spTree>
+    <p:extLst>
+      <p:ext uri="{BB962C8B-B14F-4D97-AF65-F5344CB8AC3E}">
+        <p14:creationId xmlns:p14="http://schemas.microsoft.com/office/powerpoint/2010/main" val="1386184146"/>
+      </p:ext>
+    </p:extLst>
+  </p:cSld>
+  <p:clrMapOvr>
+    <a:masterClrMapping/>
+  </p:clrMapOvr>
+  <mc:AlternateContent xmlns:mc="http://schemas.openxmlformats.org/markup-compatibility/2006" xmlns:p14="http://schemas.microsoft.com/office/powerpoint/2010/main">
+    <mc:Choice Requires="p14">
+      <p:transition spd="slow" p14:dur="2000"/>
+    </mc:Choice>
+    <mc:Fallback xmlns="">
+      <p:transition spd="slow"/>
+    </mc:Fallback>
+  </mc:AlternateContent>
+  <p:timing>
+    <p:tnLst>
+      <p:par>
+        <p:cTn id="1" dur="indefinite" restart="never" nodeType="tmRoot"/>
+      </p:par>
+    </p:tnLst>
+  </p:timing>
+</p:sld>
+</file>
+
+<file path=ppt/slides/slide28.xml><?xml version="1.0" encoding="utf-8"?>
+<p:sld xmlns:a="http://schemas.openxmlformats.org/drawingml/2006/main" xmlns:r="http://schemas.openxmlformats.org/officeDocument/2006/relationships" xmlns:p="http://schemas.openxmlformats.org/presentationml/2006/main">
+  <p:cSld>
+    <p:spTree>
+      <p:nvGrpSpPr>
+        <p:cNvPr id="1" name=""/>
+        <p:cNvGrpSpPr/>
+        <p:nvPr/>
+      </p:nvGrpSpPr>
+      <p:grpSpPr>
+        <a:xfrm>
+          <a:off x="0" y="0"/>
+          <a:ext cx="0" cy="0"/>
+          <a:chOff x="0" y="0"/>
+          <a:chExt cx="0" cy="0"/>
+        </a:xfrm>
+      </p:grpSpPr>
+      <p:sp>
+        <p:nvSpPr>
+          <p:cNvPr id="2" name="Title 1"/>
+          <p:cNvSpPr>
+            <a:spLocks noGrp="1"/>
+          </p:cNvSpPr>
+          <p:nvPr>
+            <p:ph type="title"/>
+          </p:nvPr>
+        </p:nvSpPr>
+        <p:spPr/>
+        <p:txBody>
+          <a:bodyPr/>
+          <a:lstStyle/>
+          <a:p>
+            <a:pPr algn="ctr"/>
+            <a:r>
+              <a:rPr lang="en-US" dirty="0" smtClean="0"/>
+              <a:t>The End</a:t>
+            </a:r>
+            <a:endParaRPr lang="en-US" dirty="0"/>
+          </a:p>
+        </p:txBody>
+      </p:sp>
+      <p:sp>
+        <p:nvSpPr>
+          <p:cNvPr id="3" name="Content Placeholder 2"/>
+          <p:cNvSpPr>
+            <a:spLocks noGrp="1"/>
+          </p:cNvSpPr>
+          <p:nvPr>
+            <p:ph idx="1"/>
+          </p:nvPr>
+        </p:nvSpPr>
+        <p:spPr/>
+        <p:txBody>
+          <a:bodyPr>
+            <a:normAutofit/>
+          </a:bodyPr>
+          <a:lstStyle/>
+          <a:p>
             <a:pPr algn="ctr"/>
             <a:endParaRPr lang="en-US" sz="2800" dirty="0" smtClean="0"/>
           </a:p>
@@ -18839,7 +19185,7 @@
           <a:p>
             <a:fld id="{4CE482DC-2269-4F26-9D2A-7E44B1A4CD85}" type="slidenum">
               <a:rPr lang="en-US" smtClean="0"/>
-              <a:t>26</a:t>
+              <a:t>28</a:t>
             </a:fld>
             <a:endParaRPr lang="en-US" dirty="0"/>
           </a:p>

</xml_diff>

<commit_message>
Primeira versão da Apresentação, feita.
</commit_message>
<xml_diff>
--- a/doc/Apresentação Oral/AFinal.pptx
+++ b/doc/Apresentação Oral/AFinal.pptx
@@ -2144,29 +2144,29 @@
     </dgm:pt>
   </dgm:ptLst>
   <dgm:cxnLst>
-    <dgm:cxn modelId="{F7E4C5EA-DFF3-4CA5-B13C-89A73E0450D9}" type="presOf" srcId="{903E13AB-7FF9-4EF1-9CC8-42D43D9E5AF2}" destId="{005977C5-7746-4332-AB63-5565C2615FED}" srcOrd="1" destOrd="0" presId="urn:microsoft.com/office/officeart/2005/8/layout/process1"/>
-    <dgm:cxn modelId="{F106EA50-CE0A-49EA-9830-F23364F8072D}" srcId="{BA80B3D6-D686-4335-B8FE-A5B174A91D1F}" destId="{CCE039CF-CC13-4D3D-851B-AB1839045A98}" srcOrd="1" destOrd="0" parTransId="{F7538E36-531A-4ABF-83F2-4D674DEF8E32}" sibTransId="{0827E205-FFF6-4C97-99DA-E7CCB976213E}"/>
-    <dgm:cxn modelId="{72341014-660C-4F4B-99DB-6D5B90535813}" type="presOf" srcId="{BA80B3D6-D686-4335-B8FE-A5B174A91D1F}" destId="{52A5986A-80EF-452F-B163-4F651F6E920E}" srcOrd="0" destOrd="0" presId="urn:microsoft.com/office/officeart/2005/8/layout/process1"/>
-    <dgm:cxn modelId="{F6EB67DB-F866-45F1-902C-F2D6BDC23779}" type="presOf" srcId="{6E46E610-6AA3-4C4E-8A85-6DC6A62E248B}" destId="{81668A18-A5C4-481F-924E-91CBE598CF90}" srcOrd="0" destOrd="0" presId="urn:microsoft.com/office/officeart/2005/8/layout/process1"/>
-    <dgm:cxn modelId="{174D0F16-8657-483C-B58D-FDDCDD6C622B}" srcId="{BA80B3D6-D686-4335-B8FE-A5B174A91D1F}" destId="{17A8A248-E1DA-469F-A154-CBAC5D9778AB}" srcOrd="0" destOrd="0" parTransId="{E3C8D432-9B80-4370-B9AA-3C64CD61764F}" sibTransId="{4422F951-8E6C-4158-98BC-9114CDD18487}"/>
-    <dgm:cxn modelId="{3DC493F8-5B48-4FC5-BABD-95DC0BAAB2A7}" type="presOf" srcId="{4422F951-8E6C-4158-98BC-9114CDD18487}" destId="{FDB0FADC-49BB-4433-94F6-73BAE60CC01B}" srcOrd="0" destOrd="0" presId="urn:microsoft.com/office/officeart/2005/8/layout/process1"/>
-    <dgm:cxn modelId="{3C2D7F7A-0ECD-4B6F-B22B-38A66E112503}" type="presOf" srcId="{CCE039CF-CC13-4D3D-851B-AB1839045A98}" destId="{C2B5D9D2-D82E-407D-882B-8A8EEF511AFF}" srcOrd="0" destOrd="0" presId="urn:microsoft.com/office/officeart/2005/8/layout/process1"/>
-    <dgm:cxn modelId="{10FE49BB-B917-47BD-8A7A-41F8A583102C}" type="presOf" srcId="{424BD534-A5CD-4DA1-970B-96BC2B36FFFA}" destId="{A9B93654-13EA-4C3C-8C58-01B6F39C7E93}" srcOrd="0" destOrd="0" presId="urn:microsoft.com/office/officeart/2005/8/layout/process1"/>
-    <dgm:cxn modelId="{E8D939EE-BE19-4749-A012-A8BD5CBA70A3}" srcId="{BA80B3D6-D686-4335-B8FE-A5B174A91D1F}" destId="{6E46E610-6AA3-4C4E-8A85-6DC6A62E248B}" srcOrd="5" destOrd="0" parTransId="{823508B4-53E0-436F-8C0C-01AAB20F1F8B}" sibTransId="{58A25139-4C19-4DEF-BB4A-2C7D0C560D1E}"/>
-    <dgm:cxn modelId="{E7CFC45B-DF7A-4A53-8AD2-1EDC1D064D7D}" type="presOf" srcId="{D4EC1965-5E66-4F6A-B14C-48B89CF88F34}" destId="{1042CD11-4028-40C7-A3E4-3853786713BD}" srcOrd="0" destOrd="0" presId="urn:microsoft.com/office/officeart/2005/8/layout/process1"/>
-    <dgm:cxn modelId="{B45AA2E6-D816-418A-8CB3-0FAC27502E63}" type="presOf" srcId="{502ADAB4-0FBC-4569-99CE-21E1D5F6BC66}" destId="{84B384BA-4992-4177-9E54-19EAA20BCC7A}" srcOrd="0" destOrd="0" presId="urn:microsoft.com/office/officeart/2005/8/layout/process1"/>
+    <dgm:cxn modelId="{7EF4DE59-EE4D-429F-961F-C9CCE67F98A0}" type="presOf" srcId="{903E13AB-7FF9-4EF1-9CC8-42D43D9E5AF2}" destId="{F0252C6C-08EF-48C6-89C0-0C3E67BADC55}" srcOrd="0" destOrd="0" presId="urn:microsoft.com/office/officeart/2005/8/layout/process1"/>
+    <dgm:cxn modelId="{296F466E-FD74-4122-B044-D57410516D1D}" type="presOf" srcId="{98B9D415-3575-41DA-8A1E-7D3F389EAAB4}" destId="{B6D3413A-C5B6-47F8-B1A9-65F1039F4D3B}" srcOrd="0" destOrd="0" presId="urn:microsoft.com/office/officeart/2005/8/layout/process1"/>
     <dgm:cxn modelId="{976DF86D-1A8D-448E-8334-DA38467787F6}" type="presOf" srcId="{502ADAB4-0FBC-4569-99CE-21E1D5F6BC66}" destId="{45E28F72-793C-4B73-B565-78D783AB4F0D}" srcOrd="1" destOrd="0" presId="urn:microsoft.com/office/officeart/2005/8/layout/process1"/>
     <dgm:cxn modelId="{B8F3B7DF-0C43-42CF-9639-3F6ED87A8879}" type="presOf" srcId="{2F6FD728-9EA6-4228-BAD0-00E42898BAEE}" destId="{42370FF3-AFA1-404E-A02D-36439289E42F}" srcOrd="0" destOrd="0" presId="urn:microsoft.com/office/officeart/2005/8/layout/process1"/>
     <dgm:cxn modelId="{10A6AFFB-136F-4B46-B488-3FCEC86DF52E}" srcId="{BA80B3D6-D686-4335-B8FE-A5B174A91D1F}" destId="{98B9D415-3575-41DA-8A1E-7D3F389EAAB4}" srcOrd="4" destOrd="0" parTransId="{4BB043C2-7E2E-4EC1-9BF5-3822561939B1}" sibTransId="{903E13AB-7FF9-4EF1-9CC8-42D43D9E5AF2}"/>
+    <dgm:cxn modelId="{E7CFC45B-DF7A-4A53-8AD2-1EDC1D064D7D}" type="presOf" srcId="{D4EC1965-5E66-4F6A-B14C-48B89CF88F34}" destId="{1042CD11-4028-40C7-A3E4-3853786713BD}" srcOrd="0" destOrd="0" presId="urn:microsoft.com/office/officeart/2005/8/layout/process1"/>
+    <dgm:cxn modelId="{72341014-660C-4F4B-99DB-6D5B90535813}" type="presOf" srcId="{BA80B3D6-D686-4335-B8FE-A5B174A91D1F}" destId="{52A5986A-80EF-452F-B163-4F651F6E920E}" srcOrd="0" destOrd="0" presId="urn:microsoft.com/office/officeart/2005/8/layout/process1"/>
+    <dgm:cxn modelId="{63979777-6806-43D9-999F-7A795E3AE3BF}" srcId="{BA80B3D6-D686-4335-B8FE-A5B174A91D1F}" destId="{424BD534-A5CD-4DA1-970B-96BC2B36FFFA}" srcOrd="3" destOrd="0" parTransId="{A6527A33-AD89-4577-8B3C-398FC08D70E9}" sibTransId="{2F6FD728-9EA6-4228-BAD0-00E42898BAEE}"/>
+    <dgm:cxn modelId="{F6EB67DB-F866-45F1-902C-F2D6BDC23779}" type="presOf" srcId="{6E46E610-6AA3-4C4E-8A85-6DC6A62E248B}" destId="{81668A18-A5C4-481F-924E-91CBE598CF90}" srcOrd="0" destOrd="0" presId="urn:microsoft.com/office/officeart/2005/8/layout/process1"/>
+    <dgm:cxn modelId="{F7E4C5EA-DFF3-4CA5-B13C-89A73E0450D9}" type="presOf" srcId="{903E13AB-7FF9-4EF1-9CC8-42D43D9E5AF2}" destId="{005977C5-7746-4332-AB63-5565C2615FED}" srcOrd="1" destOrd="0" presId="urn:microsoft.com/office/officeart/2005/8/layout/process1"/>
     <dgm:cxn modelId="{F2DA0746-0CB3-4E86-A4F9-198901C93E9E}" type="presOf" srcId="{4422F951-8E6C-4158-98BC-9114CDD18487}" destId="{C70AAC22-CD4D-442E-9F76-A785E86CF564}" srcOrd="1" destOrd="0" presId="urn:microsoft.com/office/officeart/2005/8/layout/process1"/>
-    <dgm:cxn modelId="{63979777-6806-43D9-999F-7A795E3AE3BF}" srcId="{BA80B3D6-D686-4335-B8FE-A5B174A91D1F}" destId="{424BD534-A5CD-4DA1-970B-96BC2B36FFFA}" srcOrd="3" destOrd="0" parTransId="{A6527A33-AD89-4577-8B3C-398FC08D70E9}" sibTransId="{2F6FD728-9EA6-4228-BAD0-00E42898BAEE}"/>
     <dgm:cxn modelId="{342964B1-6106-4F57-988A-6EA084A830C3}" type="presOf" srcId="{0827E205-FFF6-4C97-99DA-E7CCB976213E}" destId="{861FB1F0-A09E-4914-B7FC-FCEA1CD04480}" srcOrd="1" destOrd="0" presId="urn:microsoft.com/office/officeart/2005/8/layout/process1"/>
-    <dgm:cxn modelId="{7EF4DE59-EE4D-429F-961F-C9CCE67F98A0}" type="presOf" srcId="{903E13AB-7FF9-4EF1-9CC8-42D43D9E5AF2}" destId="{F0252C6C-08EF-48C6-89C0-0C3E67BADC55}" srcOrd="0" destOrd="0" presId="urn:microsoft.com/office/officeart/2005/8/layout/process1"/>
+    <dgm:cxn modelId="{DE637EEF-7D91-4557-9E24-CE46690DD8EC}" type="presOf" srcId="{0827E205-FFF6-4C97-99DA-E7CCB976213E}" destId="{E608B5D3-1969-4012-8ADD-73D2E450020A}" srcOrd="0" destOrd="0" presId="urn:microsoft.com/office/officeart/2005/8/layout/process1"/>
+    <dgm:cxn modelId="{10FE49BB-B917-47BD-8A7A-41F8A583102C}" type="presOf" srcId="{424BD534-A5CD-4DA1-970B-96BC2B36FFFA}" destId="{A9B93654-13EA-4C3C-8C58-01B6F39C7E93}" srcOrd="0" destOrd="0" presId="urn:microsoft.com/office/officeart/2005/8/layout/process1"/>
+    <dgm:cxn modelId="{174D0F16-8657-483C-B58D-FDDCDD6C622B}" srcId="{BA80B3D6-D686-4335-B8FE-A5B174A91D1F}" destId="{17A8A248-E1DA-469F-A154-CBAC5D9778AB}" srcOrd="0" destOrd="0" parTransId="{E3C8D432-9B80-4370-B9AA-3C64CD61764F}" sibTransId="{4422F951-8E6C-4158-98BC-9114CDD18487}"/>
+    <dgm:cxn modelId="{F106EA50-CE0A-49EA-9830-F23364F8072D}" srcId="{BA80B3D6-D686-4335-B8FE-A5B174A91D1F}" destId="{CCE039CF-CC13-4D3D-851B-AB1839045A98}" srcOrd="1" destOrd="0" parTransId="{F7538E36-531A-4ABF-83F2-4D674DEF8E32}" sibTransId="{0827E205-FFF6-4C97-99DA-E7CCB976213E}"/>
+    <dgm:cxn modelId="{B45AA2E6-D816-418A-8CB3-0FAC27502E63}" type="presOf" srcId="{502ADAB4-0FBC-4569-99CE-21E1D5F6BC66}" destId="{84B384BA-4992-4177-9E54-19EAA20BCC7A}" srcOrd="0" destOrd="0" presId="urn:microsoft.com/office/officeart/2005/8/layout/process1"/>
+    <dgm:cxn modelId="{539D2639-9F77-4D02-BDA0-E03AA5E161DC}" type="presOf" srcId="{17A8A248-E1DA-469F-A154-CBAC5D9778AB}" destId="{0F705934-E6D1-499E-BDAA-C0A62992660D}" srcOrd="0" destOrd="0" presId="urn:microsoft.com/office/officeart/2005/8/layout/process1"/>
+    <dgm:cxn modelId="{F1DC2A5A-DC5A-417A-B6A0-A85C2DF10750}" srcId="{BA80B3D6-D686-4335-B8FE-A5B174A91D1F}" destId="{D4EC1965-5E66-4F6A-B14C-48B89CF88F34}" srcOrd="2" destOrd="0" parTransId="{FCD1FA7D-D905-468E-99B9-C7BD076FAC31}" sibTransId="{502ADAB4-0FBC-4569-99CE-21E1D5F6BC66}"/>
+    <dgm:cxn modelId="{3DC493F8-5B48-4FC5-BABD-95DC0BAAB2A7}" type="presOf" srcId="{4422F951-8E6C-4158-98BC-9114CDD18487}" destId="{FDB0FADC-49BB-4433-94F6-73BAE60CC01B}" srcOrd="0" destOrd="0" presId="urn:microsoft.com/office/officeart/2005/8/layout/process1"/>
+    <dgm:cxn modelId="{E8D939EE-BE19-4749-A012-A8BD5CBA70A3}" srcId="{BA80B3D6-D686-4335-B8FE-A5B174A91D1F}" destId="{6E46E610-6AA3-4C4E-8A85-6DC6A62E248B}" srcOrd="5" destOrd="0" parTransId="{823508B4-53E0-436F-8C0C-01AAB20F1F8B}" sibTransId="{58A25139-4C19-4DEF-BB4A-2C7D0C560D1E}"/>
+    <dgm:cxn modelId="{3C2D7F7A-0ECD-4B6F-B22B-38A66E112503}" type="presOf" srcId="{CCE039CF-CC13-4D3D-851B-AB1839045A98}" destId="{C2B5D9D2-D82E-407D-882B-8A8EEF511AFF}" srcOrd="0" destOrd="0" presId="urn:microsoft.com/office/officeart/2005/8/layout/process1"/>
     <dgm:cxn modelId="{65373FC5-E836-409F-BAFC-05BC7F6E6B33}" type="presOf" srcId="{2F6FD728-9EA6-4228-BAD0-00E42898BAEE}" destId="{09FB49E3-3A32-426F-90D7-C2DEEECBAE8A}" srcOrd="1" destOrd="0" presId="urn:microsoft.com/office/officeart/2005/8/layout/process1"/>
-    <dgm:cxn modelId="{DE637EEF-7D91-4557-9E24-CE46690DD8EC}" type="presOf" srcId="{0827E205-FFF6-4C97-99DA-E7CCB976213E}" destId="{E608B5D3-1969-4012-8ADD-73D2E450020A}" srcOrd="0" destOrd="0" presId="urn:microsoft.com/office/officeart/2005/8/layout/process1"/>
-    <dgm:cxn modelId="{296F466E-FD74-4122-B044-D57410516D1D}" type="presOf" srcId="{98B9D415-3575-41DA-8A1E-7D3F389EAAB4}" destId="{B6D3413A-C5B6-47F8-B1A9-65F1039F4D3B}" srcOrd="0" destOrd="0" presId="urn:microsoft.com/office/officeart/2005/8/layout/process1"/>
-    <dgm:cxn modelId="{F1DC2A5A-DC5A-417A-B6A0-A85C2DF10750}" srcId="{BA80B3D6-D686-4335-B8FE-A5B174A91D1F}" destId="{D4EC1965-5E66-4F6A-B14C-48B89CF88F34}" srcOrd="2" destOrd="0" parTransId="{FCD1FA7D-D905-468E-99B9-C7BD076FAC31}" sibTransId="{502ADAB4-0FBC-4569-99CE-21E1D5F6BC66}"/>
-    <dgm:cxn modelId="{539D2639-9F77-4D02-BDA0-E03AA5E161DC}" type="presOf" srcId="{17A8A248-E1DA-469F-A154-CBAC5D9778AB}" destId="{0F705934-E6D1-499E-BDAA-C0A62992660D}" srcOrd="0" destOrd="0" presId="urn:microsoft.com/office/officeart/2005/8/layout/process1"/>
     <dgm:cxn modelId="{154F3A88-0D71-4474-80F1-3DDE67E1ECF5}" type="presParOf" srcId="{52A5986A-80EF-452F-B163-4F651F6E920E}" destId="{0F705934-E6D1-499E-BDAA-C0A62992660D}" srcOrd="0" destOrd="0" presId="urn:microsoft.com/office/officeart/2005/8/layout/process1"/>
     <dgm:cxn modelId="{49A56BD7-86C7-4645-8591-9DFD38178B6A}" type="presParOf" srcId="{52A5986A-80EF-452F-B163-4F651F6E920E}" destId="{FDB0FADC-49BB-4433-94F6-73BAE60CC01B}" srcOrd="1" destOrd="0" presId="urn:microsoft.com/office/officeart/2005/8/layout/process1"/>
     <dgm:cxn modelId="{74459F2E-3A2E-4AE9-B678-DD30F1D9840D}" type="presParOf" srcId="{FDB0FADC-49BB-4433-94F6-73BAE60CC01B}" destId="{C70AAC22-CD4D-442E-9F76-A785E86CF564}" srcOrd="0" destOrd="0" presId="urn:microsoft.com/office/officeart/2005/8/layout/process1"/>
@@ -2686,924 +2686,6 @@
       <dsp:cNvGrpSpPr/>
     </dsp:nvGrpSpPr>
     <dsp:grpSpPr/>
-    <dsp:sp modelId="{0F705934-E6D1-499E-BDAA-C0A62992660D}">
-      <dsp:nvSpPr>
-        <dsp:cNvPr id="0" name=""/>
-        <dsp:cNvSpPr/>
-      </dsp:nvSpPr>
-      <dsp:spPr>
-        <a:xfrm>
-          <a:off x="0" y="1634172"/>
-          <a:ext cx="1257300" cy="754380"/>
-        </a:xfrm>
-        <a:prstGeom prst="roundRect">
-          <a:avLst>
-            <a:gd name="adj" fmla="val 10000"/>
-          </a:avLst>
-        </a:prstGeom>
-        <a:solidFill>
-          <a:srgbClr val="F0847C"/>
-        </a:solidFill>
-        <a:ln>
-          <a:solidFill>
-            <a:srgbClr val="C00000"/>
-          </a:solidFill>
-        </a:ln>
-        <a:effectLst>
-          <a:outerShdw blurRad="38100" dist="25400" dir="2700000" algn="br" rotWithShape="0">
-            <a:srgbClr val="000000">
-              <a:alpha val="60000"/>
-            </a:srgbClr>
-          </a:outerShdw>
-        </a:effectLst>
-        <a:sp3d prstMaterial="plastic">
-          <a:bevelT w="50800" h="50800"/>
-          <a:bevelB w="50800" h="50800"/>
-        </a:sp3d>
-      </dsp:spPr>
-      <dsp:style>
-        <a:lnRef idx="0">
-          <a:scrgbClr r="0" g="0" b="0"/>
-        </a:lnRef>
-        <a:fillRef idx="1">
-          <a:scrgbClr r="0" g="0" b="0"/>
-        </a:fillRef>
-        <a:effectRef idx="2">
-          <a:scrgbClr r="0" g="0" b="0"/>
-        </a:effectRef>
-        <a:fontRef idx="minor">
-          <a:schemeClr val="lt1"/>
-        </a:fontRef>
-      </dsp:style>
-      <dsp:txBody>
-        <a:bodyPr spcFirstLastPara="0" vert="horz" wrap="square" lIns="60960" tIns="60960" rIns="60960" bIns="60960" numCol="1" spcCol="1270" anchor="ctr" anchorCtr="0">
-          <a:noAutofit/>
-        </a:bodyPr>
-        <a:lstStyle/>
-        <a:p>
-          <a:pPr lvl="0" algn="ctr" defTabSz="711200">
-            <a:lnSpc>
-              <a:spcPct val="90000"/>
-            </a:lnSpc>
-            <a:spcBef>
-              <a:spcPct val="0"/>
-            </a:spcBef>
-            <a:spcAft>
-              <a:spcPct val="35000"/>
-            </a:spcAft>
-          </a:pPr>
-          <a:r>
-            <a:rPr lang="en-US" sz="1600" kern="1200" dirty="0" smtClean="0"/>
-            <a:t>ITC 2007 Data</a:t>
-          </a:r>
-          <a:endParaRPr lang="en-US" sz="1600" kern="1200" dirty="0"/>
-        </a:p>
-      </dsp:txBody>
-      <dsp:txXfrm>
-        <a:off x="22095" y="1656267"/>
-        <a:ext cx="1213110" cy="710190"/>
-      </dsp:txXfrm>
-    </dsp:sp>
-    <dsp:sp modelId="{FDB0FADC-49BB-4433-94F6-73BAE60CC01B}">
-      <dsp:nvSpPr>
-        <dsp:cNvPr id="0" name=""/>
-        <dsp:cNvSpPr/>
-      </dsp:nvSpPr>
-      <dsp:spPr>
-        <a:xfrm>
-          <a:off x="1383029" y="1855457"/>
-          <a:ext cx="266547" cy="311810"/>
-        </a:xfrm>
-        <a:prstGeom prst="rightArrow">
-          <a:avLst>
-            <a:gd name="adj1" fmla="val 60000"/>
-            <a:gd name="adj2" fmla="val 50000"/>
-          </a:avLst>
-        </a:prstGeom>
-        <a:solidFill>
-          <a:schemeClr val="accent1">
-            <a:tint val="60000"/>
-            <a:hueOff val="0"/>
-            <a:satOff val="0"/>
-            <a:lumOff val="0"/>
-            <a:alphaOff val="0"/>
-          </a:schemeClr>
-        </a:solidFill>
-        <a:ln w="12700" cap="flat" cmpd="sng" algn="ctr">
-          <a:solidFill>
-            <a:schemeClr val="accent1">
-              <a:tint val="60000"/>
-              <a:hueOff val="0"/>
-              <a:satOff val="0"/>
-              <a:lumOff val="0"/>
-              <a:alphaOff val="0"/>
-            </a:schemeClr>
-          </a:solidFill>
-          <a:prstDash val="solid"/>
-        </a:ln>
-        <a:effectLst>
-          <a:outerShdw blurRad="38100" dist="25400" dir="2700000" algn="br" rotWithShape="0">
-            <a:srgbClr val="000000">
-              <a:alpha val="60000"/>
-            </a:srgbClr>
-          </a:outerShdw>
-        </a:effectLst>
-        <a:sp3d z="-25400" prstMaterial="plastic">
-          <a:bevelT w="25400" h="25400"/>
-          <a:bevelB w="25400" h="25400"/>
-        </a:sp3d>
-      </dsp:spPr>
-      <dsp:style>
-        <a:lnRef idx="1">
-          <a:scrgbClr r="0" g="0" b="0"/>
-        </a:lnRef>
-        <a:fillRef idx="1">
-          <a:scrgbClr r="0" g="0" b="0"/>
-        </a:fillRef>
-        <a:effectRef idx="2">
-          <a:scrgbClr r="0" g="0" b="0"/>
-        </a:effectRef>
-        <a:fontRef idx="minor">
-          <a:schemeClr val="lt1"/>
-        </a:fontRef>
-      </dsp:style>
-      <dsp:txBody>
-        <a:bodyPr spcFirstLastPara="0" vert="horz" wrap="square" lIns="0" tIns="0" rIns="0" bIns="0" numCol="1" spcCol="1270" anchor="ctr" anchorCtr="0">
-          <a:noAutofit/>
-        </a:bodyPr>
-        <a:lstStyle/>
-        <a:p>
-          <a:pPr lvl="0" algn="ctr" defTabSz="577850">
-            <a:lnSpc>
-              <a:spcPct val="90000"/>
-            </a:lnSpc>
-            <a:spcBef>
-              <a:spcPct val="0"/>
-            </a:spcBef>
-            <a:spcAft>
-              <a:spcPct val="35000"/>
-            </a:spcAft>
-          </a:pPr>
-          <a:endParaRPr lang="en-US" sz="1300" kern="1200"/>
-        </a:p>
-      </dsp:txBody>
-      <dsp:txXfrm>
-        <a:off x="1383029" y="1917819"/>
-        <a:ext cx="186583" cy="187086"/>
-      </dsp:txXfrm>
-    </dsp:sp>
-    <dsp:sp modelId="{C2B5D9D2-D82E-407D-882B-8A8EEF511AFF}">
-      <dsp:nvSpPr>
-        <dsp:cNvPr id="0" name=""/>
-        <dsp:cNvSpPr/>
-      </dsp:nvSpPr>
-      <dsp:spPr>
-        <a:xfrm>
-          <a:off x="1760219" y="1634172"/>
-          <a:ext cx="1257300" cy="754380"/>
-        </a:xfrm>
-        <a:prstGeom prst="roundRect">
-          <a:avLst>
-            <a:gd name="adj" fmla="val 10000"/>
-          </a:avLst>
-        </a:prstGeom>
-        <a:solidFill>
-          <a:schemeClr val="accent1">
-            <a:hueOff val="0"/>
-            <a:satOff val="0"/>
-            <a:lumOff val="0"/>
-            <a:alphaOff val="0"/>
-          </a:schemeClr>
-        </a:solidFill>
-        <a:ln>
-          <a:noFill/>
-        </a:ln>
-        <a:effectLst>
-          <a:outerShdw blurRad="38100" dist="25400" dir="2700000" algn="br" rotWithShape="0">
-            <a:srgbClr val="000000">
-              <a:alpha val="60000"/>
-            </a:srgbClr>
-          </a:outerShdw>
-        </a:effectLst>
-        <a:sp3d prstMaterial="plastic">
-          <a:bevelT w="50800" h="50800"/>
-          <a:bevelB w="50800" h="50800"/>
-        </a:sp3d>
-      </dsp:spPr>
-      <dsp:style>
-        <a:lnRef idx="0">
-          <a:scrgbClr r="0" g="0" b="0"/>
-        </a:lnRef>
-        <a:fillRef idx="1">
-          <a:scrgbClr r="0" g="0" b="0"/>
-        </a:fillRef>
-        <a:effectRef idx="2">
-          <a:scrgbClr r="0" g="0" b="0"/>
-        </a:effectRef>
-        <a:fontRef idx="minor">
-          <a:schemeClr val="lt1"/>
-        </a:fontRef>
-      </dsp:style>
-      <dsp:txBody>
-        <a:bodyPr spcFirstLastPara="0" vert="horz" wrap="square" lIns="60960" tIns="60960" rIns="60960" bIns="60960" numCol="1" spcCol="1270" anchor="ctr" anchorCtr="0">
-          <a:noAutofit/>
-        </a:bodyPr>
-        <a:lstStyle/>
-        <a:p>
-          <a:pPr lvl="0" algn="ctr" defTabSz="711200">
-            <a:lnSpc>
-              <a:spcPct val="90000"/>
-            </a:lnSpc>
-            <a:spcBef>
-              <a:spcPct val="0"/>
-            </a:spcBef>
-            <a:spcAft>
-              <a:spcPct val="35000"/>
-            </a:spcAft>
-          </a:pPr>
-          <a:r>
-            <a:rPr lang="en-US" sz="1600" kern="1200" dirty="0" smtClean="0"/>
-            <a:t>Loader</a:t>
-          </a:r>
-          <a:endParaRPr lang="en-US" sz="1600" kern="1200" dirty="0"/>
-        </a:p>
-      </dsp:txBody>
-      <dsp:txXfrm>
-        <a:off x="1782314" y="1656267"/>
-        <a:ext cx="1213110" cy="710190"/>
-      </dsp:txXfrm>
-    </dsp:sp>
-    <dsp:sp modelId="{E608B5D3-1969-4012-8ADD-73D2E450020A}">
-      <dsp:nvSpPr>
-        <dsp:cNvPr id="0" name=""/>
-        <dsp:cNvSpPr/>
-      </dsp:nvSpPr>
-      <dsp:spPr>
-        <a:xfrm>
-          <a:off x="3143249" y="1855457"/>
-          <a:ext cx="266547" cy="311810"/>
-        </a:xfrm>
-        <a:prstGeom prst="rightArrow">
-          <a:avLst>
-            <a:gd name="adj1" fmla="val 60000"/>
-            <a:gd name="adj2" fmla="val 50000"/>
-          </a:avLst>
-        </a:prstGeom>
-        <a:solidFill>
-          <a:schemeClr val="accent1">
-            <a:tint val="60000"/>
-            <a:hueOff val="0"/>
-            <a:satOff val="0"/>
-            <a:lumOff val="0"/>
-            <a:alphaOff val="0"/>
-          </a:schemeClr>
-        </a:solidFill>
-        <a:ln w="12700" cap="flat" cmpd="sng" algn="ctr">
-          <a:solidFill>
-            <a:schemeClr val="accent1">
-              <a:tint val="60000"/>
-              <a:hueOff val="0"/>
-              <a:satOff val="0"/>
-              <a:lumOff val="0"/>
-              <a:alphaOff val="0"/>
-            </a:schemeClr>
-          </a:solidFill>
-          <a:prstDash val="solid"/>
-        </a:ln>
-        <a:effectLst>
-          <a:outerShdw blurRad="38100" dist="25400" dir="2700000" algn="br" rotWithShape="0">
-            <a:srgbClr val="000000">
-              <a:alpha val="60000"/>
-            </a:srgbClr>
-          </a:outerShdw>
-        </a:effectLst>
-        <a:sp3d z="-25400" prstMaterial="plastic">
-          <a:bevelT w="25400" h="25400"/>
-          <a:bevelB w="25400" h="25400"/>
-        </a:sp3d>
-      </dsp:spPr>
-      <dsp:style>
-        <a:lnRef idx="1">
-          <a:scrgbClr r="0" g="0" b="0"/>
-        </a:lnRef>
-        <a:fillRef idx="1">
-          <a:scrgbClr r="0" g="0" b="0"/>
-        </a:fillRef>
-        <a:effectRef idx="2">
-          <a:scrgbClr r="0" g="0" b="0"/>
-        </a:effectRef>
-        <a:fontRef idx="minor">
-          <a:schemeClr val="lt1"/>
-        </a:fontRef>
-      </dsp:style>
-      <dsp:txBody>
-        <a:bodyPr spcFirstLastPara="0" vert="horz" wrap="square" lIns="0" tIns="0" rIns="0" bIns="0" numCol="1" spcCol="1270" anchor="ctr" anchorCtr="0">
-          <a:noAutofit/>
-        </a:bodyPr>
-        <a:lstStyle/>
-        <a:p>
-          <a:pPr lvl="0" algn="ctr" defTabSz="577850">
-            <a:lnSpc>
-              <a:spcPct val="90000"/>
-            </a:lnSpc>
-            <a:spcBef>
-              <a:spcPct val="0"/>
-            </a:spcBef>
-            <a:spcAft>
-              <a:spcPct val="35000"/>
-            </a:spcAft>
-          </a:pPr>
-          <a:endParaRPr lang="en-US" sz="1300" kern="1200"/>
-        </a:p>
-      </dsp:txBody>
-      <dsp:txXfrm>
-        <a:off x="3143249" y="1917819"/>
-        <a:ext cx="186583" cy="187086"/>
-      </dsp:txXfrm>
-    </dsp:sp>
-    <dsp:sp modelId="{1042CD11-4028-40C7-A3E4-3853786713BD}">
-      <dsp:nvSpPr>
-        <dsp:cNvPr id="0" name=""/>
-        <dsp:cNvSpPr/>
-      </dsp:nvSpPr>
-      <dsp:spPr>
-        <a:xfrm>
-          <a:off x="3520439" y="1634172"/>
-          <a:ext cx="1257300" cy="754380"/>
-        </a:xfrm>
-        <a:prstGeom prst="roundRect">
-          <a:avLst>
-            <a:gd name="adj" fmla="val 10000"/>
-          </a:avLst>
-        </a:prstGeom>
-        <a:solidFill>
-          <a:schemeClr val="accent1">
-            <a:hueOff val="0"/>
-            <a:satOff val="0"/>
-            <a:lumOff val="0"/>
-            <a:alphaOff val="0"/>
-          </a:schemeClr>
-        </a:solidFill>
-        <a:ln>
-          <a:noFill/>
-        </a:ln>
-        <a:effectLst>
-          <a:outerShdw blurRad="38100" dist="25400" dir="2700000" algn="br" rotWithShape="0">
-            <a:srgbClr val="000000">
-              <a:alpha val="60000"/>
-            </a:srgbClr>
-          </a:outerShdw>
-        </a:effectLst>
-        <a:sp3d prstMaterial="plastic">
-          <a:bevelT w="50800" h="50800"/>
-          <a:bevelB w="50800" h="50800"/>
-        </a:sp3d>
-      </dsp:spPr>
-      <dsp:style>
-        <a:lnRef idx="0">
-          <a:scrgbClr r="0" g="0" b="0"/>
-        </a:lnRef>
-        <a:fillRef idx="1">
-          <a:scrgbClr r="0" g="0" b="0"/>
-        </a:fillRef>
-        <a:effectRef idx="2">
-          <a:scrgbClr r="0" g="0" b="0"/>
-        </a:effectRef>
-        <a:fontRef idx="minor">
-          <a:schemeClr val="lt1"/>
-        </a:fontRef>
-      </dsp:style>
-      <dsp:txBody>
-        <a:bodyPr spcFirstLastPara="0" vert="horz" wrap="square" lIns="60960" tIns="60960" rIns="60960" bIns="60960" numCol="1" spcCol="1270" anchor="ctr" anchorCtr="0">
-          <a:noAutofit/>
-        </a:bodyPr>
-        <a:lstStyle/>
-        <a:p>
-          <a:pPr lvl="0" algn="ctr" defTabSz="711200">
-            <a:lnSpc>
-              <a:spcPct val="90000"/>
-            </a:lnSpc>
-            <a:spcBef>
-              <a:spcPct val="0"/>
-            </a:spcBef>
-            <a:spcAft>
-              <a:spcPct val="35000"/>
-            </a:spcAft>
-          </a:pPr>
-          <a:r>
-            <a:rPr lang="en-US" sz="1600" kern="1200" dirty="0" smtClean="0"/>
-            <a:t>Graph Coloring</a:t>
-          </a:r>
-          <a:endParaRPr lang="en-US" sz="1600" kern="1200" dirty="0"/>
-        </a:p>
-      </dsp:txBody>
-      <dsp:txXfrm>
-        <a:off x="3542534" y="1656267"/>
-        <a:ext cx="1213110" cy="710190"/>
-      </dsp:txXfrm>
-    </dsp:sp>
-    <dsp:sp modelId="{84B384BA-4992-4177-9E54-19EAA20BCC7A}">
-      <dsp:nvSpPr>
-        <dsp:cNvPr id="0" name=""/>
-        <dsp:cNvSpPr/>
-      </dsp:nvSpPr>
-      <dsp:spPr>
-        <a:xfrm>
-          <a:off x="4903470" y="1855457"/>
-          <a:ext cx="266547" cy="311810"/>
-        </a:xfrm>
-        <a:prstGeom prst="rightArrow">
-          <a:avLst>
-            <a:gd name="adj1" fmla="val 60000"/>
-            <a:gd name="adj2" fmla="val 50000"/>
-          </a:avLst>
-        </a:prstGeom>
-        <a:solidFill>
-          <a:schemeClr val="accent1">
-            <a:tint val="60000"/>
-            <a:hueOff val="0"/>
-            <a:satOff val="0"/>
-            <a:lumOff val="0"/>
-            <a:alphaOff val="0"/>
-          </a:schemeClr>
-        </a:solidFill>
-        <a:ln w="12700" cap="flat" cmpd="sng" algn="ctr">
-          <a:solidFill>
-            <a:schemeClr val="accent1">
-              <a:tint val="60000"/>
-              <a:hueOff val="0"/>
-              <a:satOff val="0"/>
-              <a:lumOff val="0"/>
-              <a:alphaOff val="0"/>
-            </a:schemeClr>
-          </a:solidFill>
-          <a:prstDash val="solid"/>
-        </a:ln>
-        <a:effectLst>
-          <a:outerShdw blurRad="38100" dist="25400" dir="2700000" algn="br" rotWithShape="0">
-            <a:srgbClr val="000000">
-              <a:alpha val="60000"/>
-            </a:srgbClr>
-          </a:outerShdw>
-        </a:effectLst>
-        <a:sp3d z="-25400" prstMaterial="plastic">
-          <a:bevelT w="25400" h="25400"/>
-          <a:bevelB w="25400" h="25400"/>
-        </a:sp3d>
-      </dsp:spPr>
-      <dsp:style>
-        <a:lnRef idx="1">
-          <a:scrgbClr r="0" g="0" b="0"/>
-        </a:lnRef>
-        <a:fillRef idx="1">
-          <a:scrgbClr r="0" g="0" b="0"/>
-        </a:fillRef>
-        <a:effectRef idx="2">
-          <a:scrgbClr r="0" g="0" b="0"/>
-        </a:effectRef>
-        <a:fontRef idx="minor">
-          <a:schemeClr val="lt1"/>
-        </a:fontRef>
-      </dsp:style>
-      <dsp:txBody>
-        <a:bodyPr spcFirstLastPara="0" vert="horz" wrap="square" lIns="0" tIns="0" rIns="0" bIns="0" numCol="1" spcCol="1270" anchor="ctr" anchorCtr="0">
-          <a:noAutofit/>
-        </a:bodyPr>
-        <a:lstStyle/>
-        <a:p>
-          <a:pPr lvl="0" algn="ctr" defTabSz="577850">
-            <a:lnSpc>
-              <a:spcPct val="90000"/>
-            </a:lnSpc>
-            <a:spcBef>
-              <a:spcPct val="0"/>
-            </a:spcBef>
-            <a:spcAft>
-              <a:spcPct val="35000"/>
-            </a:spcAft>
-          </a:pPr>
-          <a:endParaRPr lang="en-US" sz="1300" kern="1200"/>
-        </a:p>
-      </dsp:txBody>
-      <dsp:txXfrm>
-        <a:off x="4903470" y="1917819"/>
-        <a:ext cx="186583" cy="187086"/>
-      </dsp:txXfrm>
-    </dsp:sp>
-    <dsp:sp modelId="{A9B93654-13EA-4C3C-8C58-01B6F39C7E93}">
-      <dsp:nvSpPr>
-        <dsp:cNvPr id="0" name=""/>
-        <dsp:cNvSpPr/>
-      </dsp:nvSpPr>
-      <dsp:spPr>
-        <a:xfrm>
-          <a:off x="5280659" y="1634172"/>
-          <a:ext cx="1257300" cy="754380"/>
-        </a:xfrm>
-        <a:prstGeom prst="roundRect">
-          <a:avLst>
-            <a:gd name="adj" fmla="val 10000"/>
-          </a:avLst>
-        </a:prstGeom>
-        <a:solidFill>
-          <a:schemeClr val="accent1">
-            <a:hueOff val="0"/>
-            <a:satOff val="0"/>
-            <a:lumOff val="0"/>
-            <a:alphaOff val="0"/>
-          </a:schemeClr>
-        </a:solidFill>
-        <a:ln>
-          <a:noFill/>
-        </a:ln>
-        <a:effectLst>
-          <a:outerShdw blurRad="38100" dist="25400" dir="2700000" algn="br" rotWithShape="0">
-            <a:srgbClr val="000000">
-              <a:alpha val="60000"/>
-            </a:srgbClr>
-          </a:outerShdw>
-        </a:effectLst>
-        <a:sp3d prstMaterial="plastic">
-          <a:bevelT w="50800" h="50800"/>
-          <a:bevelB w="50800" h="50800"/>
-        </a:sp3d>
-      </dsp:spPr>
-      <dsp:style>
-        <a:lnRef idx="0">
-          <a:scrgbClr r="0" g="0" b="0"/>
-        </a:lnRef>
-        <a:fillRef idx="1">
-          <a:scrgbClr r="0" g="0" b="0"/>
-        </a:fillRef>
-        <a:effectRef idx="2">
-          <a:scrgbClr r="0" g="0" b="0"/>
-        </a:effectRef>
-        <a:fontRef idx="minor">
-          <a:schemeClr val="lt1"/>
-        </a:fontRef>
-      </dsp:style>
-      <dsp:txBody>
-        <a:bodyPr spcFirstLastPara="0" vert="horz" wrap="square" lIns="60960" tIns="60960" rIns="60960" bIns="60960" numCol="1" spcCol="1270" anchor="ctr" anchorCtr="0">
-          <a:noAutofit/>
-        </a:bodyPr>
-        <a:lstStyle/>
-        <a:p>
-          <a:pPr lvl="0" algn="ctr" defTabSz="711200">
-            <a:lnSpc>
-              <a:spcPct val="90000"/>
-            </a:lnSpc>
-            <a:spcBef>
-              <a:spcPct val="0"/>
-            </a:spcBef>
-            <a:spcAft>
-              <a:spcPct val="35000"/>
-            </a:spcAft>
-          </a:pPr>
-          <a:r>
-            <a:rPr lang="en-US" sz="1600" kern="1200" dirty="0" smtClean="0"/>
-            <a:t>Simulated Annealing</a:t>
-          </a:r>
-          <a:endParaRPr lang="en-US" sz="1600" kern="1200" dirty="0"/>
-        </a:p>
-      </dsp:txBody>
-      <dsp:txXfrm>
-        <a:off x="5302754" y="1656267"/>
-        <a:ext cx="1213110" cy="710190"/>
-      </dsp:txXfrm>
-    </dsp:sp>
-    <dsp:sp modelId="{42370FF3-AFA1-404E-A02D-36439289E42F}">
-      <dsp:nvSpPr>
-        <dsp:cNvPr id="0" name=""/>
-        <dsp:cNvSpPr/>
-      </dsp:nvSpPr>
-      <dsp:spPr>
-        <a:xfrm>
-          <a:off x="6663690" y="1855457"/>
-          <a:ext cx="266547" cy="311810"/>
-        </a:xfrm>
-        <a:prstGeom prst="rightArrow">
-          <a:avLst>
-            <a:gd name="adj1" fmla="val 60000"/>
-            <a:gd name="adj2" fmla="val 50000"/>
-          </a:avLst>
-        </a:prstGeom>
-        <a:solidFill>
-          <a:schemeClr val="accent1">
-            <a:tint val="60000"/>
-            <a:hueOff val="0"/>
-            <a:satOff val="0"/>
-            <a:lumOff val="0"/>
-            <a:alphaOff val="0"/>
-          </a:schemeClr>
-        </a:solidFill>
-        <a:ln w="12700" cap="flat" cmpd="sng" algn="ctr">
-          <a:solidFill>
-            <a:schemeClr val="accent1">
-              <a:tint val="60000"/>
-              <a:hueOff val="0"/>
-              <a:satOff val="0"/>
-              <a:lumOff val="0"/>
-              <a:alphaOff val="0"/>
-            </a:schemeClr>
-          </a:solidFill>
-          <a:prstDash val="solid"/>
-        </a:ln>
-        <a:effectLst>
-          <a:outerShdw blurRad="38100" dist="25400" dir="2700000" algn="br" rotWithShape="0">
-            <a:srgbClr val="000000">
-              <a:alpha val="60000"/>
-            </a:srgbClr>
-          </a:outerShdw>
-        </a:effectLst>
-        <a:sp3d z="-25400" prstMaterial="plastic">
-          <a:bevelT w="25400" h="25400"/>
-          <a:bevelB w="25400" h="25400"/>
-        </a:sp3d>
-      </dsp:spPr>
-      <dsp:style>
-        <a:lnRef idx="1">
-          <a:scrgbClr r="0" g="0" b="0"/>
-        </a:lnRef>
-        <a:fillRef idx="1">
-          <a:scrgbClr r="0" g="0" b="0"/>
-        </a:fillRef>
-        <a:effectRef idx="2">
-          <a:scrgbClr r="0" g="0" b="0"/>
-        </a:effectRef>
-        <a:fontRef idx="minor">
-          <a:schemeClr val="lt1"/>
-        </a:fontRef>
-      </dsp:style>
-      <dsp:txBody>
-        <a:bodyPr spcFirstLastPara="0" vert="horz" wrap="square" lIns="0" tIns="0" rIns="0" bIns="0" numCol="1" spcCol="1270" anchor="ctr" anchorCtr="0">
-          <a:noAutofit/>
-        </a:bodyPr>
-        <a:lstStyle/>
-        <a:p>
-          <a:pPr lvl="0" algn="ctr" defTabSz="577850">
-            <a:lnSpc>
-              <a:spcPct val="90000"/>
-            </a:lnSpc>
-            <a:spcBef>
-              <a:spcPct val="0"/>
-            </a:spcBef>
-            <a:spcAft>
-              <a:spcPct val="35000"/>
-            </a:spcAft>
-          </a:pPr>
-          <a:endParaRPr lang="en-US" sz="1300" kern="1200"/>
-        </a:p>
-      </dsp:txBody>
-      <dsp:txXfrm>
-        <a:off x="6663690" y="1917819"/>
-        <a:ext cx="186583" cy="187086"/>
-      </dsp:txXfrm>
-    </dsp:sp>
-    <dsp:sp modelId="{B6D3413A-C5B6-47F8-B1A9-65F1039F4D3B}">
-      <dsp:nvSpPr>
-        <dsp:cNvPr id="0" name=""/>
-        <dsp:cNvSpPr/>
-      </dsp:nvSpPr>
-      <dsp:spPr>
-        <a:xfrm>
-          <a:off x="7040880" y="1634172"/>
-          <a:ext cx="1257300" cy="754380"/>
-        </a:xfrm>
-        <a:prstGeom prst="roundRect">
-          <a:avLst>
-            <a:gd name="adj" fmla="val 10000"/>
-          </a:avLst>
-        </a:prstGeom>
-        <a:solidFill>
-          <a:schemeClr val="accent1">
-            <a:hueOff val="0"/>
-            <a:satOff val="0"/>
-            <a:lumOff val="0"/>
-            <a:alphaOff val="0"/>
-          </a:schemeClr>
-        </a:solidFill>
-        <a:ln>
-          <a:noFill/>
-        </a:ln>
-        <a:effectLst>
-          <a:outerShdw blurRad="38100" dist="25400" dir="2700000" algn="br" rotWithShape="0">
-            <a:srgbClr val="000000">
-              <a:alpha val="60000"/>
-            </a:srgbClr>
-          </a:outerShdw>
-        </a:effectLst>
-        <a:sp3d prstMaterial="plastic">
-          <a:bevelT w="50800" h="50800"/>
-          <a:bevelB w="50800" h="50800"/>
-        </a:sp3d>
-      </dsp:spPr>
-      <dsp:style>
-        <a:lnRef idx="0">
-          <a:scrgbClr r="0" g="0" b="0"/>
-        </a:lnRef>
-        <a:fillRef idx="1">
-          <a:scrgbClr r="0" g="0" b="0"/>
-        </a:fillRef>
-        <a:effectRef idx="2">
-          <a:scrgbClr r="0" g="0" b="0"/>
-        </a:effectRef>
-        <a:fontRef idx="minor">
-          <a:schemeClr val="lt1"/>
-        </a:fontRef>
-      </dsp:style>
-      <dsp:txBody>
-        <a:bodyPr spcFirstLastPara="0" vert="horz" wrap="square" lIns="60960" tIns="60960" rIns="60960" bIns="60960" numCol="1" spcCol="1270" anchor="ctr" anchorCtr="0">
-          <a:noAutofit/>
-        </a:bodyPr>
-        <a:lstStyle/>
-        <a:p>
-          <a:pPr lvl="0" algn="ctr" defTabSz="711200">
-            <a:lnSpc>
-              <a:spcPct val="90000"/>
-            </a:lnSpc>
-            <a:spcBef>
-              <a:spcPct val="0"/>
-            </a:spcBef>
-            <a:spcAft>
-              <a:spcPct val="35000"/>
-            </a:spcAft>
-          </a:pPr>
-          <a:r>
-            <a:rPr lang="en-US" sz="1600" kern="1200" dirty="0" smtClean="0"/>
-            <a:t>Hill Climbing</a:t>
-          </a:r>
-          <a:endParaRPr lang="en-US" sz="1600" kern="1200" dirty="0"/>
-        </a:p>
-      </dsp:txBody>
-      <dsp:txXfrm>
-        <a:off x="7062975" y="1656267"/>
-        <a:ext cx="1213110" cy="710190"/>
-      </dsp:txXfrm>
-    </dsp:sp>
-    <dsp:sp modelId="{F0252C6C-08EF-48C6-89C0-0C3E67BADC55}">
-      <dsp:nvSpPr>
-        <dsp:cNvPr id="0" name=""/>
-        <dsp:cNvSpPr/>
-      </dsp:nvSpPr>
-      <dsp:spPr>
-        <a:xfrm>
-          <a:off x="8423910" y="1855457"/>
-          <a:ext cx="266547" cy="311810"/>
-        </a:xfrm>
-        <a:prstGeom prst="rightArrow">
-          <a:avLst>
-            <a:gd name="adj1" fmla="val 60000"/>
-            <a:gd name="adj2" fmla="val 50000"/>
-          </a:avLst>
-        </a:prstGeom>
-        <a:solidFill>
-          <a:schemeClr val="accent1">
-            <a:tint val="60000"/>
-            <a:hueOff val="0"/>
-            <a:satOff val="0"/>
-            <a:lumOff val="0"/>
-            <a:alphaOff val="0"/>
-          </a:schemeClr>
-        </a:solidFill>
-        <a:ln w="12700" cap="flat" cmpd="sng" algn="ctr">
-          <a:solidFill>
-            <a:schemeClr val="accent1">
-              <a:tint val="60000"/>
-              <a:hueOff val="0"/>
-              <a:satOff val="0"/>
-              <a:lumOff val="0"/>
-              <a:alphaOff val="0"/>
-            </a:schemeClr>
-          </a:solidFill>
-          <a:prstDash val="solid"/>
-        </a:ln>
-        <a:effectLst>
-          <a:outerShdw blurRad="38100" dist="25400" dir="2700000" algn="br" rotWithShape="0">
-            <a:srgbClr val="000000">
-              <a:alpha val="60000"/>
-            </a:srgbClr>
-          </a:outerShdw>
-        </a:effectLst>
-        <a:sp3d z="-25400" prstMaterial="plastic">
-          <a:bevelT w="25400" h="25400"/>
-          <a:bevelB w="25400" h="25400"/>
-        </a:sp3d>
-      </dsp:spPr>
-      <dsp:style>
-        <a:lnRef idx="1">
-          <a:scrgbClr r="0" g="0" b="0"/>
-        </a:lnRef>
-        <a:fillRef idx="1">
-          <a:scrgbClr r="0" g="0" b="0"/>
-        </a:fillRef>
-        <a:effectRef idx="2">
-          <a:scrgbClr r="0" g="0" b="0"/>
-        </a:effectRef>
-        <a:fontRef idx="minor">
-          <a:schemeClr val="lt1"/>
-        </a:fontRef>
-      </dsp:style>
-      <dsp:txBody>
-        <a:bodyPr spcFirstLastPara="0" vert="horz" wrap="square" lIns="0" tIns="0" rIns="0" bIns="0" numCol="1" spcCol="1270" anchor="ctr" anchorCtr="0">
-          <a:noAutofit/>
-        </a:bodyPr>
-        <a:lstStyle/>
-        <a:p>
-          <a:pPr lvl="0" algn="ctr" defTabSz="577850">
-            <a:lnSpc>
-              <a:spcPct val="90000"/>
-            </a:lnSpc>
-            <a:spcBef>
-              <a:spcPct val="0"/>
-            </a:spcBef>
-            <a:spcAft>
-              <a:spcPct val="35000"/>
-            </a:spcAft>
-          </a:pPr>
-          <a:endParaRPr lang="en-US" sz="1300" kern="1200"/>
-        </a:p>
-      </dsp:txBody>
-      <dsp:txXfrm>
-        <a:off x="8423910" y="1917819"/>
-        <a:ext cx="186583" cy="187086"/>
-      </dsp:txXfrm>
-    </dsp:sp>
-    <dsp:sp modelId="{81668A18-A5C4-481F-924E-91CBE598CF90}">
-      <dsp:nvSpPr>
-        <dsp:cNvPr id="0" name=""/>
-        <dsp:cNvSpPr/>
-      </dsp:nvSpPr>
-      <dsp:spPr>
-        <a:xfrm>
-          <a:off x="8801100" y="1634172"/>
-          <a:ext cx="1257300" cy="754380"/>
-        </a:xfrm>
-        <a:prstGeom prst="roundRect">
-          <a:avLst>
-            <a:gd name="adj" fmla="val 10000"/>
-          </a:avLst>
-        </a:prstGeom>
-        <a:solidFill>
-          <a:schemeClr val="accent4"/>
-        </a:solidFill>
-        <a:ln>
-          <a:noFill/>
-        </a:ln>
-        <a:effectLst>
-          <a:outerShdw blurRad="38100" dist="25400" dir="2700000" algn="br" rotWithShape="0">
-            <a:srgbClr val="000000">
-              <a:alpha val="60000"/>
-            </a:srgbClr>
-          </a:outerShdw>
-        </a:effectLst>
-        <a:sp3d prstMaterial="plastic">
-          <a:bevelT w="50800" h="50800"/>
-          <a:bevelB w="50800" h="50800"/>
-        </a:sp3d>
-      </dsp:spPr>
-      <dsp:style>
-        <a:lnRef idx="0">
-          <a:scrgbClr r="0" g="0" b="0"/>
-        </a:lnRef>
-        <a:fillRef idx="1">
-          <a:scrgbClr r="0" g="0" b="0"/>
-        </a:fillRef>
-        <a:effectRef idx="2">
-          <a:scrgbClr r="0" g="0" b="0"/>
-        </a:effectRef>
-        <a:fontRef idx="minor">
-          <a:schemeClr val="lt1"/>
-        </a:fontRef>
-      </dsp:style>
-      <dsp:txBody>
-        <a:bodyPr spcFirstLastPara="0" vert="horz" wrap="square" lIns="60960" tIns="60960" rIns="60960" bIns="60960" numCol="1" spcCol="1270" anchor="ctr" anchorCtr="0">
-          <a:noAutofit/>
-        </a:bodyPr>
-        <a:lstStyle/>
-        <a:p>
-          <a:pPr lvl="0" algn="ctr" defTabSz="711200">
-            <a:lnSpc>
-              <a:spcPct val="90000"/>
-            </a:lnSpc>
-            <a:spcBef>
-              <a:spcPct val="0"/>
-            </a:spcBef>
-            <a:spcAft>
-              <a:spcPct val="35000"/>
-            </a:spcAft>
-          </a:pPr>
-          <a:r>
-            <a:rPr lang="en-US" sz="1600" kern="1200" dirty="0" smtClean="0"/>
-            <a:t>Examination Timetable</a:t>
-          </a:r>
-          <a:endParaRPr lang="en-US" sz="1600" kern="1200" dirty="0"/>
-        </a:p>
-      </dsp:txBody>
-      <dsp:txXfrm>
-        <a:off x="8823195" y="1656267"/>
-        <a:ext cx="1213110" cy="710190"/>
-      </dsp:txXfrm>
-    </dsp:sp>
   </dsp:spTree>
 </dsp:drawing>
 </file>
@@ -3616,515 +2698,6 @@
       <dsp:cNvGrpSpPr/>
     </dsp:nvGrpSpPr>
     <dsp:grpSpPr/>
-    <dsp:sp modelId="{00128358-36EF-46A2-B8D4-2BD6293B510C}">
-      <dsp:nvSpPr>
-        <dsp:cNvPr id="0" name=""/>
-        <dsp:cNvSpPr/>
-      </dsp:nvSpPr>
-      <dsp:spPr>
-        <a:xfrm>
-          <a:off x="963" y="9241"/>
-          <a:ext cx="939831" cy="375932"/>
-        </a:xfrm>
-        <a:prstGeom prst="rect">
-          <a:avLst/>
-        </a:prstGeom>
-        <a:solidFill>
-          <a:schemeClr val="accent1">
-            <a:hueOff val="0"/>
-            <a:satOff val="0"/>
-            <a:lumOff val="0"/>
-            <a:alphaOff val="0"/>
-          </a:schemeClr>
-        </a:solidFill>
-        <a:ln w="15875" cap="flat" cmpd="sng" algn="ctr">
-          <a:solidFill>
-            <a:schemeClr val="accent1">
-              <a:hueOff val="0"/>
-              <a:satOff val="0"/>
-              <a:lumOff val="0"/>
-              <a:alphaOff val="0"/>
-            </a:schemeClr>
-          </a:solidFill>
-          <a:prstDash val="solid"/>
-        </a:ln>
-        <a:effectLst/>
-      </dsp:spPr>
-      <dsp:style>
-        <a:lnRef idx="2">
-          <a:scrgbClr r="0" g="0" b="0"/>
-        </a:lnRef>
-        <a:fillRef idx="1">
-          <a:scrgbClr r="0" g="0" b="0"/>
-        </a:fillRef>
-        <a:effectRef idx="0">
-          <a:scrgbClr r="0" g="0" b="0"/>
-        </a:effectRef>
-        <a:fontRef idx="minor">
-          <a:schemeClr val="lt1"/>
-        </a:fontRef>
-      </dsp:style>
-      <dsp:txBody>
-        <a:bodyPr spcFirstLastPara="0" vert="horz" wrap="square" lIns="85344" tIns="48768" rIns="85344" bIns="48768" numCol="1" spcCol="1270" anchor="ctr" anchorCtr="0">
-          <a:noAutofit/>
-        </a:bodyPr>
-        <a:lstStyle/>
-        <a:p>
-          <a:pPr lvl="0" algn="ctr" defTabSz="533400">
-            <a:lnSpc>
-              <a:spcPct val="90000"/>
-            </a:lnSpc>
-            <a:spcBef>
-              <a:spcPct val="0"/>
-            </a:spcBef>
-            <a:spcAft>
-              <a:spcPct val="35000"/>
-            </a:spcAft>
-          </a:pPr>
-          <a:r>
-            <a:rPr lang="en-US" sz="1200" kern="1200" dirty="0" smtClean="0"/>
-            <a:t>18:04:2005</a:t>
-          </a:r>
-          <a:endParaRPr lang="en-US" sz="1200" kern="1200" dirty="0"/>
-        </a:p>
-      </dsp:txBody>
-      <dsp:txXfrm>
-        <a:off x="963" y="9241"/>
-        <a:ext cx="939831" cy="375932"/>
-      </dsp:txXfrm>
-    </dsp:sp>
-    <dsp:sp modelId="{3D13FB4D-500D-459B-858B-B3F5F17C82D1}">
-      <dsp:nvSpPr>
-        <dsp:cNvPr id="0" name=""/>
-        <dsp:cNvSpPr/>
-      </dsp:nvSpPr>
-      <dsp:spPr>
-        <a:xfrm>
-          <a:off x="963" y="385174"/>
-          <a:ext cx="939831" cy="922320"/>
-        </a:xfrm>
-        <a:prstGeom prst="rect">
-          <a:avLst/>
-        </a:prstGeom>
-        <a:solidFill>
-          <a:schemeClr val="accent1">
-            <a:alpha val="90000"/>
-            <a:tint val="40000"/>
-            <a:hueOff val="0"/>
-            <a:satOff val="0"/>
-            <a:lumOff val="0"/>
-            <a:alphaOff val="0"/>
-          </a:schemeClr>
-        </a:solidFill>
-        <a:ln w="15875" cap="flat" cmpd="sng" algn="ctr">
-          <a:solidFill>
-            <a:schemeClr val="accent1">
-              <a:alpha val="90000"/>
-              <a:tint val="40000"/>
-              <a:hueOff val="0"/>
-              <a:satOff val="0"/>
-              <a:lumOff val="0"/>
-              <a:alphaOff val="0"/>
-            </a:schemeClr>
-          </a:solidFill>
-          <a:prstDash val="solid"/>
-        </a:ln>
-        <a:effectLst/>
-      </dsp:spPr>
-      <dsp:style>
-        <a:lnRef idx="2">
-          <a:scrgbClr r="0" g="0" b="0"/>
-        </a:lnRef>
-        <a:fillRef idx="1">
-          <a:scrgbClr r="0" g="0" b="0"/>
-        </a:fillRef>
-        <a:effectRef idx="0">
-          <a:scrgbClr r="0" g="0" b="0"/>
-        </a:effectRef>
-        <a:fontRef idx="minor"/>
-      </dsp:style>
-      <dsp:txBody>
-        <a:bodyPr spcFirstLastPara="0" vert="horz" wrap="square" lIns="64008" tIns="64008" rIns="85344" bIns="96012" numCol="1" spcCol="1270" anchor="t" anchorCtr="0">
-          <a:noAutofit/>
-        </a:bodyPr>
-        <a:lstStyle/>
-        <a:p>
-          <a:pPr marL="114300" lvl="1" indent="-114300" algn="l" defTabSz="533400">
-            <a:lnSpc>
-              <a:spcPct val="90000"/>
-            </a:lnSpc>
-            <a:spcBef>
-              <a:spcPct val="0"/>
-            </a:spcBef>
-            <a:spcAft>
-              <a:spcPct val="15000"/>
-            </a:spcAft>
-            <a:buChar char="••"/>
-          </a:pPr>
-          <a:r>
-            <a:rPr lang="en-US" sz="1200" kern="1200" dirty="0" smtClean="0"/>
-            <a:t>E: 107	R: 2</a:t>
-          </a:r>
-          <a:endParaRPr lang="en-US" sz="1200" kern="1200" dirty="0"/>
-        </a:p>
-        <a:p>
-          <a:pPr marL="114300" lvl="1" indent="-114300" algn="l" defTabSz="533400">
-            <a:lnSpc>
-              <a:spcPct val="90000"/>
-            </a:lnSpc>
-            <a:spcBef>
-              <a:spcPct val="0"/>
-            </a:spcBef>
-            <a:spcAft>
-              <a:spcPct val="15000"/>
-            </a:spcAft>
-            <a:buChar char="••"/>
-          </a:pPr>
-          <a:r>
-            <a:rPr lang="en-US" sz="1200" kern="1200" dirty="0" smtClean="0"/>
-            <a:t>E: 202	R: 1</a:t>
-          </a:r>
-          <a:endParaRPr lang="en-US" sz="1200" kern="1200" dirty="0"/>
-        </a:p>
-      </dsp:txBody>
-      <dsp:txXfrm>
-        <a:off x="963" y="385174"/>
-        <a:ext cx="939831" cy="922320"/>
-      </dsp:txXfrm>
-    </dsp:sp>
-    <dsp:sp modelId="{6EB323F8-069A-4F16-B0D7-3F62ED9C1774}">
-      <dsp:nvSpPr>
-        <dsp:cNvPr id="0" name=""/>
-        <dsp:cNvSpPr/>
-      </dsp:nvSpPr>
-      <dsp:spPr>
-        <a:xfrm>
-          <a:off x="1072372" y="9241"/>
-          <a:ext cx="939831" cy="375932"/>
-        </a:xfrm>
-        <a:prstGeom prst="rect">
-          <a:avLst/>
-        </a:prstGeom>
-        <a:solidFill>
-          <a:schemeClr val="accent1">
-            <a:hueOff val="0"/>
-            <a:satOff val="0"/>
-            <a:lumOff val="0"/>
-            <a:alphaOff val="0"/>
-          </a:schemeClr>
-        </a:solidFill>
-        <a:ln w="15875" cap="flat" cmpd="sng" algn="ctr">
-          <a:solidFill>
-            <a:schemeClr val="accent1">
-              <a:hueOff val="0"/>
-              <a:satOff val="0"/>
-              <a:lumOff val="0"/>
-              <a:alphaOff val="0"/>
-            </a:schemeClr>
-          </a:solidFill>
-          <a:prstDash val="solid"/>
-        </a:ln>
-        <a:effectLst/>
-      </dsp:spPr>
-      <dsp:style>
-        <a:lnRef idx="2">
-          <a:scrgbClr r="0" g="0" b="0"/>
-        </a:lnRef>
-        <a:fillRef idx="1">
-          <a:scrgbClr r="0" g="0" b="0"/>
-        </a:fillRef>
-        <a:effectRef idx="0">
-          <a:scrgbClr r="0" g="0" b="0"/>
-        </a:effectRef>
-        <a:fontRef idx="minor">
-          <a:schemeClr val="lt1"/>
-        </a:fontRef>
-      </dsp:style>
-      <dsp:txBody>
-        <a:bodyPr spcFirstLastPara="0" vert="horz" wrap="square" lIns="85344" tIns="48768" rIns="85344" bIns="48768" numCol="1" spcCol="1270" anchor="ctr" anchorCtr="0">
-          <a:noAutofit/>
-        </a:bodyPr>
-        <a:lstStyle/>
-        <a:p>
-          <a:pPr lvl="0" algn="ctr" defTabSz="533400">
-            <a:lnSpc>
-              <a:spcPct val="90000"/>
-            </a:lnSpc>
-            <a:spcBef>
-              <a:spcPct val="0"/>
-            </a:spcBef>
-            <a:spcAft>
-              <a:spcPct val="35000"/>
-            </a:spcAft>
-          </a:pPr>
-          <a:r>
-            <a:rPr lang="en-US" sz="1200" kern="1200" dirty="0" smtClean="0"/>
-            <a:t>19:04:2005</a:t>
-          </a:r>
-          <a:endParaRPr lang="en-US" sz="1200" kern="1200" dirty="0"/>
-        </a:p>
-      </dsp:txBody>
-      <dsp:txXfrm>
-        <a:off x="1072372" y="9241"/>
-        <a:ext cx="939831" cy="375932"/>
-      </dsp:txXfrm>
-    </dsp:sp>
-    <dsp:sp modelId="{E6C2ED4F-3122-4690-8C3D-E9FBEA807E7C}">
-      <dsp:nvSpPr>
-        <dsp:cNvPr id="0" name=""/>
-        <dsp:cNvSpPr/>
-      </dsp:nvSpPr>
-      <dsp:spPr>
-        <a:xfrm>
-          <a:off x="1072372" y="385174"/>
-          <a:ext cx="939831" cy="922320"/>
-        </a:xfrm>
-        <a:prstGeom prst="rect">
-          <a:avLst/>
-        </a:prstGeom>
-        <a:solidFill>
-          <a:schemeClr val="accent1">
-            <a:alpha val="90000"/>
-            <a:tint val="40000"/>
-            <a:hueOff val="0"/>
-            <a:satOff val="0"/>
-            <a:lumOff val="0"/>
-            <a:alphaOff val="0"/>
-          </a:schemeClr>
-        </a:solidFill>
-        <a:ln w="15875" cap="flat" cmpd="sng" algn="ctr">
-          <a:solidFill>
-            <a:schemeClr val="accent1">
-              <a:alpha val="90000"/>
-              <a:tint val="40000"/>
-              <a:hueOff val="0"/>
-              <a:satOff val="0"/>
-              <a:lumOff val="0"/>
-              <a:alphaOff val="0"/>
-            </a:schemeClr>
-          </a:solidFill>
-          <a:prstDash val="solid"/>
-        </a:ln>
-        <a:effectLst/>
-      </dsp:spPr>
-      <dsp:style>
-        <a:lnRef idx="2">
-          <a:scrgbClr r="0" g="0" b="0"/>
-        </a:lnRef>
-        <a:fillRef idx="1">
-          <a:scrgbClr r="0" g="0" b="0"/>
-        </a:fillRef>
-        <a:effectRef idx="0">
-          <a:scrgbClr r="0" g="0" b="0"/>
-        </a:effectRef>
-        <a:fontRef idx="minor"/>
-      </dsp:style>
-      <dsp:txBody>
-        <a:bodyPr spcFirstLastPara="0" vert="horz" wrap="square" lIns="64008" tIns="64008" rIns="85344" bIns="96012" numCol="1" spcCol="1270" anchor="t" anchorCtr="0">
-          <a:noAutofit/>
-        </a:bodyPr>
-        <a:lstStyle/>
-        <a:p>
-          <a:pPr marL="114300" lvl="1" indent="-114300" algn="l" defTabSz="533400">
-            <a:lnSpc>
-              <a:spcPct val="90000"/>
-            </a:lnSpc>
-            <a:spcBef>
-              <a:spcPct val="0"/>
-            </a:spcBef>
-            <a:spcAft>
-              <a:spcPct val="15000"/>
-            </a:spcAft>
-            <a:buChar char="••"/>
-          </a:pPr>
-          <a:r>
-            <a:rPr lang="en-US" sz="1200" kern="1200" dirty="0" smtClean="0"/>
-            <a:t>E: 2	R: 5</a:t>
-          </a:r>
-          <a:endParaRPr lang="en-US" sz="1200" kern="1200" dirty="0"/>
-        </a:p>
-      </dsp:txBody>
-      <dsp:txXfrm>
-        <a:off x="1072372" y="385174"/>
-        <a:ext cx="939831" cy="922320"/>
-      </dsp:txXfrm>
-    </dsp:sp>
-    <dsp:sp modelId="{ED0C6729-1393-4353-B252-FF075B28E681}">
-      <dsp:nvSpPr>
-        <dsp:cNvPr id="0" name=""/>
-        <dsp:cNvSpPr/>
-      </dsp:nvSpPr>
-      <dsp:spPr>
-        <a:xfrm>
-          <a:off x="2143780" y="9241"/>
-          <a:ext cx="939831" cy="375932"/>
-        </a:xfrm>
-        <a:prstGeom prst="rect">
-          <a:avLst/>
-        </a:prstGeom>
-        <a:solidFill>
-          <a:schemeClr val="accent1">
-            <a:hueOff val="0"/>
-            <a:satOff val="0"/>
-            <a:lumOff val="0"/>
-            <a:alphaOff val="0"/>
-          </a:schemeClr>
-        </a:solidFill>
-        <a:ln w="15875" cap="flat" cmpd="sng" algn="ctr">
-          <a:solidFill>
-            <a:schemeClr val="accent1">
-              <a:hueOff val="0"/>
-              <a:satOff val="0"/>
-              <a:lumOff val="0"/>
-              <a:alphaOff val="0"/>
-            </a:schemeClr>
-          </a:solidFill>
-          <a:prstDash val="solid"/>
-        </a:ln>
-        <a:effectLst/>
-      </dsp:spPr>
-      <dsp:style>
-        <a:lnRef idx="2">
-          <a:scrgbClr r="0" g="0" b="0"/>
-        </a:lnRef>
-        <a:fillRef idx="1">
-          <a:scrgbClr r="0" g="0" b="0"/>
-        </a:fillRef>
-        <a:effectRef idx="0">
-          <a:scrgbClr r="0" g="0" b="0"/>
-        </a:effectRef>
-        <a:fontRef idx="minor">
-          <a:schemeClr val="lt1"/>
-        </a:fontRef>
-      </dsp:style>
-      <dsp:txBody>
-        <a:bodyPr spcFirstLastPara="0" vert="horz" wrap="square" lIns="85344" tIns="48768" rIns="85344" bIns="48768" numCol="1" spcCol="1270" anchor="ctr" anchorCtr="0">
-          <a:noAutofit/>
-        </a:bodyPr>
-        <a:lstStyle/>
-        <a:p>
-          <a:pPr lvl="0" algn="ctr" defTabSz="533400">
-            <a:lnSpc>
-              <a:spcPct val="90000"/>
-            </a:lnSpc>
-            <a:spcBef>
-              <a:spcPct val="0"/>
-            </a:spcBef>
-            <a:spcAft>
-              <a:spcPct val="35000"/>
-            </a:spcAft>
-          </a:pPr>
-          <a:r>
-            <a:rPr lang="en-US" sz="1200" kern="1200" dirty="0" smtClean="0"/>
-            <a:t>20:04:2005</a:t>
-          </a:r>
-          <a:endParaRPr lang="en-US" sz="1200" kern="1200" dirty="0"/>
-        </a:p>
-      </dsp:txBody>
-      <dsp:txXfrm>
-        <a:off x="2143780" y="9241"/>
-        <a:ext cx="939831" cy="375932"/>
-      </dsp:txXfrm>
-    </dsp:sp>
-    <dsp:sp modelId="{C2621C42-605E-40B9-B96E-0AEDD830E23B}">
-      <dsp:nvSpPr>
-        <dsp:cNvPr id="0" name=""/>
-        <dsp:cNvSpPr/>
-      </dsp:nvSpPr>
-      <dsp:spPr>
-        <a:xfrm>
-          <a:off x="2143780" y="385174"/>
-          <a:ext cx="939831" cy="922320"/>
-        </a:xfrm>
-        <a:prstGeom prst="rect">
-          <a:avLst/>
-        </a:prstGeom>
-        <a:solidFill>
-          <a:schemeClr val="accent1">
-            <a:alpha val="90000"/>
-            <a:tint val="40000"/>
-            <a:hueOff val="0"/>
-            <a:satOff val="0"/>
-            <a:lumOff val="0"/>
-            <a:alphaOff val="0"/>
-          </a:schemeClr>
-        </a:solidFill>
-        <a:ln w="15875" cap="flat" cmpd="sng" algn="ctr">
-          <a:solidFill>
-            <a:schemeClr val="accent1">
-              <a:alpha val="90000"/>
-              <a:tint val="40000"/>
-              <a:hueOff val="0"/>
-              <a:satOff val="0"/>
-              <a:lumOff val="0"/>
-              <a:alphaOff val="0"/>
-            </a:schemeClr>
-          </a:solidFill>
-          <a:prstDash val="solid"/>
-        </a:ln>
-        <a:effectLst/>
-      </dsp:spPr>
-      <dsp:style>
-        <a:lnRef idx="2">
-          <a:scrgbClr r="0" g="0" b="0"/>
-        </a:lnRef>
-        <a:fillRef idx="1">
-          <a:scrgbClr r="0" g="0" b="0"/>
-        </a:fillRef>
-        <a:effectRef idx="0">
-          <a:scrgbClr r="0" g="0" b="0"/>
-        </a:effectRef>
-        <a:fontRef idx="minor"/>
-      </dsp:style>
-      <dsp:txBody>
-        <a:bodyPr spcFirstLastPara="0" vert="horz" wrap="square" lIns="64008" tIns="64008" rIns="85344" bIns="96012" numCol="1" spcCol="1270" anchor="t" anchorCtr="0">
-          <a:noAutofit/>
-        </a:bodyPr>
-        <a:lstStyle/>
-        <a:p>
-          <a:pPr marL="114300" lvl="1" indent="-114300" algn="l" defTabSz="533400">
-            <a:lnSpc>
-              <a:spcPct val="90000"/>
-            </a:lnSpc>
-            <a:spcBef>
-              <a:spcPct val="0"/>
-            </a:spcBef>
-            <a:spcAft>
-              <a:spcPct val="15000"/>
-            </a:spcAft>
-            <a:buChar char="••"/>
-          </a:pPr>
-          <a:r>
-            <a:rPr lang="en-US" sz="1200" kern="1200" dirty="0" smtClean="0"/>
-            <a:t>E: 112	R: 6</a:t>
-          </a:r>
-          <a:endParaRPr lang="en-US" sz="1200" kern="1200" dirty="0"/>
-        </a:p>
-        <a:p>
-          <a:pPr marL="114300" lvl="1" indent="-114300" algn="l" defTabSz="533400">
-            <a:lnSpc>
-              <a:spcPct val="90000"/>
-            </a:lnSpc>
-            <a:spcBef>
-              <a:spcPct val="0"/>
-            </a:spcBef>
-            <a:spcAft>
-              <a:spcPct val="15000"/>
-            </a:spcAft>
-            <a:buChar char="••"/>
-          </a:pPr>
-          <a:r>
-            <a:rPr lang="en-US" sz="1200" kern="1200" dirty="0" smtClean="0"/>
-            <a:t>E: 254	R: 1</a:t>
-          </a:r>
-          <a:endParaRPr lang="en-US" sz="1200" kern="1200" dirty="0"/>
-        </a:p>
-      </dsp:txBody>
-      <dsp:txXfrm>
-        <a:off x="2143780" y="385174"/>
-        <a:ext cx="939831" cy="922320"/>
-      </dsp:txXfrm>
-    </dsp:sp>
   </dsp:spTree>
 </dsp:drawing>
 </file>
@@ -6750,7 +5323,7 @@
           <a:p>
             <a:fld id="{D6647FDC-F259-4A4D-B5F5-E5558F96794B}" type="datetimeFigureOut">
               <a:rPr lang="en-US" smtClean="0"/>
-              <a:t>04-Nov-15</a:t>
+              <a:t>06-Nov-15</a:t>
             </a:fld>
             <a:endParaRPr lang="en-US"/>
           </a:p>
@@ -9138,42 +7711,6 @@
               <a:rPr lang="en-US" baseline="0" dirty="0" err="1" smtClean="0"/>
               <a:t>vencedores</a:t>
             </a:r>
-            <a:r>
-              <a:rPr lang="en-US" baseline="0" dirty="0" smtClean="0"/>
-              <a:t> (</a:t>
-            </a:r>
-            <a:r>
-              <a:rPr lang="en-US" baseline="0" dirty="0" err="1" smtClean="0"/>
-              <a:t>alguns</a:t>
-            </a:r>
-            <a:r>
-              <a:rPr lang="en-US" baseline="0" dirty="0" smtClean="0"/>
-              <a:t> </a:t>
-            </a:r>
-            <a:r>
-              <a:rPr lang="en-US" baseline="0" dirty="0" err="1" smtClean="0"/>
-              <a:t>conseguem</a:t>
-            </a:r>
-            <a:r>
-              <a:rPr lang="en-US" baseline="0" dirty="0" smtClean="0"/>
-              <a:t> </a:t>
-            </a:r>
-            <a:r>
-              <a:rPr lang="en-US" baseline="0" dirty="0" err="1" smtClean="0"/>
-              <a:t>chegar</a:t>
-            </a:r>
-            <a:r>
-              <a:rPr lang="en-US" baseline="0" dirty="0" smtClean="0"/>
-              <a:t> a 5º, 4º e 3º </a:t>
-            </a:r>
-            <a:r>
-              <a:rPr lang="en-US" baseline="0" dirty="0" err="1" smtClean="0"/>
-              <a:t>lugar</a:t>
-            </a:r>
-            <a:r>
-              <a:rPr lang="en-US" baseline="0" dirty="0" smtClean="0"/>
-              <a:t>)</a:t>
-            </a:r>
             <a:endParaRPr lang="en-US" dirty="0"/>
           </a:p>
         </p:txBody>
@@ -10923,7 +9460,7 @@
           <a:p>
             <a:fld id="{DEC0C222-1897-4DCE-AD4E-1C2D23F222B2}" type="datetime1">
               <a:rPr lang="en-US" smtClean="0"/>
-              <a:t>04-Nov-15</a:t>
+              <a:t>06-Nov-15</a:t>
             </a:fld>
             <a:endParaRPr lang="en-US" dirty="0"/>
           </a:p>
@@ -11126,7 +9663,7 @@
           <a:p>
             <a:fld id="{83B33049-48DA-48C7-905F-AFA84CCF358A}" type="datetime1">
               <a:rPr lang="en-US" smtClean="0"/>
-              <a:t>04-Nov-15</a:t>
+              <a:t>06-Nov-15</a:t>
             </a:fld>
             <a:endParaRPr lang="en-US" dirty="0"/>
           </a:p>
@@ -11377,7 +9914,7 @@
           <a:p>
             <a:fld id="{DFA83854-2080-4526-8728-B16635428175}" type="datetime1">
               <a:rPr lang="en-US" smtClean="0"/>
-              <a:t>04-Nov-15</a:t>
+              <a:t>06-Nov-15</a:t>
             </a:fld>
             <a:endParaRPr lang="en-US" dirty="0"/>
           </a:p>
@@ -11542,7 +10079,7 @@
           <a:p>
             <a:fld id="{A4A5A1A0-1AF9-4436-9543-0DB5EAF61DDB}" type="datetime1">
               <a:rPr lang="en-US" smtClean="0"/>
-              <a:t>04-Nov-15</a:t>
+              <a:t>06-Nov-15</a:t>
             </a:fld>
             <a:endParaRPr lang="en-US" dirty="0"/>
           </a:p>
@@ -11880,7 +10417,7 @@
           <a:p>
             <a:fld id="{F1E36FFC-B415-40E6-BC3F-20E5229F7B68}" type="datetime1">
               <a:rPr lang="en-US" smtClean="0"/>
-              <a:t>04-Nov-15</a:t>
+              <a:t>06-Nov-15</a:t>
             </a:fld>
             <a:endParaRPr lang="en-US" dirty="0"/>
           </a:p>
@@ -12150,7 +10687,7 @@
           <a:p>
             <a:fld id="{03C74DB2-5A2F-472B-9AC3-3BF4FCAC99CF}" type="datetime1">
               <a:rPr lang="en-US" smtClean="0"/>
-              <a:t>04-Nov-15</a:t>
+              <a:t>06-Nov-15</a:t>
             </a:fld>
             <a:endParaRPr lang="en-US" dirty="0"/>
           </a:p>
@@ -12524,7 +11061,7 @@
           <a:p>
             <a:fld id="{F8C5D5B0-65F2-499A-935A-357B7BD717E0}" type="datetime1">
               <a:rPr lang="en-US" smtClean="0"/>
-              <a:t>04-Nov-15</a:t>
+              <a:t>06-Nov-15</a:t>
             </a:fld>
             <a:endParaRPr lang="en-US" dirty="0"/>
           </a:p>
@@ -12637,7 +11174,7 @@
           <a:p>
             <a:fld id="{3AE2A76F-927E-4759-A393-009A14A08F3A}" type="datetime1">
               <a:rPr lang="en-US" smtClean="0"/>
-              <a:t>04-Nov-15</a:t>
+              <a:t>06-Nov-15</a:t>
             </a:fld>
             <a:endParaRPr lang="en-US" dirty="0"/>
           </a:p>
@@ -12803,7 +11340,7 @@
           <a:p>
             <a:fld id="{A18B15E5-7704-471B-81DC-E3AF275B315A}" type="datetime1">
               <a:rPr lang="en-US" smtClean="0"/>
-              <a:t>04-Nov-15</a:t>
+              <a:t>06-Nov-15</a:t>
             </a:fld>
             <a:endParaRPr lang="en-US" dirty="0"/>
           </a:p>
@@ -13153,7 +11690,7 @@
           <a:p>
             <a:fld id="{C2293B35-5E03-4B1C-9DCC-43CD3213BB26}" type="datetime1">
               <a:rPr lang="en-US" smtClean="0"/>
-              <a:t>04-Nov-15</a:t>
+              <a:t>06-Nov-15</a:t>
             </a:fld>
             <a:endParaRPr lang="en-US" dirty="0"/>
           </a:p>
@@ -13526,7 +12063,7 @@
           <a:p>
             <a:fld id="{57920374-59D4-478E-A1F1-6B0E4A240505}" type="datetime1">
               <a:rPr lang="en-US" smtClean="0"/>
-              <a:t>04-Nov-15</a:t>
+              <a:t>06-Nov-15</a:t>
             </a:fld>
             <a:endParaRPr lang="en-US" dirty="0"/>
           </a:p>
@@ -13808,7 +12345,7 @@
           <a:p>
             <a:fld id="{E8C0E2E8-83F9-43B1-8D6E-C17C1061DBD1}" type="datetime1">
               <a:rPr lang="en-US" smtClean="0"/>
-              <a:t>04-Nov-15</a:t>
+              <a:t>06-Nov-15</a:t>
             </a:fld>
             <a:endParaRPr lang="en-US" dirty="0"/>
           </a:p>
@@ -17940,13 +16477,8 @@
             </a:r>
             <a:r>
               <a:rPr lang="en-US" sz="2800" dirty="0" smtClean="0"/>
-              <a:t>Fitness is </a:t>
-            </a:r>
-            <a:r>
-              <a:rPr lang="en-US" sz="2800" smtClean="0"/>
-              <a:t>computed incrementally:</a:t>
-            </a:r>
-            <a:endParaRPr lang="en-US" sz="2800" dirty="0" smtClean="0"/>
+              <a:t>Fitness is computed incrementally:</a:t>
+            </a:r>
           </a:p>
           <a:p>
             <a:pPr lvl="1">
@@ -17965,7 +16497,19 @@
             </a:pPr>
             <a:r>
               <a:rPr lang="en-US" sz="2800" dirty="0" smtClean="0"/>
-              <a:t>Able to get the same results 19 times faster;</a:t>
+              <a:t>Resu</a:t>
+            </a:r>
+            <a:r>
+              <a:rPr lang="en-US" sz="2800" dirty="0" smtClean="0"/>
+              <a:t>lts are obtained</a:t>
+            </a:r>
+            <a:r>
+              <a:rPr lang="en-US" sz="2800" dirty="0" smtClean="0"/>
+              <a:t> </a:t>
+            </a:r>
+            <a:r>
+              <a:rPr lang="en-US" sz="2800" dirty="0" smtClean="0"/>
+              <a:t>19 times faster;</a:t>
             </a:r>
           </a:p>
           <a:p>
@@ -17977,7 +16521,6 @@
               <a:rPr lang="en-US" sz="2800" dirty="0" smtClean="0"/>
               <a:t>Solution space is explored with more detail.</a:t>
             </a:r>
-            <a:endParaRPr lang="en-US" sz="2800" dirty="0" smtClean="0"/>
           </a:p>
           <a:p>
             <a:pPr lvl="1">
@@ -18065,7 +16608,11 @@
           <a:p>
             <a:r>
               <a:rPr lang="en-US" dirty="0" smtClean="0"/>
-              <a:t>Rate computation</a:t>
+              <a:t>Rate </a:t>
+            </a:r>
+            <a:r>
+              <a:rPr lang="en-US" dirty="0" smtClean="0"/>
+              <a:t>computation (Simulated Annealing)</a:t>
             </a:r>
             <a:endParaRPr lang="en-US" dirty="0"/>
           </a:p>
@@ -18083,10 +16630,77 @@
         </p:nvSpPr>
         <p:spPr/>
         <p:txBody>
-          <a:bodyPr/>
+          <a:bodyPr>
+            <a:normAutofit/>
+          </a:bodyPr>
           <a:lstStyle/>
           <a:p>
-            <a:endParaRPr lang="en-US"/>
+            <a:pPr>
+              <a:buFont typeface="Arial" panose="020B0604020202020204" pitchFamily="34" charset="0"/>
+              <a:buChar char="•"/>
+            </a:pPr>
+            <a:r>
+              <a:rPr lang="en-US" sz="2800" dirty="0"/>
+              <a:t> The computation requires a simulation of the SA algorithm;</a:t>
+            </a:r>
+          </a:p>
+          <a:p>
+            <a:pPr>
+              <a:buFont typeface="Arial" panose="020B0604020202020204" pitchFamily="34" charset="0"/>
+              <a:buChar char="•"/>
+            </a:pPr>
+            <a:endParaRPr lang="en-US" sz="2800" dirty="0" smtClean="0"/>
+          </a:p>
+          <a:p>
+            <a:pPr>
+              <a:buFont typeface="Arial" panose="020B0604020202020204" pitchFamily="34" charset="0"/>
+              <a:buChar char="•"/>
+            </a:pPr>
+            <a:r>
+              <a:rPr lang="en-US" sz="2800" dirty="0" smtClean="0"/>
+              <a:t> A new rate is computed for each set:</a:t>
+            </a:r>
+          </a:p>
+          <a:p>
+            <a:pPr lvl="1">
+              <a:buFont typeface="Arial" panose="020B0604020202020204" pitchFamily="34" charset="0"/>
+              <a:buChar char="•"/>
+            </a:pPr>
+            <a:r>
+              <a:rPr lang="en-US" sz="2800" dirty="0" smtClean="0"/>
+              <a:t> SA runs as close as possible to the given time limit;</a:t>
+            </a:r>
+          </a:p>
+          <a:p>
+            <a:pPr lvl="1">
+              <a:buFont typeface="Arial" panose="020B0604020202020204" pitchFamily="34" charset="0"/>
+              <a:buChar char="•"/>
+            </a:pPr>
+            <a:r>
+              <a:rPr lang="en-US" sz="2800" dirty="0" smtClean="0"/>
+              <a:t> SA execution time becomes independent of the set’s difficulty;</a:t>
+            </a:r>
+          </a:p>
+          <a:p>
+            <a:pPr lvl="1">
+              <a:buFont typeface="Arial" panose="020B0604020202020204" pitchFamily="34" charset="0"/>
+              <a:buChar char="•"/>
+            </a:pPr>
+            <a:r>
+              <a:rPr lang="en-US" sz="2800" dirty="0"/>
+              <a:t> </a:t>
+            </a:r>
+            <a:r>
+              <a:rPr lang="en-US" sz="2800" dirty="0" smtClean="0"/>
+              <a:t>Higher likelihood of obtaining better results.</a:t>
+            </a:r>
+          </a:p>
+          <a:p>
+            <a:pPr>
+              <a:buFont typeface="Arial" panose="020B0604020202020204" pitchFamily="34" charset="0"/>
+              <a:buChar char="•"/>
+            </a:pPr>
+            <a:endParaRPr lang="en-US" sz="2800" dirty="0"/>
           </a:p>
         </p:txBody>
       </p:sp>

</xml_diff>

<commit_message>
2 Erros encontrados no relatório final emendados
</commit_message>
<xml_diff>
--- a/doc/Apresentação Oral/AFinal.pptx
+++ b/doc/Apresentação Oral/AFinal.pptx
@@ -2144,29 +2144,29 @@
     </dgm:pt>
   </dgm:ptLst>
   <dgm:cxnLst>
-    <dgm:cxn modelId="{7EF4DE59-EE4D-429F-961F-C9CCE67F98A0}" type="presOf" srcId="{903E13AB-7FF9-4EF1-9CC8-42D43D9E5AF2}" destId="{F0252C6C-08EF-48C6-89C0-0C3E67BADC55}" srcOrd="0" destOrd="0" presId="urn:microsoft.com/office/officeart/2005/8/layout/process1"/>
-    <dgm:cxn modelId="{296F466E-FD74-4122-B044-D57410516D1D}" type="presOf" srcId="{98B9D415-3575-41DA-8A1E-7D3F389EAAB4}" destId="{B6D3413A-C5B6-47F8-B1A9-65F1039F4D3B}" srcOrd="0" destOrd="0" presId="urn:microsoft.com/office/officeart/2005/8/layout/process1"/>
+    <dgm:cxn modelId="{F7E4C5EA-DFF3-4CA5-B13C-89A73E0450D9}" type="presOf" srcId="{903E13AB-7FF9-4EF1-9CC8-42D43D9E5AF2}" destId="{005977C5-7746-4332-AB63-5565C2615FED}" srcOrd="1" destOrd="0" presId="urn:microsoft.com/office/officeart/2005/8/layout/process1"/>
+    <dgm:cxn modelId="{F106EA50-CE0A-49EA-9830-F23364F8072D}" srcId="{BA80B3D6-D686-4335-B8FE-A5B174A91D1F}" destId="{CCE039CF-CC13-4D3D-851B-AB1839045A98}" srcOrd="1" destOrd="0" parTransId="{F7538E36-531A-4ABF-83F2-4D674DEF8E32}" sibTransId="{0827E205-FFF6-4C97-99DA-E7CCB976213E}"/>
+    <dgm:cxn modelId="{72341014-660C-4F4B-99DB-6D5B90535813}" type="presOf" srcId="{BA80B3D6-D686-4335-B8FE-A5B174A91D1F}" destId="{52A5986A-80EF-452F-B163-4F651F6E920E}" srcOrd="0" destOrd="0" presId="urn:microsoft.com/office/officeart/2005/8/layout/process1"/>
+    <dgm:cxn modelId="{F6EB67DB-F866-45F1-902C-F2D6BDC23779}" type="presOf" srcId="{6E46E610-6AA3-4C4E-8A85-6DC6A62E248B}" destId="{81668A18-A5C4-481F-924E-91CBE598CF90}" srcOrd="0" destOrd="0" presId="urn:microsoft.com/office/officeart/2005/8/layout/process1"/>
+    <dgm:cxn modelId="{174D0F16-8657-483C-B58D-FDDCDD6C622B}" srcId="{BA80B3D6-D686-4335-B8FE-A5B174A91D1F}" destId="{17A8A248-E1DA-469F-A154-CBAC5D9778AB}" srcOrd="0" destOrd="0" parTransId="{E3C8D432-9B80-4370-B9AA-3C64CD61764F}" sibTransId="{4422F951-8E6C-4158-98BC-9114CDD18487}"/>
+    <dgm:cxn modelId="{3DC493F8-5B48-4FC5-BABD-95DC0BAAB2A7}" type="presOf" srcId="{4422F951-8E6C-4158-98BC-9114CDD18487}" destId="{FDB0FADC-49BB-4433-94F6-73BAE60CC01B}" srcOrd="0" destOrd="0" presId="urn:microsoft.com/office/officeart/2005/8/layout/process1"/>
+    <dgm:cxn modelId="{3C2D7F7A-0ECD-4B6F-B22B-38A66E112503}" type="presOf" srcId="{CCE039CF-CC13-4D3D-851B-AB1839045A98}" destId="{C2B5D9D2-D82E-407D-882B-8A8EEF511AFF}" srcOrd="0" destOrd="0" presId="urn:microsoft.com/office/officeart/2005/8/layout/process1"/>
+    <dgm:cxn modelId="{10FE49BB-B917-47BD-8A7A-41F8A583102C}" type="presOf" srcId="{424BD534-A5CD-4DA1-970B-96BC2B36FFFA}" destId="{A9B93654-13EA-4C3C-8C58-01B6F39C7E93}" srcOrd="0" destOrd="0" presId="urn:microsoft.com/office/officeart/2005/8/layout/process1"/>
+    <dgm:cxn modelId="{E8D939EE-BE19-4749-A012-A8BD5CBA70A3}" srcId="{BA80B3D6-D686-4335-B8FE-A5B174A91D1F}" destId="{6E46E610-6AA3-4C4E-8A85-6DC6A62E248B}" srcOrd="5" destOrd="0" parTransId="{823508B4-53E0-436F-8C0C-01AAB20F1F8B}" sibTransId="{58A25139-4C19-4DEF-BB4A-2C7D0C560D1E}"/>
+    <dgm:cxn modelId="{E7CFC45B-DF7A-4A53-8AD2-1EDC1D064D7D}" type="presOf" srcId="{D4EC1965-5E66-4F6A-B14C-48B89CF88F34}" destId="{1042CD11-4028-40C7-A3E4-3853786713BD}" srcOrd="0" destOrd="0" presId="urn:microsoft.com/office/officeart/2005/8/layout/process1"/>
+    <dgm:cxn modelId="{B45AA2E6-D816-418A-8CB3-0FAC27502E63}" type="presOf" srcId="{502ADAB4-0FBC-4569-99CE-21E1D5F6BC66}" destId="{84B384BA-4992-4177-9E54-19EAA20BCC7A}" srcOrd="0" destOrd="0" presId="urn:microsoft.com/office/officeart/2005/8/layout/process1"/>
     <dgm:cxn modelId="{976DF86D-1A8D-448E-8334-DA38467787F6}" type="presOf" srcId="{502ADAB4-0FBC-4569-99CE-21E1D5F6BC66}" destId="{45E28F72-793C-4B73-B565-78D783AB4F0D}" srcOrd="1" destOrd="0" presId="urn:microsoft.com/office/officeart/2005/8/layout/process1"/>
     <dgm:cxn modelId="{B8F3B7DF-0C43-42CF-9639-3F6ED87A8879}" type="presOf" srcId="{2F6FD728-9EA6-4228-BAD0-00E42898BAEE}" destId="{42370FF3-AFA1-404E-A02D-36439289E42F}" srcOrd="0" destOrd="0" presId="urn:microsoft.com/office/officeart/2005/8/layout/process1"/>
     <dgm:cxn modelId="{10A6AFFB-136F-4B46-B488-3FCEC86DF52E}" srcId="{BA80B3D6-D686-4335-B8FE-A5B174A91D1F}" destId="{98B9D415-3575-41DA-8A1E-7D3F389EAAB4}" srcOrd="4" destOrd="0" parTransId="{4BB043C2-7E2E-4EC1-9BF5-3822561939B1}" sibTransId="{903E13AB-7FF9-4EF1-9CC8-42D43D9E5AF2}"/>
-    <dgm:cxn modelId="{E7CFC45B-DF7A-4A53-8AD2-1EDC1D064D7D}" type="presOf" srcId="{D4EC1965-5E66-4F6A-B14C-48B89CF88F34}" destId="{1042CD11-4028-40C7-A3E4-3853786713BD}" srcOrd="0" destOrd="0" presId="urn:microsoft.com/office/officeart/2005/8/layout/process1"/>
-    <dgm:cxn modelId="{72341014-660C-4F4B-99DB-6D5B90535813}" type="presOf" srcId="{BA80B3D6-D686-4335-B8FE-A5B174A91D1F}" destId="{52A5986A-80EF-452F-B163-4F651F6E920E}" srcOrd="0" destOrd="0" presId="urn:microsoft.com/office/officeart/2005/8/layout/process1"/>
+    <dgm:cxn modelId="{F2DA0746-0CB3-4E86-A4F9-198901C93E9E}" type="presOf" srcId="{4422F951-8E6C-4158-98BC-9114CDD18487}" destId="{C70AAC22-CD4D-442E-9F76-A785E86CF564}" srcOrd="1" destOrd="0" presId="urn:microsoft.com/office/officeart/2005/8/layout/process1"/>
     <dgm:cxn modelId="{63979777-6806-43D9-999F-7A795E3AE3BF}" srcId="{BA80B3D6-D686-4335-B8FE-A5B174A91D1F}" destId="{424BD534-A5CD-4DA1-970B-96BC2B36FFFA}" srcOrd="3" destOrd="0" parTransId="{A6527A33-AD89-4577-8B3C-398FC08D70E9}" sibTransId="{2F6FD728-9EA6-4228-BAD0-00E42898BAEE}"/>
-    <dgm:cxn modelId="{F6EB67DB-F866-45F1-902C-F2D6BDC23779}" type="presOf" srcId="{6E46E610-6AA3-4C4E-8A85-6DC6A62E248B}" destId="{81668A18-A5C4-481F-924E-91CBE598CF90}" srcOrd="0" destOrd="0" presId="urn:microsoft.com/office/officeart/2005/8/layout/process1"/>
-    <dgm:cxn modelId="{F7E4C5EA-DFF3-4CA5-B13C-89A73E0450D9}" type="presOf" srcId="{903E13AB-7FF9-4EF1-9CC8-42D43D9E5AF2}" destId="{005977C5-7746-4332-AB63-5565C2615FED}" srcOrd="1" destOrd="0" presId="urn:microsoft.com/office/officeart/2005/8/layout/process1"/>
-    <dgm:cxn modelId="{F2DA0746-0CB3-4E86-A4F9-198901C93E9E}" type="presOf" srcId="{4422F951-8E6C-4158-98BC-9114CDD18487}" destId="{C70AAC22-CD4D-442E-9F76-A785E86CF564}" srcOrd="1" destOrd="0" presId="urn:microsoft.com/office/officeart/2005/8/layout/process1"/>
     <dgm:cxn modelId="{342964B1-6106-4F57-988A-6EA084A830C3}" type="presOf" srcId="{0827E205-FFF6-4C97-99DA-E7CCB976213E}" destId="{861FB1F0-A09E-4914-B7FC-FCEA1CD04480}" srcOrd="1" destOrd="0" presId="urn:microsoft.com/office/officeart/2005/8/layout/process1"/>
+    <dgm:cxn modelId="{7EF4DE59-EE4D-429F-961F-C9CCE67F98A0}" type="presOf" srcId="{903E13AB-7FF9-4EF1-9CC8-42D43D9E5AF2}" destId="{F0252C6C-08EF-48C6-89C0-0C3E67BADC55}" srcOrd="0" destOrd="0" presId="urn:microsoft.com/office/officeart/2005/8/layout/process1"/>
+    <dgm:cxn modelId="{65373FC5-E836-409F-BAFC-05BC7F6E6B33}" type="presOf" srcId="{2F6FD728-9EA6-4228-BAD0-00E42898BAEE}" destId="{09FB49E3-3A32-426F-90D7-C2DEEECBAE8A}" srcOrd="1" destOrd="0" presId="urn:microsoft.com/office/officeart/2005/8/layout/process1"/>
     <dgm:cxn modelId="{DE637EEF-7D91-4557-9E24-CE46690DD8EC}" type="presOf" srcId="{0827E205-FFF6-4C97-99DA-E7CCB976213E}" destId="{E608B5D3-1969-4012-8ADD-73D2E450020A}" srcOrd="0" destOrd="0" presId="urn:microsoft.com/office/officeart/2005/8/layout/process1"/>
-    <dgm:cxn modelId="{10FE49BB-B917-47BD-8A7A-41F8A583102C}" type="presOf" srcId="{424BD534-A5CD-4DA1-970B-96BC2B36FFFA}" destId="{A9B93654-13EA-4C3C-8C58-01B6F39C7E93}" srcOrd="0" destOrd="0" presId="urn:microsoft.com/office/officeart/2005/8/layout/process1"/>
-    <dgm:cxn modelId="{174D0F16-8657-483C-B58D-FDDCDD6C622B}" srcId="{BA80B3D6-D686-4335-B8FE-A5B174A91D1F}" destId="{17A8A248-E1DA-469F-A154-CBAC5D9778AB}" srcOrd="0" destOrd="0" parTransId="{E3C8D432-9B80-4370-B9AA-3C64CD61764F}" sibTransId="{4422F951-8E6C-4158-98BC-9114CDD18487}"/>
-    <dgm:cxn modelId="{F106EA50-CE0A-49EA-9830-F23364F8072D}" srcId="{BA80B3D6-D686-4335-B8FE-A5B174A91D1F}" destId="{CCE039CF-CC13-4D3D-851B-AB1839045A98}" srcOrd="1" destOrd="0" parTransId="{F7538E36-531A-4ABF-83F2-4D674DEF8E32}" sibTransId="{0827E205-FFF6-4C97-99DA-E7CCB976213E}"/>
-    <dgm:cxn modelId="{B45AA2E6-D816-418A-8CB3-0FAC27502E63}" type="presOf" srcId="{502ADAB4-0FBC-4569-99CE-21E1D5F6BC66}" destId="{84B384BA-4992-4177-9E54-19EAA20BCC7A}" srcOrd="0" destOrd="0" presId="urn:microsoft.com/office/officeart/2005/8/layout/process1"/>
+    <dgm:cxn modelId="{296F466E-FD74-4122-B044-D57410516D1D}" type="presOf" srcId="{98B9D415-3575-41DA-8A1E-7D3F389EAAB4}" destId="{B6D3413A-C5B6-47F8-B1A9-65F1039F4D3B}" srcOrd="0" destOrd="0" presId="urn:microsoft.com/office/officeart/2005/8/layout/process1"/>
+    <dgm:cxn modelId="{F1DC2A5A-DC5A-417A-B6A0-A85C2DF10750}" srcId="{BA80B3D6-D686-4335-B8FE-A5B174A91D1F}" destId="{D4EC1965-5E66-4F6A-B14C-48B89CF88F34}" srcOrd="2" destOrd="0" parTransId="{FCD1FA7D-D905-468E-99B9-C7BD076FAC31}" sibTransId="{502ADAB4-0FBC-4569-99CE-21E1D5F6BC66}"/>
     <dgm:cxn modelId="{539D2639-9F77-4D02-BDA0-E03AA5E161DC}" type="presOf" srcId="{17A8A248-E1DA-469F-A154-CBAC5D9778AB}" destId="{0F705934-E6D1-499E-BDAA-C0A62992660D}" srcOrd="0" destOrd="0" presId="urn:microsoft.com/office/officeart/2005/8/layout/process1"/>
-    <dgm:cxn modelId="{F1DC2A5A-DC5A-417A-B6A0-A85C2DF10750}" srcId="{BA80B3D6-D686-4335-B8FE-A5B174A91D1F}" destId="{D4EC1965-5E66-4F6A-B14C-48B89CF88F34}" srcOrd="2" destOrd="0" parTransId="{FCD1FA7D-D905-468E-99B9-C7BD076FAC31}" sibTransId="{502ADAB4-0FBC-4569-99CE-21E1D5F6BC66}"/>
-    <dgm:cxn modelId="{3DC493F8-5B48-4FC5-BABD-95DC0BAAB2A7}" type="presOf" srcId="{4422F951-8E6C-4158-98BC-9114CDD18487}" destId="{FDB0FADC-49BB-4433-94F6-73BAE60CC01B}" srcOrd="0" destOrd="0" presId="urn:microsoft.com/office/officeart/2005/8/layout/process1"/>
-    <dgm:cxn modelId="{E8D939EE-BE19-4749-A012-A8BD5CBA70A3}" srcId="{BA80B3D6-D686-4335-B8FE-A5B174A91D1F}" destId="{6E46E610-6AA3-4C4E-8A85-6DC6A62E248B}" srcOrd="5" destOrd="0" parTransId="{823508B4-53E0-436F-8C0C-01AAB20F1F8B}" sibTransId="{58A25139-4C19-4DEF-BB4A-2C7D0C560D1E}"/>
-    <dgm:cxn modelId="{3C2D7F7A-0ECD-4B6F-B22B-38A66E112503}" type="presOf" srcId="{CCE039CF-CC13-4D3D-851B-AB1839045A98}" destId="{C2B5D9D2-D82E-407D-882B-8A8EEF511AFF}" srcOrd="0" destOrd="0" presId="urn:microsoft.com/office/officeart/2005/8/layout/process1"/>
-    <dgm:cxn modelId="{65373FC5-E836-409F-BAFC-05BC7F6E6B33}" type="presOf" srcId="{2F6FD728-9EA6-4228-BAD0-00E42898BAEE}" destId="{09FB49E3-3A32-426F-90D7-C2DEEECBAE8A}" srcOrd="1" destOrd="0" presId="urn:microsoft.com/office/officeart/2005/8/layout/process1"/>
     <dgm:cxn modelId="{154F3A88-0D71-4474-80F1-3DDE67E1ECF5}" type="presParOf" srcId="{52A5986A-80EF-452F-B163-4F651F6E920E}" destId="{0F705934-E6D1-499E-BDAA-C0A62992660D}" srcOrd="0" destOrd="0" presId="urn:microsoft.com/office/officeart/2005/8/layout/process1"/>
     <dgm:cxn modelId="{49A56BD7-86C7-4645-8591-9DFD38178B6A}" type="presParOf" srcId="{52A5986A-80EF-452F-B163-4F651F6E920E}" destId="{FDB0FADC-49BB-4433-94F6-73BAE60CC01B}" srcOrd="1" destOrd="0" presId="urn:microsoft.com/office/officeart/2005/8/layout/process1"/>
     <dgm:cxn modelId="{74459F2E-3A2E-4AE9-B678-DD30F1D9840D}" type="presParOf" srcId="{FDB0FADC-49BB-4433-94F6-73BAE60CC01B}" destId="{C70AAC22-CD4D-442E-9F76-A785E86CF564}" srcOrd="0" destOrd="0" presId="urn:microsoft.com/office/officeart/2005/8/layout/process1"/>
@@ -5323,7 +5323,7 @@
           <a:p>
             <a:fld id="{D6647FDC-F259-4A4D-B5F5-E5558F96794B}" type="datetimeFigureOut">
               <a:rPr lang="en-US" smtClean="0"/>
-              <a:t>06-Nov-15</a:t>
+              <a:t>07-Nov-15</a:t>
             </a:fld>
             <a:endParaRPr lang="en-US"/>
           </a:p>
@@ -9460,7 +9460,7 @@
           <a:p>
             <a:fld id="{DEC0C222-1897-4DCE-AD4E-1C2D23F222B2}" type="datetime1">
               <a:rPr lang="en-US" smtClean="0"/>
-              <a:t>06-Nov-15</a:t>
+              <a:t>07-Nov-15</a:t>
             </a:fld>
             <a:endParaRPr lang="en-US" dirty="0"/>
           </a:p>
@@ -9663,7 +9663,7 @@
           <a:p>
             <a:fld id="{83B33049-48DA-48C7-905F-AFA84CCF358A}" type="datetime1">
               <a:rPr lang="en-US" smtClean="0"/>
-              <a:t>06-Nov-15</a:t>
+              <a:t>07-Nov-15</a:t>
             </a:fld>
             <a:endParaRPr lang="en-US" dirty="0"/>
           </a:p>
@@ -9914,7 +9914,7 @@
           <a:p>
             <a:fld id="{DFA83854-2080-4526-8728-B16635428175}" type="datetime1">
               <a:rPr lang="en-US" smtClean="0"/>
-              <a:t>06-Nov-15</a:t>
+              <a:t>07-Nov-15</a:t>
             </a:fld>
             <a:endParaRPr lang="en-US" dirty="0"/>
           </a:p>
@@ -10079,7 +10079,7 @@
           <a:p>
             <a:fld id="{A4A5A1A0-1AF9-4436-9543-0DB5EAF61DDB}" type="datetime1">
               <a:rPr lang="en-US" smtClean="0"/>
-              <a:t>06-Nov-15</a:t>
+              <a:t>07-Nov-15</a:t>
             </a:fld>
             <a:endParaRPr lang="en-US" dirty="0"/>
           </a:p>
@@ -10417,7 +10417,7 @@
           <a:p>
             <a:fld id="{F1E36FFC-B415-40E6-BC3F-20E5229F7B68}" type="datetime1">
               <a:rPr lang="en-US" smtClean="0"/>
-              <a:t>06-Nov-15</a:t>
+              <a:t>07-Nov-15</a:t>
             </a:fld>
             <a:endParaRPr lang="en-US" dirty="0"/>
           </a:p>
@@ -10687,7 +10687,7 @@
           <a:p>
             <a:fld id="{03C74DB2-5A2F-472B-9AC3-3BF4FCAC99CF}" type="datetime1">
               <a:rPr lang="en-US" smtClean="0"/>
-              <a:t>06-Nov-15</a:t>
+              <a:t>07-Nov-15</a:t>
             </a:fld>
             <a:endParaRPr lang="en-US" dirty="0"/>
           </a:p>
@@ -11061,7 +11061,7 @@
           <a:p>
             <a:fld id="{F8C5D5B0-65F2-499A-935A-357B7BD717E0}" type="datetime1">
               <a:rPr lang="en-US" smtClean="0"/>
-              <a:t>06-Nov-15</a:t>
+              <a:t>07-Nov-15</a:t>
             </a:fld>
             <a:endParaRPr lang="en-US" dirty="0"/>
           </a:p>
@@ -11174,7 +11174,7 @@
           <a:p>
             <a:fld id="{3AE2A76F-927E-4759-A393-009A14A08F3A}" type="datetime1">
               <a:rPr lang="en-US" smtClean="0"/>
-              <a:t>06-Nov-15</a:t>
+              <a:t>07-Nov-15</a:t>
             </a:fld>
             <a:endParaRPr lang="en-US" dirty="0"/>
           </a:p>
@@ -11340,7 +11340,7 @@
           <a:p>
             <a:fld id="{A18B15E5-7704-471B-81DC-E3AF275B315A}" type="datetime1">
               <a:rPr lang="en-US" smtClean="0"/>
-              <a:t>06-Nov-15</a:t>
+              <a:t>07-Nov-15</a:t>
             </a:fld>
             <a:endParaRPr lang="en-US" dirty="0"/>
           </a:p>
@@ -11690,7 +11690,7 @@
           <a:p>
             <a:fld id="{C2293B35-5E03-4B1C-9DCC-43CD3213BB26}" type="datetime1">
               <a:rPr lang="en-US" smtClean="0"/>
-              <a:t>06-Nov-15</a:t>
+              <a:t>07-Nov-15</a:t>
             </a:fld>
             <a:endParaRPr lang="en-US" dirty="0"/>
           </a:p>
@@ -12063,7 +12063,7 @@
           <a:p>
             <a:fld id="{57920374-59D4-478E-A1F1-6B0E4A240505}" type="datetime1">
               <a:rPr lang="en-US" smtClean="0"/>
-              <a:t>06-Nov-15</a:t>
+              <a:t>07-Nov-15</a:t>
             </a:fld>
             <a:endParaRPr lang="en-US" dirty="0"/>
           </a:p>
@@ -12345,7 +12345,7 @@
           <a:p>
             <a:fld id="{E8C0E2E8-83F9-43B1-8D6E-C17C1061DBD1}" type="datetime1">
               <a:rPr lang="en-US" smtClean="0"/>
-              <a:t>06-Nov-15</a:t>
+              <a:t>07-Nov-15</a:t>
             </a:fld>
             <a:endParaRPr lang="en-US" dirty="0"/>
           </a:p>
@@ -13016,8 +13016,21 @@
                   <a:schemeClr val="tx1"/>
                 </a:solidFill>
               </a:rPr>
-              <a:t> Ferreira						02/11</a:t>
-            </a:r>
+              <a:t> Ferreira						</a:t>
+            </a:r>
+            <a:r>
+              <a:rPr lang="en-US" dirty="0" smtClean="0">
+                <a:solidFill>
+                  <a:schemeClr val="tx1"/>
+                </a:solidFill>
+              </a:rPr>
+              <a:t>07/11</a:t>
+            </a:r>
+            <a:endParaRPr lang="en-US" dirty="0" smtClean="0">
+              <a:solidFill>
+                <a:schemeClr val="tx1"/>
+              </a:solidFill>
+            </a:endParaRPr>
           </a:p>
           <a:p>
             <a:r>
@@ -16010,7 +16023,7 @@
         <p:spPr/>
         <p:txBody>
           <a:bodyPr>
-            <a:normAutofit fontScale="85000" lnSpcReduction="20000"/>
+            <a:normAutofit fontScale="92500" lnSpcReduction="10000"/>
           </a:bodyPr>
           <a:lstStyle/>
           <a:p>
@@ -16074,8 +16087,21 @@
                   <a:srgbClr val="404040"/>
                 </a:solidFill>
               </a:rPr>
-              <a:t> System Architecture</a:t>
-            </a:r>
+              <a:t> </a:t>
+            </a:r>
+            <a:r>
+              <a:rPr lang="en-US" sz="2800" dirty="0" smtClean="0">
+                <a:solidFill>
+                  <a:srgbClr val="404040"/>
+                </a:solidFill>
+              </a:rPr>
+              <a:t>System Architecture</a:t>
+            </a:r>
+            <a:endParaRPr lang="en-US" sz="2800" dirty="0" smtClean="0">
+              <a:solidFill>
+                <a:srgbClr val="404040"/>
+              </a:solidFill>
+            </a:endParaRPr>
           </a:p>
           <a:p>
             <a:pPr>
@@ -16148,26 +16174,6 @@
               </a:rPr>
               <a:t>Conclusions</a:t>
             </a:r>
-          </a:p>
-          <a:p>
-            <a:pPr>
-              <a:buFont typeface="Arial" panose="020B0604020202020204" pitchFamily="34" charset="0"/>
-              <a:buChar char="•"/>
-            </a:pPr>
-            <a:r>
-              <a:rPr lang="en-US" sz="2800" dirty="0" smtClean="0">
-                <a:solidFill>
-                  <a:srgbClr val="404040"/>
-                </a:solidFill>
-              </a:rPr>
-              <a:t> Ongoing Work</a:t>
-            </a:r>
-          </a:p>
-          <a:p>
-            <a:pPr>
-              <a:buFont typeface="Arial" panose="020B0604020202020204" pitchFamily="34" charset="0"/>
-              <a:buChar char="•"/>
-            </a:pPr>
             <a:endParaRPr lang="en-US" dirty="0" smtClean="0">
               <a:solidFill>
                 <a:schemeClr val="tx1"/>
@@ -16497,19 +16503,7 @@
             </a:pPr>
             <a:r>
               <a:rPr lang="en-US" sz="2800" dirty="0" smtClean="0"/>
-              <a:t>Resu</a:t>
-            </a:r>
-            <a:r>
-              <a:rPr lang="en-US" sz="2800" dirty="0" smtClean="0"/>
-              <a:t>lts are obtained</a:t>
-            </a:r>
-            <a:r>
-              <a:rPr lang="en-US" sz="2800" dirty="0" smtClean="0"/>
-              <a:t> </a:t>
-            </a:r>
-            <a:r>
-              <a:rPr lang="en-US" sz="2800" dirty="0" smtClean="0"/>
-              <a:t>19 times faster;</a:t>
+              <a:t>Results are obtained 19 times faster;</a:t>
             </a:r>
           </a:p>
           <a:p>
@@ -16608,11 +16602,7 @@
           <a:p>
             <a:r>
               <a:rPr lang="en-US" dirty="0" smtClean="0"/>
-              <a:t>Rate </a:t>
-            </a:r>
-            <a:r>
-              <a:rPr lang="en-US" dirty="0" smtClean="0"/>
-              <a:t>computation (Simulated Annealing)</a:t>
+              <a:t>Rate computation (Simulated Annealing)</a:t>
             </a:r>
             <a:endParaRPr lang="en-US" dirty="0"/>
           </a:p>

</xml_diff>